<commit_message>
fix for signed data
</commit_message>
<xml_diff>
--- a/lab/lab4/Interpolation_block_diagram.pptx
+++ b/lab/lab4/Interpolation_block_diagram.pptx
@@ -168,6 +168,819 @@
 </p:presentation>
 </file>
 
+<file path=ppt/revisionInfo.xml><?xml version="1.0" encoding="utf-8"?>
+<p1510:revInfo xmlns:a="http://schemas.openxmlformats.org/drawingml/2006/main" xmlns:r="http://schemas.openxmlformats.org/officeDocument/2006/relationships" xmlns:p1510="http://schemas.microsoft.com/office/powerpoint/2015/10/main">
+  <p1510:revLst>
+    <p1510:client id="{EEC52F0A-4381-4048-86DF-567F01407B4F}" v="45" dt="2022-04-12T17:10:16.746"/>
+  </p1510:revLst>
+</p1510:revInfo>
+</file>
+
+<file path=ppt/changesInfos/changesInfo1.xml><?xml version="1.0" encoding="utf-8"?>
+<pc:chgInfo xmlns:a="http://schemas.openxmlformats.org/drawingml/2006/main" xmlns:r="http://schemas.openxmlformats.org/officeDocument/2006/relationships" xmlns:ac="http://schemas.microsoft.com/office/drawing/2013/main/command" xmlns:pc="http://schemas.microsoft.com/office/powerpoint/2013/main/command">
+  <pc:docChgLst>
+    <pc:chgData name="York, George W Civ USAF USAFA DF/DFEC" userId="1fb5875a-4594-4db2-80fb-f0db3de11280" providerId="ADAL" clId="{EEC52F0A-4381-4048-86DF-567F01407B4F}"/>
+    <pc:docChg chg="undo custSel modSld">
+      <pc:chgData name="York, George W Civ USAF USAFA DF/DFEC" userId="1fb5875a-4594-4db2-80fb-f0db3de11280" providerId="ADAL" clId="{EEC52F0A-4381-4048-86DF-567F01407B4F}" dt="2022-04-12T17:11:28.554" v="412" actId="167"/>
+      <pc:docMkLst>
+        <pc:docMk/>
+      </pc:docMkLst>
+      <pc:sldChg chg="addSp delSp modSp mod">
+        <pc:chgData name="York, George W Civ USAF USAFA DF/DFEC" userId="1fb5875a-4594-4db2-80fb-f0db3de11280" providerId="ADAL" clId="{EEC52F0A-4381-4048-86DF-567F01407B4F}" dt="2022-04-12T17:11:28.554" v="412" actId="167"/>
+        <pc:sldMkLst>
+          <pc:docMk/>
+          <pc:sldMk cId="3416515774" sldId="390"/>
+        </pc:sldMkLst>
+        <pc:spChg chg="del">
+          <ac:chgData name="York, George W Civ USAF USAFA DF/DFEC" userId="1fb5875a-4594-4db2-80fb-f0db3de11280" providerId="ADAL" clId="{EEC52F0A-4381-4048-86DF-567F01407B4F}" dt="2022-04-12T16:44:02.445" v="51" actId="478"/>
+          <ac:spMkLst>
+            <pc:docMk/>
+            <pc:sldMk cId="3416515774" sldId="390"/>
+            <ac:spMk id="3" creationId="{EB08ACF1-E08C-4BEA-8AF5-D87B63163844}"/>
+          </ac:spMkLst>
+        </pc:spChg>
+        <pc:spChg chg="del">
+          <ac:chgData name="York, George W Civ USAF USAFA DF/DFEC" userId="1fb5875a-4594-4db2-80fb-f0db3de11280" providerId="ADAL" clId="{EEC52F0A-4381-4048-86DF-567F01407B4F}" dt="2022-04-12T16:45:45.245" v="69" actId="478"/>
+          <ac:spMkLst>
+            <pc:docMk/>
+            <pc:sldMk cId="3416515774" sldId="390"/>
+            <ac:spMk id="5" creationId="{F2C69A48-A708-4737-B2E1-B91F36EA9432}"/>
+          </ac:spMkLst>
+        </pc:spChg>
+        <pc:spChg chg="add mod ord">
+          <ac:chgData name="York, George W Civ USAF USAFA DF/DFEC" userId="1fb5875a-4594-4db2-80fb-f0db3de11280" providerId="ADAL" clId="{EEC52F0A-4381-4048-86DF-567F01407B4F}" dt="2022-04-12T16:49:06.205" v="98" actId="1076"/>
+          <ac:spMkLst>
+            <pc:docMk/>
+            <pc:sldMk cId="3416515774" sldId="390"/>
+            <ac:spMk id="7" creationId="{6EA29404-1408-4446-A536-37142C70205F}"/>
+          </ac:spMkLst>
+        </pc:spChg>
+        <pc:spChg chg="add mod">
+          <ac:chgData name="York, George W Civ USAF USAFA DF/DFEC" userId="1fb5875a-4594-4db2-80fb-f0db3de11280" providerId="ADAL" clId="{EEC52F0A-4381-4048-86DF-567F01407B4F}" dt="2022-04-12T16:54:06.513" v="156" actId="1076"/>
+          <ac:spMkLst>
+            <pc:docMk/>
+            <pc:sldMk cId="3416515774" sldId="390"/>
+            <ac:spMk id="18" creationId="{987539B4-6338-47CF-8124-1C673A28505F}"/>
+          </ac:spMkLst>
+        </pc:spChg>
+        <pc:spChg chg="mod">
+          <ac:chgData name="York, George W Civ USAF USAFA DF/DFEC" userId="1fb5875a-4594-4db2-80fb-f0db3de11280" providerId="ADAL" clId="{EEC52F0A-4381-4048-86DF-567F01407B4F}" dt="2022-04-12T16:58:32.216" v="208" actId="1076"/>
+          <ac:spMkLst>
+            <pc:docMk/>
+            <pc:sldMk cId="3416515774" sldId="390"/>
+            <ac:spMk id="30" creationId="{00000000-0000-0000-0000-000000000000}"/>
+          </ac:spMkLst>
+        </pc:spChg>
+        <pc:spChg chg="mod">
+          <ac:chgData name="York, George W Civ USAF USAFA DF/DFEC" userId="1fb5875a-4594-4db2-80fb-f0db3de11280" providerId="ADAL" clId="{EEC52F0A-4381-4048-86DF-567F01407B4F}" dt="2022-04-12T17:01:54.870" v="249" actId="1076"/>
+          <ac:spMkLst>
+            <pc:docMk/>
+            <pc:sldMk cId="3416515774" sldId="390"/>
+            <ac:spMk id="143" creationId="{00000000-0000-0000-0000-000000000000}"/>
+          </ac:spMkLst>
+        </pc:spChg>
+        <pc:spChg chg="mod">
+          <ac:chgData name="York, George W Civ USAF USAFA DF/DFEC" userId="1fb5875a-4594-4db2-80fb-f0db3de11280" providerId="ADAL" clId="{EEC52F0A-4381-4048-86DF-567F01407B4F}" dt="2022-04-12T17:01:50.530" v="248" actId="20577"/>
+          <ac:spMkLst>
+            <pc:docMk/>
+            <pc:sldMk cId="3416515774" sldId="390"/>
+            <ac:spMk id="148" creationId="{00000000-0000-0000-0000-000000000000}"/>
+          </ac:spMkLst>
+        </pc:spChg>
+        <pc:spChg chg="mod">
+          <ac:chgData name="York, George W Civ USAF USAFA DF/DFEC" userId="1fb5875a-4594-4db2-80fb-f0db3de11280" providerId="ADAL" clId="{EEC52F0A-4381-4048-86DF-567F01407B4F}" dt="2022-04-12T17:05:53.604" v="315" actId="20577"/>
+          <ac:spMkLst>
+            <pc:docMk/>
+            <pc:sldMk cId="3416515774" sldId="390"/>
+            <ac:spMk id="160" creationId="{34319FEC-62FC-4533-B322-13BB151EE936}"/>
+          </ac:spMkLst>
+        </pc:spChg>
+        <pc:spChg chg="mod ord">
+          <ac:chgData name="York, George W Civ USAF USAFA DF/DFEC" userId="1fb5875a-4594-4db2-80fb-f0db3de11280" providerId="ADAL" clId="{EEC52F0A-4381-4048-86DF-567F01407B4F}" dt="2022-04-12T16:57:13.202" v="176" actId="166"/>
+          <ac:spMkLst>
+            <pc:docMk/>
+            <pc:sldMk cId="3416515774" sldId="390"/>
+            <ac:spMk id="162" creationId="{0180380B-A4F9-4F0D-966D-7F1FC1F9B29A}"/>
+          </ac:spMkLst>
+        </pc:spChg>
+        <pc:spChg chg="mod">
+          <ac:chgData name="York, George W Civ USAF USAFA DF/DFEC" userId="1fb5875a-4594-4db2-80fb-f0db3de11280" providerId="ADAL" clId="{EEC52F0A-4381-4048-86DF-567F01407B4F}" dt="2022-04-12T16:41:39.053" v="0" actId="1076"/>
+          <ac:spMkLst>
+            <pc:docMk/>
+            <pc:sldMk cId="3416515774" sldId="390"/>
+            <ac:spMk id="163" creationId="{47F61A86-CD47-4821-A55B-E7F5835F3611}"/>
+          </ac:spMkLst>
+        </pc:spChg>
+        <pc:spChg chg="mod">
+          <ac:chgData name="York, George W Civ USAF USAFA DF/DFEC" userId="1fb5875a-4594-4db2-80fb-f0db3de11280" providerId="ADAL" clId="{EEC52F0A-4381-4048-86DF-567F01407B4F}" dt="2022-04-12T16:49:06.205" v="98" actId="1076"/>
+          <ac:spMkLst>
+            <pc:docMk/>
+            <pc:sldMk cId="3416515774" sldId="390"/>
+            <ac:spMk id="169" creationId="{F92D90D9-B54D-44EF-B100-BFA48FFB3B2C}"/>
+          </ac:spMkLst>
+        </pc:spChg>
+        <pc:spChg chg="mod">
+          <ac:chgData name="York, George W Civ USAF USAFA DF/DFEC" userId="1fb5875a-4594-4db2-80fb-f0db3de11280" providerId="ADAL" clId="{EEC52F0A-4381-4048-86DF-567F01407B4F}" dt="2022-04-12T17:09:04.819" v="396" actId="1076"/>
+          <ac:spMkLst>
+            <pc:docMk/>
+            <pc:sldMk cId="3416515774" sldId="390"/>
+            <ac:spMk id="170" creationId="{EF76A9EF-79DC-4531-8035-5F16B983B11B}"/>
+          </ac:spMkLst>
+        </pc:spChg>
+        <pc:spChg chg="add mod">
+          <ac:chgData name="York, George W Civ USAF USAFA DF/DFEC" userId="1fb5875a-4594-4db2-80fb-f0db3de11280" providerId="ADAL" clId="{EEC52F0A-4381-4048-86DF-567F01407B4F}" dt="2022-04-12T16:41:44.117" v="2" actId="1076"/>
+          <ac:spMkLst>
+            <pc:docMk/>
+            <pc:sldMk cId="3416515774" sldId="390"/>
+            <ac:spMk id="171" creationId="{67005973-6FE0-40B9-B106-06C0E7C01726}"/>
+          </ac:spMkLst>
+        </pc:spChg>
+        <pc:spChg chg="add mod">
+          <ac:chgData name="York, George W Civ USAF USAFA DF/DFEC" userId="1fb5875a-4594-4db2-80fb-f0db3de11280" providerId="ADAL" clId="{EEC52F0A-4381-4048-86DF-567F01407B4F}" dt="2022-04-12T16:41:59.554" v="13" actId="1076"/>
+          <ac:spMkLst>
+            <pc:docMk/>
+            <pc:sldMk cId="3416515774" sldId="390"/>
+            <ac:spMk id="172" creationId="{AA6A0382-FD87-4E4F-BA50-F0C9E45882E0}"/>
+          </ac:spMkLst>
+        </pc:spChg>
+        <pc:spChg chg="add mod">
+          <ac:chgData name="York, George W Civ USAF USAFA DF/DFEC" userId="1fb5875a-4594-4db2-80fb-f0db3de11280" providerId="ADAL" clId="{EEC52F0A-4381-4048-86DF-567F01407B4F}" dt="2022-04-12T16:47:44.266" v="85" actId="1076"/>
+          <ac:spMkLst>
+            <pc:docMk/>
+            <pc:sldMk cId="3416515774" sldId="390"/>
+            <ac:spMk id="187" creationId="{A19897B2-2207-4207-AF29-695657656CE0}"/>
+          </ac:spMkLst>
+        </pc:spChg>
+        <pc:spChg chg="add mod">
+          <ac:chgData name="York, George W Civ USAF USAFA DF/DFEC" userId="1fb5875a-4594-4db2-80fb-f0db3de11280" providerId="ADAL" clId="{EEC52F0A-4381-4048-86DF-567F01407B4F}" dt="2022-04-12T16:49:45.613" v="106" actId="20577"/>
+          <ac:spMkLst>
+            <pc:docMk/>
+            <pc:sldMk cId="3416515774" sldId="390"/>
+            <ac:spMk id="194" creationId="{A65B0AE0-E2DA-4E11-8A89-01726F2C9011}"/>
+          </ac:spMkLst>
+        </pc:spChg>
+        <pc:spChg chg="add mod">
+          <ac:chgData name="York, George W Civ USAF USAFA DF/DFEC" userId="1fb5875a-4594-4db2-80fb-f0db3de11280" providerId="ADAL" clId="{EEC52F0A-4381-4048-86DF-567F01407B4F}" dt="2022-04-12T16:49:57.777" v="109" actId="20577"/>
+          <ac:spMkLst>
+            <pc:docMk/>
+            <pc:sldMk cId="3416515774" sldId="390"/>
+            <ac:spMk id="197" creationId="{28D97647-ED80-4294-86CC-16DEB27FC927}"/>
+          </ac:spMkLst>
+        </pc:spChg>
+        <pc:spChg chg="add mod">
+          <ac:chgData name="York, George W Civ USAF USAFA DF/DFEC" userId="1fb5875a-4594-4db2-80fb-f0db3de11280" providerId="ADAL" clId="{EEC52F0A-4381-4048-86DF-567F01407B4F}" dt="2022-04-12T16:53:42.704" v="153" actId="255"/>
+          <ac:spMkLst>
+            <pc:docMk/>
+            <pc:sldMk cId="3416515774" sldId="390"/>
+            <ac:spMk id="200" creationId="{7DCF5C6C-D752-4021-92DA-30960D2508B8}"/>
+          </ac:spMkLst>
+        </pc:spChg>
+        <pc:spChg chg="add mod">
+          <ac:chgData name="York, George W Civ USAF USAFA DF/DFEC" userId="1fb5875a-4594-4db2-80fb-f0db3de11280" providerId="ADAL" clId="{EEC52F0A-4381-4048-86DF-567F01407B4F}" dt="2022-04-12T16:53:59.045" v="155" actId="1076"/>
+          <ac:spMkLst>
+            <pc:docMk/>
+            <pc:sldMk cId="3416515774" sldId="390"/>
+            <ac:spMk id="201" creationId="{BABF0F57-74F1-4755-AE26-DEF01443D82F}"/>
+          </ac:spMkLst>
+        </pc:spChg>
+        <pc:spChg chg="add mod">
+          <ac:chgData name="York, George W Civ USAF USAFA DF/DFEC" userId="1fb5875a-4594-4db2-80fb-f0db3de11280" providerId="ADAL" clId="{EEC52F0A-4381-4048-86DF-567F01407B4F}" dt="2022-04-12T16:57:04.626" v="174" actId="1076"/>
+          <ac:spMkLst>
+            <pc:docMk/>
+            <pc:sldMk cId="3416515774" sldId="390"/>
+            <ac:spMk id="207" creationId="{48ABF5BC-65AB-452D-A272-1B1680F7C880}"/>
+          </ac:spMkLst>
+        </pc:spChg>
+        <pc:spChg chg="mod">
+          <ac:chgData name="York, George W Civ USAF USAFA DF/DFEC" userId="1fb5875a-4594-4db2-80fb-f0db3de11280" providerId="ADAL" clId="{EEC52F0A-4381-4048-86DF-567F01407B4F}" dt="2022-04-12T16:42:10.265" v="14" actId="20577"/>
+          <ac:spMkLst>
+            <pc:docMk/>
+            <pc:sldMk cId="3416515774" sldId="390"/>
+            <ac:spMk id="222" creationId="{00000000-0000-0000-0000-000000000000}"/>
+          </ac:spMkLst>
+        </pc:spChg>
+        <pc:spChg chg="add mod">
+          <ac:chgData name="York, George W Civ USAF USAFA DF/DFEC" userId="1fb5875a-4594-4db2-80fb-f0db3de11280" providerId="ADAL" clId="{EEC52F0A-4381-4048-86DF-567F01407B4F}" dt="2022-04-12T16:57:52.176" v="183" actId="1076"/>
+          <ac:spMkLst>
+            <pc:docMk/>
+            <pc:sldMk cId="3416515774" sldId="390"/>
+            <ac:spMk id="223" creationId="{65369131-D151-4C67-BF10-5E6FAEBC7EAA}"/>
+          </ac:spMkLst>
+        </pc:spChg>
+        <pc:spChg chg="add del mod">
+          <ac:chgData name="York, George W Civ USAF USAFA DF/DFEC" userId="1fb5875a-4594-4db2-80fb-f0db3de11280" providerId="ADAL" clId="{EEC52F0A-4381-4048-86DF-567F01407B4F}" dt="2022-04-12T17:08:13.209" v="373" actId="478"/>
+          <ac:spMkLst>
+            <pc:docMk/>
+            <pc:sldMk cId="3416515774" sldId="390"/>
+            <ac:spMk id="224" creationId="{846280E0-699A-46F0-B415-91696E433C46}"/>
+          </ac:spMkLst>
+        </pc:spChg>
+        <pc:spChg chg="mod">
+          <ac:chgData name="York, George W Civ USAF USAFA DF/DFEC" userId="1fb5875a-4594-4db2-80fb-f0db3de11280" providerId="ADAL" clId="{EEC52F0A-4381-4048-86DF-567F01407B4F}" dt="2022-04-12T16:56:53.966" v="172" actId="1076"/>
+          <ac:spMkLst>
+            <pc:docMk/>
+            <pc:sldMk cId="3416515774" sldId="390"/>
+            <ac:spMk id="226" creationId="{00000000-0000-0000-0000-000000000000}"/>
+          </ac:spMkLst>
+        </pc:spChg>
+        <pc:spChg chg="mod">
+          <ac:chgData name="York, George W Civ USAF USAFA DF/DFEC" userId="1fb5875a-4594-4db2-80fb-f0db3de11280" providerId="ADAL" clId="{EEC52F0A-4381-4048-86DF-567F01407B4F}" dt="2022-04-12T16:48:20.966" v="93" actId="1076"/>
+          <ac:spMkLst>
+            <pc:docMk/>
+            <pc:sldMk cId="3416515774" sldId="390"/>
+            <ac:spMk id="227" creationId="{00000000-0000-0000-0000-000000000000}"/>
+          </ac:spMkLst>
+        </pc:spChg>
+        <pc:spChg chg="add mod">
+          <ac:chgData name="York, George W Civ USAF USAFA DF/DFEC" userId="1fb5875a-4594-4db2-80fb-f0db3de11280" providerId="ADAL" clId="{EEC52F0A-4381-4048-86DF-567F01407B4F}" dt="2022-04-12T17:02:30.468" v="257" actId="1076"/>
+          <ac:spMkLst>
+            <pc:docMk/>
+            <pc:sldMk cId="3416515774" sldId="390"/>
+            <ac:spMk id="228" creationId="{8953EA30-1597-4A84-973E-DA80E81DA034}"/>
+          </ac:spMkLst>
+        </pc:spChg>
+        <pc:spChg chg="mod">
+          <ac:chgData name="York, George W Civ USAF USAFA DF/DFEC" userId="1fb5875a-4594-4db2-80fb-f0db3de11280" providerId="ADAL" clId="{EEC52F0A-4381-4048-86DF-567F01407B4F}" dt="2022-04-12T16:48:18.447" v="92" actId="1076"/>
+          <ac:spMkLst>
+            <pc:docMk/>
+            <pc:sldMk cId="3416515774" sldId="390"/>
+            <ac:spMk id="229" creationId="{00000000-0000-0000-0000-000000000000}"/>
+          </ac:spMkLst>
+        </pc:spChg>
+        <pc:spChg chg="add mod">
+          <ac:chgData name="York, George W Civ USAF USAFA DF/DFEC" userId="1fb5875a-4594-4db2-80fb-f0db3de11280" providerId="ADAL" clId="{EEC52F0A-4381-4048-86DF-567F01407B4F}" dt="2022-04-12T17:02:33.810" v="258" actId="1076"/>
+          <ac:spMkLst>
+            <pc:docMk/>
+            <pc:sldMk cId="3416515774" sldId="390"/>
+            <ac:spMk id="230" creationId="{304DAB2A-EE63-4424-8372-4D6B2650C451}"/>
+          </ac:spMkLst>
+        </pc:spChg>
+        <pc:spChg chg="mod">
+          <ac:chgData name="York, George W Civ USAF USAFA DF/DFEC" userId="1fb5875a-4594-4db2-80fb-f0db3de11280" providerId="ADAL" clId="{EEC52F0A-4381-4048-86DF-567F01407B4F}" dt="2022-04-12T17:05:04.255" v="300" actId="1076"/>
+          <ac:spMkLst>
+            <pc:docMk/>
+            <pc:sldMk cId="3416515774" sldId="390"/>
+            <ac:spMk id="231" creationId="{00000000-0000-0000-0000-000000000000}"/>
+          </ac:spMkLst>
+        </pc:spChg>
+        <pc:spChg chg="mod">
+          <ac:chgData name="York, George W Civ USAF USAFA DF/DFEC" userId="1fb5875a-4594-4db2-80fb-f0db3de11280" providerId="ADAL" clId="{EEC52F0A-4381-4048-86DF-567F01407B4F}" dt="2022-04-12T16:49:06.205" v="98" actId="1076"/>
+          <ac:spMkLst>
+            <pc:docMk/>
+            <pc:sldMk cId="3416515774" sldId="390"/>
+            <ac:spMk id="232" creationId="{00000000-0000-0000-0000-000000000000}"/>
+          </ac:spMkLst>
+        </pc:spChg>
+        <pc:spChg chg="mod">
+          <ac:chgData name="York, George W Civ USAF USAFA DF/DFEC" userId="1fb5875a-4594-4db2-80fb-f0db3de11280" providerId="ADAL" clId="{EEC52F0A-4381-4048-86DF-567F01407B4F}" dt="2022-04-12T16:47:29.625" v="82" actId="1076"/>
+          <ac:spMkLst>
+            <pc:docMk/>
+            <pc:sldMk cId="3416515774" sldId="390"/>
+            <ac:spMk id="233" creationId="{00000000-0000-0000-0000-000000000000}"/>
+          </ac:spMkLst>
+        </pc:spChg>
+        <pc:spChg chg="mod">
+          <ac:chgData name="York, George W Civ USAF USAFA DF/DFEC" userId="1fb5875a-4594-4db2-80fb-f0db3de11280" providerId="ADAL" clId="{EEC52F0A-4381-4048-86DF-567F01407B4F}" dt="2022-04-12T16:51:20.264" v="135" actId="1076"/>
+          <ac:spMkLst>
+            <pc:docMk/>
+            <pc:sldMk cId="3416515774" sldId="390"/>
+            <ac:spMk id="234" creationId="{00000000-0000-0000-0000-000000000000}"/>
+          </ac:spMkLst>
+        </pc:spChg>
+        <pc:spChg chg="mod">
+          <ac:chgData name="York, George W Civ USAF USAFA DF/DFEC" userId="1fb5875a-4594-4db2-80fb-f0db3de11280" providerId="ADAL" clId="{EEC52F0A-4381-4048-86DF-567F01407B4F}" dt="2022-04-12T16:50:05.071" v="110" actId="20577"/>
+          <ac:spMkLst>
+            <pc:docMk/>
+            <pc:sldMk cId="3416515774" sldId="390"/>
+            <ac:spMk id="236" creationId="{00000000-0000-0000-0000-000000000000}"/>
+          </ac:spMkLst>
+        </pc:spChg>
+        <pc:spChg chg="mod">
+          <ac:chgData name="York, George W Civ USAF USAFA DF/DFEC" userId="1fb5875a-4594-4db2-80fb-f0db3de11280" providerId="ADAL" clId="{EEC52F0A-4381-4048-86DF-567F01407B4F}" dt="2022-04-12T16:50:56.255" v="132" actId="1076"/>
+          <ac:spMkLst>
+            <pc:docMk/>
+            <pc:sldMk cId="3416515774" sldId="390"/>
+            <ac:spMk id="238" creationId="{00000000-0000-0000-0000-000000000000}"/>
+          </ac:spMkLst>
+        </pc:spChg>
+        <pc:spChg chg="mod">
+          <ac:chgData name="York, George W Civ USAF USAFA DF/DFEC" userId="1fb5875a-4594-4db2-80fb-f0db3de11280" providerId="ADAL" clId="{EEC52F0A-4381-4048-86DF-567F01407B4F}" dt="2022-04-12T16:47:33.600" v="83" actId="1076"/>
+          <ac:spMkLst>
+            <pc:docMk/>
+            <pc:sldMk cId="3416515774" sldId="390"/>
+            <ac:spMk id="239" creationId="{00000000-0000-0000-0000-000000000000}"/>
+          </ac:spMkLst>
+        </pc:spChg>
+        <pc:spChg chg="mod ord">
+          <ac:chgData name="York, George W Civ USAF USAFA DF/DFEC" userId="1fb5875a-4594-4db2-80fb-f0db3de11280" providerId="ADAL" clId="{EEC52F0A-4381-4048-86DF-567F01407B4F}" dt="2022-04-12T17:11:21.302" v="411" actId="167"/>
+          <ac:spMkLst>
+            <pc:docMk/>
+            <pc:sldMk cId="3416515774" sldId="390"/>
+            <ac:spMk id="240" creationId="{00000000-0000-0000-0000-000000000000}"/>
+          </ac:spMkLst>
+        </pc:spChg>
+        <pc:spChg chg="mod">
+          <ac:chgData name="York, George W Civ USAF USAFA DF/DFEC" userId="1fb5875a-4594-4db2-80fb-f0db3de11280" providerId="ADAL" clId="{EEC52F0A-4381-4048-86DF-567F01407B4F}" dt="2022-04-12T16:56:50.725" v="171" actId="1076"/>
+          <ac:spMkLst>
+            <pc:docMk/>
+            <pc:sldMk cId="3416515774" sldId="390"/>
+            <ac:spMk id="242" creationId="{00000000-0000-0000-0000-000000000000}"/>
+          </ac:spMkLst>
+        </pc:spChg>
+        <pc:spChg chg="mod">
+          <ac:chgData name="York, George W Civ USAF USAFA DF/DFEC" userId="1fb5875a-4594-4db2-80fb-f0db3de11280" providerId="ADAL" clId="{EEC52F0A-4381-4048-86DF-567F01407B4F}" dt="2022-04-12T16:57:41.437" v="181" actId="1076"/>
+          <ac:spMkLst>
+            <pc:docMk/>
+            <pc:sldMk cId="3416515774" sldId="390"/>
+            <ac:spMk id="243" creationId="{00000000-0000-0000-0000-000000000000}"/>
+          </ac:spMkLst>
+        </pc:spChg>
+        <pc:spChg chg="mod">
+          <ac:chgData name="York, George W Civ USAF USAFA DF/DFEC" userId="1fb5875a-4594-4db2-80fb-f0db3de11280" providerId="ADAL" clId="{EEC52F0A-4381-4048-86DF-567F01407B4F}" dt="2022-04-12T17:02:24.349" v="256" actId="1076"/>
+          <ac:spMkLst>
+            <pc:docMk/>
+            <pc:sldMk cId="3416515774" sldId="390"/>
+            <ac:spMk id="244" creationId="{00000000-0000-0000-0000-000000000000}"/>
+          </ac:spMkLst>
+        </pc:spChg>
+        <pc:spChg chg="mod">
+          <ac:chgData name="York, George W Civ USAF USAFA DF/DFEC" userId="1fb5875a-4594-4db2-80fb-f0db3de11280" providerId="ADAL" clId="{EEC52F0A-4381-4048-86DF-567F01407B4F}" dt="2022-04-12T17:00:46.907" v="236" actId="1076"/>
+          <ac:spMkLst>
+            <pc:docMk/>
+            <pc:sldMk cId="3416515774" sldId="390"/>
+            <ac:spMk id="245" creationId="{00000000-0000-0000-0000-000000000000}"/>
+          </ac:spMkLst>
+        </pc:spChg>
+        <pc:spChg chg="mod">
+          <ac:chgData name="York, George W Civ USAF USAFA DF/DFEC" userId="1fb5875a-4594-4db2-80fb-f0db3de11280" providerId="ADAL" clId="{EEC52F0A-4381-4048-86DF-567F01407B4F}" dt="2022-04-12T17:00:12.461" v="221" actId="1076"/>
+          <ac:spMkLst>
+            <pc:docMk/>
+            <pc:sldMk cId="3416515774" sldId="390"/>
+            <ac:spMk id="246" creationId="{00000000-0000-0000-0000-000000000000}"/>
+          </ac:spMkLst>
+        </pc:spChg>
+        <pc:spChg chg="add mod">
+          <ac:chgData name="York, George W Civ USAF USAFA DF/DFEC" userId="1fb5875a-4594-4db2-80fb-f0db3de11280" providerId="ADAL" clId="{EEC52F0A-4381-4048-86DF-567F01407B4F}" dt="2022-04-12T17:00:12.461" v="221" actId="1076"/>
+          <ac:spMkLst>
+            <pc:docMk/>
+            <pc:sldMk cId="3416515774" sldId="390"/>
+            <ac:spMk id="252" creationId="{1376497A-9560-4EE7-9EFB-4C16CED348F0}"/>
+          </ac:spMkLst>
+        </pc:spChg>
+        <pc:spChg chg="add mod">
+          <ac:chgData name="York, George W Civ USAF USAFA DF/DFEC" userId="1fb5875a-4594-4db2-80fb-f0db3de11280" providerId="ADAL" clId="{EEC52F0A-4381-4048-86DF-567F01407B4F}" dt="2022-04-12T17:00:22.974" v="232" actId="20577"/>
+          <ac:spMkLst>
+            <pc:docMk/>
+            <pc:sldMk cId="3416515774" sldId="390"/>
+            <ac:spMk id="255" creationId="{84C8A656-C8C7-40DE-AB7D-AA9118210377}"/>
+          </ac:spMkLst>
+        </pc:spChg>
+        <pc:spChg chg="add mod">
+          <ac:chgData name="York, George W Civ USAF USAFA DF/DFEC" userId="1fb5875a-4594-4db2-80fb-f0db3de11280" providerId="ADAL" clId="{EEC52F0A-4381-4048-86DF-567F01407B4F}" dt="2022-04-12T17:01:01.427" v="239" actId="1076"/>
+          <ac:spMkLst>
+            <pc:docMk/>
+            <pc:sldMk cId="3416515774" sldId="390"/>
+            <ac:spMk id="259" creationId="{A1FC83DE-205A-41FC-A236-1B0ADE2ED929}"/>
+          </ac:spMkLst>
+        </pc:spChg>
+        <pc:spChg chg="add del mod">
+          <ac:chgData name="York, George W Civ USAF USAFA DF/DFEC" userId="1fb5875a-4594-4db2-80fb-f0db3de11280" providerId="ADAL" clId="{EEC52F0A-4381-4048-86DF-567F01407B4F}" dt="2022-04-12T17:06:02.383" v="316" actId="478"/>
+          <ac:spMkLst>
+            <pc:docMk/>
+            <pc:sldMk cId="3416515774" sldId="390"/>
+            <ac:spMk id="260" creationId="{D02D0D6F-A661-4625-8735-5C6BF53CB5A6}"/>
+          </ac:spMkLst>
+        </pc:spChg>
+        <pc:spChg chg="add mod ord">
+          <ac:chgData name="York, George W Civ USAF USAFA DF/DFEC" userId="1fb5875a-4594-4db2-80fb-f0db3de11280" providerId="ADAL" clId="{EEC52F0A-4381-4048-86DF-567F01407B4F}" dt="2022-04-12T17:03:55.959" v="271" actId="166"/>
+          <ac:spMkLst>
+            <pc:docMk/>
+            <pc:sldMk cId="3416515774" sldId="390"/>
+            <ac:spMk id="261" creationId="{7131B2AF-67D3-45AC-9E41-618D3B308D55}"/>
+          </ac:spMkLst>
+        </pc:spChg>
+        <pc:spChg chg="add mod ord">
+          <ac:chgData name="York, George W Civ USAF USAFA DF/DFEC" userId="1fb5875a-4594-4db2-80fb-f0db3de11280" providerId="ADAL" clId="{EEC52F0A-4381-4048-86DF-567F01407B4F}" dt="2022-04-12T17:03:51.993" v="270" actId="166"/>
+          <ac:spMkLst>
+            <pc:docMk/>
+            <pc:sldMk cId="3416515774" sldId="390"/>
+            <ac:spMk id="269" creationId="{13C5F92F-39C0-4BD8-8E64-DCDFEC0281AF}"/>
+          </ac:spMkLst>
+        </pc:spChg>
+        <pc:spChg chg="add mod">
+          <ac:chgData name="York, George W Civ USAF USAFA DF/DFEC" userId="1fb5875a-4594-4db2-80fb-f0db3de11280" providerId="ADAL" clId="{EEC52F0A-4381-4048-86DF-567F01407B4F}" dt="2022-04-12T17:04:52.460" v="298" actId="1076"/>
+          <ac:spMkLst>
+            <pc:docMk/>
+            <pc:sldMk cId="3416515774" sldId="390"/>
+            <ac:spMk id="270" creationId="{9724EDB6-00CE-4546-A289-0767AC4A71D8}"/>
+          </ac:spMkLst>
+        </pc:spChg>
+        <pc:spChg chg="add mod">
+          <ac:chgData name="York, George W Civ USAF USAFA DF/DFEC" userId="1fb5875a-4594-4db2-80fb-f0db3de11280" providerId="ADAL" clId="{EEC52F0A-4381-4048-86DF-567F01407B4F}" dt="2022-04-12T17:05:33.336" v="307" actId="14100"/>
+          <ac:spMkLst>
+            <pc:docMk/>
+            <pc:sldMk cId="3416515774" sldId="390"/>
+            <ac:spMk id="271" creationId="{4319F221-1F47-41AA-AFA2-2227A730FC76}"/>
+          </ac:spMkLst>
+        </pc:spChg>
+        <pc:spChg chg="add mod">
+          <ac:chgData name="York, George W Civ USAF USAFA DF/DFEC" userId="1fb5875a-4594-4db2-80fb-f0db3de11280" providerId="ADAL" clId="{EEC52F0A-4381-4048-86DF-567F01407B4F}" dt="2022-04-12T17:06:56.386" v="327" actId="1076"/>
+          <ac:spMkLst>
+            <pc:docMk/>
+            <pc:sldMk cId="3416515774" sldId="390"/>
+            <ac:spMk id="274" creationId="{8A9DF16F-EEE6-4A75-A428-1E812E89C467}"/>
+          </ac:spMkLst>
+        </pc:spChg>
+        <pc:spChg chg="add mod">
+          <ac:chgData name="York, George W Civ USAF USAFA DF/DFEC" userId="1fb5875a-4594-4db2-80fb-f0db3de11280" providerId="ADAL" clId="{EEC52F0A-4381-4048-86DF-567F01407B4F}" dt="2022-04-12T17:07:08.915" v="330" actId="20577"/>
+          <ac:spMkLst>
+            <pc:docMk/>
+            <pc:sldMk cId="3416515774" sldId="390"/>
+            <ac:spMk id="277" creationId="{CC3058E3-4CCC-4C4B-A9DC-A5BA0BFFBE04}"/>
+          </ac:spMkLst>
+        </pc:spChg>
+        <pc:spChg chg="add mod">
+          <ac:chgData name="York, George W Civ USAF USAFA DF/DFEC" userId="1fb5875a-4594-4db2-80fb-f0db3de11280" providerId="ADAL" clId="{EEC52F0A-4381-4048-86DF-567F01407B4F}" dt="2022-04-12T17:08:21.131" v="375" actId="1076"/>
+          <ac:spMkLst>
+            <pc:docMk/>
+            <pc:sldMk cId="3416515774" sldId="390"/>
+            <ac:spMk id="278" creationId="{C51B761A-BE9D-42B1-8BF1-510A803B21A8}"/>
+          </ac:spMkLst>
+        </pc:spChg>
+        <pc:spChg chg="add mod">
+          <ac:chgData name="York, George W Civ USAF USAFA DF/DFEC" userId="1fb5875a-4594-4db2-80fb-f0db3de11280" providerId="ADAL" clId="{EEC52F0A-4381-4048-86DF-567F01407B4F}" dt="2022-04-12T17:08:58.731" v="394" actId="1076"/>
+          <ac:spMkLst>
+            <pc:docMk/>
+            <pc:sldMk cId="3416515774" sldId="390"/>
+            <ac:spMk id="279" creationId="{C97CEF08-EB4D-42CC-A5E7-08D66724C10A}"/>
+          </ac:spMkLst>
+        </pc:spChg>
+        <pc:spChg chg="add mod">
+          <ac:chgData name="York, George W Civ USAF USAFA DF/DFEC" userId="1fb5875a-4594-4db2-80fb-f0db3de11280" providerId="ADAL" clId="{EEC52F0A-4381-4048-86DF-567F01407B4F}" dt="2022-04-12T17:09:19.858" v="400" actId="1076"/>
+          <ac:spMkLst>
+            <pc:docMk/>
+            <pc:sldMk cId="3416515774" sldId="390"/>
+            <ac:spMk id="281" creationId="{0AED3B7C-1EAE-424B-AC72-3C2FB1CA4A32}"/>
+          </ac:spMkLst>
+        </pc:spChg>
+        <pc:spChg chg="add mod">
+          <ac:chgData name="York, George W Civ USAF USAFA DF/DFEC" userId="1fb5875a-4594-4db2-80fb-f0db3de11280" providerId="ADAL" clId="{EEC52F0A-4381-4048-86DF-567F01407B4F}" dt="2022-04-12T17:10:39.702" v="410" actId="1076"/>
+          <ac:spMkLst>
+            <pc:docMk/>
+            <pc:sldMk cId="3416515774" sldId="390"/>
+            <ac:spMk id="282" creationId="{CE927B96-20D9-4993-A13E-86860A14200E}"/>
+          </ac:spMkLst>
+        </pc:spChg>
+        <pc:picChg chg="del mod">
+          <ac:chgData name="York, George W Civ USAF USAFA DF/DFEC" userId="1fb5875a-4594-4db2-80fb-f0db3de11280" providerId="ADAL" clId="{EEC52F0A-4381-4048-86DF-567F01407B4F}" dt="2022-04-12T16:43:55.084" v="50" actId="478"/>
+          <ac:picMkLst>
+            <pc:docMk/>
+            <pc:sldMk cId="3416515774" sldId="390"/>
+            <ac:picMk id="11" creationId="{00000000-0000-0000-0000-000000000000}"/>
+          </ac:picMkLst>
+        </pc:picChg>
+        <pc:picChg chg="add mod">
+          <ac:chgData name="York, George W Civ USAF USAFA DF/DFEC" userId="1fb5875a-4594-4db2-80fb-f0db3de11280" providerId="ADAL" clId="{EEC52F0A-4381-4048-86DF-567F01407B4F}" dt="2022-04-12T16:47:22.254" v="81" actId="1076"/>
+          <ac:picMkLst>
+            <pc:docMk/>
+            <pc:sldMk cId="3416515774" sldId="390"/>
+            <ac:picMk id="173" creationId="{151598FE-D1A7-4B97-8B28-CDC6B36BD066}"/>
+          </ac:picMkLst>
+        </pc:picChg>
+        <pc:picChg chg="add mod">
+          <ac:chgData name="York, George W Civ USAF USAFA DF/DFEC" userId="1fb5875a-4594-4db2-80fb-f0db3de11280" providerId="ADAL" clId="{EEC52F0A-4381-4048-86DF-567F01407B4F}" dt="2022-04-12T16:55:53.920" v="164" actId="1076"/>
+          <ac:picMkLst>
+            <pc:docMk/>
+            <pc:sldMk cId="3416515774" sldId="390"/>
+            <ac:picMk id="174" creationId="{F93A9617-CC80-4CFB-817B-566AD7451367}"/>
+          </ac:picMkLst>
+        </pc:picChg>
+        <pc:picChg chg="add mod ord">
+          <ac:chgData name="York, George W Civ USAF USAFA DF/DFEC" userId="1fb5875a-4594-4db2-80fb-f0db3de11280" providerId="ADAL" clId="{EEC52F0A-4381-4048-86DF-567F01407B4F}" dt="2022-04-12T17:11:28.554" v="412" actId="167"/>
+          <ac:picMkLst>
+            <pc:docMk/>
+            <pc:sldMk cId="3416515774" sldId="390"/>
+            <ac:picMk id="175" creationId="{35D46210-12ED-49C2-857C-0F4CBB8FC5AE}"/>
+          </ac:picMkLst>
+        </pc:picChg>
+        <pc:picChg chg="add mod">
+          <ac:chgData name="York, George W Civ USAF USAFA DF/DFEC" userId="1fb5875a-4594-4db2-80fb-f0db3de11280" providerId="ADAL" clId="{EEC52F0A-4381-4048-86DF-567F01407B4F}" dt="2022-04-12T17:05:38.096" v="309" actId="1076"/>
+          <ac:picMkLst>
+            <pc:docMk/>
+            <pc:sldMk cId="3416515774" sldId="390"/>
+            <ac:picMk id="176" creationId="{309D3B59-9DF6-4633-B1F4-1967147954B3}"/>
+          </ac:picMkLst>
+        </pc:picChg>
+        <pc:cxnChg chg="add">
+          <ac:chgData name="York, George W Civ USAF USAFA DF/DFEC" userId="1fb5875a-4594-4db2-80fb-f0db3de11280" providerId="ADAL" clId="{EEC52F0A-4381-4048-86DF-567F01407B4F}" dt="2022-04-12T16:56:43.437" v="169" actId="11529"/>
+          <ac:cxnSpMkLst>
+            <pc:docMk/>
+            <pc:sldMk cId="3416515774" sldId="390"/>
+            <ac:cxnSpMk id="20" creationId="{E50453FF-1B4B-4FC7-81CB-9EB7295778EC}"/>
+          </ac:cxnSpMkLst>
+        </pc:cxnChg>
+        <pc:cxnChg chg="add">
+          <ac:chgData name="York, George W Civ USAF USAFA DF/DFEC" userId="1fb5875a-4594-4db2-80fb-f0db3de11280" providerId="ADAL" clId="{EEC52F0A-4381-4048-86DF-567F01407B4F}" dt="2022-04-12T17:06:21.713" v="317" actId="11529"/>
+          <ac:cxnSpMkLst>
+            <pc:docMk/>
+            <pc:sldMk cId="3416515774" sldId="390"/>
+            <ac:cxnSpMk id="24" creationId="{90E45FB6-7D91-4C9C-97E2-E4A8FAA6A2D6}"/>
+          </ac:cxnSpMkLst>
+        </pc:cxnChg>
+        <pc:cxnChg chg="add mod">
+          <ac:chgData name="York, George W Civ USAF USAFA DF/DFEC" userId="1fb5875a-4594-4db2-80fb-f0db3de11280" providerId="ADAL" clId="{EEC52F0A-4381-4048-86DF-567F01407B4F}" dt="2022-04-12T16:47:08.878" v="80" actId="14100"/>
+          <ac:cxnSpMkLst>
+            <pc:docMk/>
+            <pc:sldMk cId="3416515774" sldId="390"/>
+            <ac:cxnSpMk id="177" creationId="{ABBCFCC4-4E13-44DA-9522-144B721811EB}"/>
+          </ac:cxnSpMkLst>
+        </pc:cxnChg>
+        <pc:cxnChg chg="add mod">
+          <ac:chgData name="York, George W Civ USAF USAFA DF/DFEC" userId="1fb5875a-4594-4db2-80fb-f0db3de11280" providerId="ADAL" clId="{EEC52F0A-4381-4048-86DF-567F01407B4F}" dt="2022-04-12T16:47:08.878" v="80" actId="14100"/>
+          <ac:cxnSpMkLst>
+            <pc:docMk/>
+            <pc:sldMk cId="3416515774" sldId="390"/>
+            <ac:cxnSpMk id="178" creationId="{9021B01D-FBC1-4DAA-B6CF-B7393A1B8005}"/>
+          </ac:cxnSpMkLst>
+        </pc:cxnChg>
+        <pc:cxnChg chg="add mod">
+          <ac:chgData name="York, George W Civ USAF USAFA DF/DFEC" userId="1fb5875a-4594-4db2-80fb-f0db3de11280" providerId="ADAL" clId="{EEC52F0A-4381-4048-86DF-567F01407B4F}" dt="2022-04-12T16:48:08.547" v="89" actId="1076"/>
+          <ac:cxnSpMkLst>
+            <pc:docMk/>
+            <pc:sldMk cId="3416515774" sldId="390"/>
+            <ac:cxnSpMk id="188" creationId="{5B3B90D3-8EB5-40DD-B505-BF6ADB3E648B}"/>
+          </ac:cxnSpMkLst>
+        </pc:cxnChg>
+        <pc:cxnChg chg="add mod">
+          <ac:chgData name="York, George W Civ USAF USAFA DF/DFEC" userId="1fb5875a-4594-4db2-80fb-f0db3de11280" providerId="ADAL" clId="{EEC52F0A-4381-4048-86DF-567F01407B4F}" dt="2022-04-12T16:48:08.547" v="89" actId="1076"/>
+          <ac:cxnSpMkLst>
+            <pc:docMk/>
+            <pc:sldMk cId="3416515774" sldId="390"/>
+            <ac:cxnSpMk id="189" creationId="{A1658AA4-5938-41A5-998E-1A59B0B0F677}"/>
+          </ac:cxnSpMkLst>
+        </pc:cxnChg>
+        <pc:cxnChg chg="add mod">
+          <ac:chgData name="York, George W Civ USAF USAFA DF/DFEC" userId="1fb5875a-4594-4db2-80fb-f0db3de11280" providerId="ADAL" clId="{EEC52F0A-4381-4048-86DF-567F01407B4F}" dt="2022-04-12T16:48:15.541" v="91" actId="1076"/>
+          <ac:cxnSpMkLst>
+            <pc:docMk/>
+            <pc:sldMk cId="3416515774" sldId="390"/>
+            <ac:cxnSpMk id="190" creationId="{A8EC53DC-9901-4285-8F32-444CD2D4F930}"/>
+          </ac:cxnSpMkLst>
+        </pc:cxnChg>
+        <pc:cxnChg chg="add mod">
+          <ac:chgData name="York, George W Civ USAF USAFA DF/DFEC" userId="1fb5875a-4594-4db2-80fb-f0db3de11280" providerId="ADAL" clId="{EEC52F0A-4381-4048-86DF-567F01407B4F}" dt="2022-04-12T16:48:15.541" v="91" actId="1076"/>
+          <ac:cxnSpMkLst>
+            <pc:docMk/>
+            <pc:sldMk cId="3416515774" sldId="390"/>
+            <ac:cxnSpMk id="191" creationId="{8A8288DF-40FC-4DD3-AD11-3352D2876B3D}"/>
+          </ac:cxnSpMkLst>
+        </pc:cxnChg>
+        <pc:cxnChg chg="add mod">
+          <ac:chgData name="York, George W Civ USAF USAFA DF/DFEC" userId="1fb5875a-4594-4db2-80fb-f0db3de11280" providerId="ADAL" clId="{EEC52F0A-4381-4048-86DF-567F01407B4F}" dt="2022-04-12T16:49:06.205" v="98" actId="1076"/>
+          <ac:cxnSpMkLst>
+            <pc:docMk/>
+            <pc:sldMk cId="3416515774" sldId="390"/>
+            <ac:cxnSpMk id="192" creationId="{F538AB58-7E6A-409E-AFEE-A55B074F75CE}"/>
+          </ac:cxnSpMkLst>
+        </pc:cxnChg>
+        <pc:cxnChg chg="add mod">
+          <ac:chgData name="York, George W Civ USAF USAFA DF/DFEC" userId="1fb5875a-4594-4db2-80fb-f0db3de11280" providerId="ADAL" clId="{EEC52F0A-4381-4048-86DF-567F01407B4F}" dt="2022-04-12T16:49:06.205" v="98" actId="1076"/>
+          <ac:cxnSpMkLst>
+            <pc:docMk/>
+            <pc:sldMk cId="3416515774" sldId="390"/>
+            <ac:cxnSpMk id="193" creationId="{2A5BAA3F-7E42-4746-916B-E1DAA325B92A}"/>
+          </ac:cxnSpMkLst>
+        </pc:cxnChg>
+        <pc:cxnChg chg="add mod">
+          <ac:chgData name="York, George W Civ USAF USAFA DF/DFEC" userId="1fb5875a-4594-4db2-80fb-f0db3de11280" providerId="ADAL" clId="{EEC52F0A-4381-4048-86DF-567F01407B4F}" dt="2022-04-12T16:49:20.815" v="100" actId="1076"/>
+          <ac:cxnSpMkLst>
+            <pc:docMk/>
+            <pc:sldMk cId="3416515774" sldId="390"/>
+            <ac:cxnSpMk id="195" creationId="{684D3A98-35E8-40A0-B838-7414D05864B1}"/>
+          </ac:cxnSpMkLst>
+        </pc:cxnChg>
+        <pc:cxnChg chg="add mod">
+          <ac:chgData name="York, George W Civ USAF USAFA DF/DFEC" userId="1fb5875a-4594-4db2-80fb-f0db3de11280" providerId="ADAL" clId="{EEC52F0A-4381-4048-86DF-567F01407B4F}" dt="2022-04-12T16:49:24.895" v="101" actId="14100"/>
+          <ac:cxnSpMkLst>
+            <pc:docMk/>
+            <pc:sldMk cId="3416515774" sldId="390"/>
+            <ac:cxnSpMk id="196" creationId="{2A2C23A1-E27E-4A23-B44B-3F78B32AB3ED}"/>
+          </ac:cxnSpMkLst>
+        </pc:cxnChg>
+        <pc:cxnChg chg="add mod">
+          <ac:chgData name="York, George W Civ USAF USAFA DF/DFEC" userId="1fb5875a-4594-4db2-80fb-f0db3de11280" providerId="ADAL" clId="{EEC52F0A-4381-4048-86DF-567F01407B4F}" dt="2022-04-12T16:51:13.843" v="134" actId="1076"/>
+          <ac:cxnSpMkLst>
+            <pc:docMk/>
+            <pc:sldMk cId="3416515774" sldId="390"/>
+            <ac:cxnSpMk id="198" creationId="{031124A9-7323-4143-BE5A-12A87D4746E6}"/>
+          </ac:cxnSpMkLst>
+        </pc:cxnChg>
+        <pc:cxnChg chg="add mod">
+          <ac:chgData name="York, George W Civ USAF USAFA DF/DFEC" userId="1fb5875a-4594-4db2-80fb-f0db3de11280" providerId="ADAL" clId="{EEC52F0A-4381-4048-86DF-567F01407B4F}" dt="2022-04-12T16:51:13.843" v="134" actId="1076"/>
+          <ac:cxnSpMkLst>
+            <pc:docMk/>
+            <pc:sldMk cId="3416515774" sldId="390"/>
+            <ac:cxnSpMk id="199" creationId="{83771592-B144-42DE-87E7-ADA230526AFE}"/>
+          </ac:cxnSpMkLst>
+        </pc:cxnChg>
+        <pc:cxnChg chg="add del mod">
+          <ac:chgData name="York, George W Civ USAF USAFA DF/DFEC" userId="1fb5875a-4594-4db2-80fb-f0db3de11280" providerId="ADAL" clId="{EEC52F0A-4381-4048-86DF-567F01407B4F}" dt="2022-04-12T16:57:30.672" v="178" actId="21"/>
+          <ac:cxnSpMkLst>
+            <pc:docMk/>
+            <pc:sldMk cId="3416515774" sldId="390"/>
+            <ac:cxnSpMk id="202" creationId="{BEE1951F-1E69-4181-835F-B354D0A9C7E7}"/>
+          </ac:cxnSpMkLst>
+        </pc:cxnChg>
+        <pc:cxnChg chg="add del mod">
+          <ac:chgData name="York, George W Civ USAF USAFA DF/DFEC" userId="1fb5875a-4594-4db2-80fb-f0db3de11280" providerId="ADAL" clId="{EEC52F0A-4381-4048-86DF-567F01407B4F}" dt="2022-04-12T16:57:30.672" v="178" actId="21"/>
+          <ac:cxnSpMkLst>
+            <pc:docMk/>
+            <pc:sldMk cId="3416515774" sldId="390"/>
+            <ac:cxnSpMk id="203" creationId="{F1E408EB-4CDB-47DA-92C0-869CF729CCE0}"/>
+          </ac:cxnSpMkLst>
+        </pc:cxnChg>
+        <pc:cxnChg chg="add mod">
+          <ac:chgData name="York, George W Civ USAF USAFA DF/DFEC" userId="1fb5875a-4594-4db2-80fb-f0db3de11280" providerId="ADAL" clId="{EEC52F0A-4381-4048-86DF-567F01407B4F}" dt="2022-04-12T16:55:46.265" v="162" actId="1076"/>
+          <ac:cxnSpMkLst>
+            <pc:docMk/>
+            <pc:sldMk cId="3416515774" sldId="390"/>
+            <ac:cxnSpMk id="204" creationId="{F5BB9C36-B831-4207-B2DE-D828E7F21520}"/>
+          </ac:cxnSpMkLst>
+        </pc:cxnChg>
+        <pc:cxnChg chg="add mod">
+          <ac:chgData name="York, George W Civ USAF USAFA DF/DFEC" userId="1fb5875a-4594-4db2-80fb-f0db3de11280" providerId="ADAL" clId="{EEC52F0A-4381-4048-86DF-567F01407B4F}" dt="2022-04-12T16:56:50.725" v="171" actId="1076"/>
+          <ac:cxnSpMkLst>
+            <pc:docMk/>
+            <pc:sldMk cId="3416515774" sldId="390"/>
+            <ac:cxnSpMk id="205" creationId="{F7858DA8-6DE5-4DB4-A24D-B5D436577FEA}"/>
+          </ac:cxnSpMkLst>
+        </pc:cxnChg>
+        <pc:cxnChg chg="add mod">
+          <ac:chgData name="York, George W Civ USAF USAFA DF/DFEC" userId="1fb5875a-4594-4db2-80fb-f0db3de11280" providerId="ADAL" clId="{EEC52F0A-4381-4048-86DF-567F01407B4F}" dt="2022-04-12T16:56:50.725" v="171" actId="1076"/>
+          <ac:cxnSpMkLst>
+            <pc:docMk/>
+            <pc:sldMk cId="3416515774" sldId="390"/>
+            <ac:cxnSpMk id="206" creationId="{376E4B03-412B-4524-BBCA-3D628F76F7CB}"/>
+          </ac:cxnSpMkLst>
+        </pc:cxnChg>
+        <pc:cxnChg chg="add mod">
+          <ac:chgData name="York, George W Civ USAF USAFA DF/DFEC" userId="1fb5875a-4594-4db2-80fb-f0db3de11280" providerId="ADAL" clId="{EEC52F0A-4381-4048-86DF-567F01407B4F}" dt="2022-04-12T16:57:38.516" v="180" actId="1076"/>
+          <ac:cxnSpMkLst>
+            <pc:docMk/>
+            <pc:sldMk cId="3416515774" sldId="390"/>
+            <ac:cxnSpMk id="208" creationId="{814B894D-1371-4C9B-9F35-4A894E3237C7}"/>
+          </ac:cxnSpMkLst>
+        </pc:cxnChg>
+        <pc:cxnChg chg="add mod">
+          <ac:chgData name="York, George W Civ USAF USAFA DF/DFEC" userId="1fb5875a-4594-4db2-80fb-f0db3de11280" providerId="ADAL" clId="{EEC52F0A-4381-4048-86DF-567F01407B4F}" dt="2022-04-12T16:57:38.516" v="180" actId="1076"/>
+          <ac:cxnSpMkLst>
+            <pc:docMk/>
+            <pc:sldMk cId="3416515774" sldId="390"/>
+            <ac:cxnSpMk id="209" creationId="{E1BC25F6-43D4-435D-9C5C-061F13358D73}"/>
+          </ac:cxnSpMkLst>
+        </pc:cxnChg>
+        <pc:cxnChg chg="add mod">
+          <ac:chgData name="York, George W Civ USAF USAFA DF/DFEC" userId="1fb5875a-4594-4db2-80fb-f0db3de11280" providerId="ADAL" clId="{EEC52F0A-4381-4048-86DF-567F01407B4F}" dt="2022-04-12T17:00:12.461" v="221" actId="1076"/>
+          <ac:cxnSpMkLst>
+            <pc:docMk/>
+            <pc:sldMk cId="3416515774" sldId="390"/>
+            <ac:cxnSpMk id="253" creationId="{67066F75-D07B-4B1C-9906-53F3C2B26E8D}"/>
+          </ac:cxnSpMkLst>
+        </pc:cxnChg>
+        <pc:cxnChg chg="add mod">
+          <ac:chgData name="York, George W Civ USAF USAFA DF/DFEC" userId="1fb5875a-4594-4db2-80fb-f0db3de11280" providerId="ADAL" clId="{EEC52F0A-4381-4048-86DF-567F01407B4F}" dt="2022-04-12T17:00:12.461" v="221" actId="1076"/>
+          <ac:cxnSpMkLst>
+            <pc:docMk/>
+            <pc:sldMk cId="3416515774" sldId="390"/>
+            <ac:cxnSpMk id="254" creationId="{DD2A6E5C-C174-4F6A-A36A-EE940B99CC22}"/>
+          </ac:cxnSpMkLst>
+        </pc:cxnChg>
+        <pc:cxnChg chg="add mod">
+          <ac:chgData name="York, George W Civ USAF USAFA DF/DFEC" userId="1fb5875a-4594-4db2-80fb-f0db3de11280" providerId="ADAL" clId="{EEC52F0A-4381-4048-86DF-567F01407B4F}" dt="2022-04-12T17:00:12.461" v="221" actId="1076"/>
+          <ac:cxnSpMkLst>
+            <pc:docMk/>
+            <pc:sldMk cId="3416515774" sldId="390"/>
+            <ac:cxnSpMk id="256" creationId="{46B85E2F-480B-4C7C-873C-8F153C2B1A36}"/>
+          </ac:cxnSpMkLst>
+        </pc:cxnChg>
+        <pc:cxnChg chg="add mod">
+          <ac:chgData name="York, George W Civ USAF USAFA DF/DFEC" userId="1fb5875a-4594-4db2-80fb-f0db3de11280" providerId="ADAL" clId="{EEC52F0A-4381-4048-86DF-567F01407B4F}" dt="2022-04-12T17:00:12.461" v="221" actId="1076"/>
+          <ac:cxnSpMkLst>
+            <pc:docMk/>
+            <pc:sldMk cId="3416515774" sldId="390"/>
+            <ac:cxnSpMk id="257" creationId="{3E9B85C2-6F2E-4E62-ABAE-69285E45E9EE}"/>
+          </ac:cxnSpMkLst>
+        </pc:cxnChg>
+        <pc:cxnChg chg="add mod">
+          <ac:chgData name="York, George W Civ USAF USAFA DF/DFEC" userId="1fb5875a-4594-4db2-80fb-f0db3de11280" providerId="ADAL" clId="{EEC52F0A-4381-4048-86DF-567F01407B4F}" dt="2022-04-12T17:00:43.974" v="235" actId="1076"/>
+          <ac:cxnSpMkLst>
+            <pc:docMk/>
+            <pc:sldMk cId="3416515774" sldId="390"/>
+            <ac:cxnSpMk id="258" creationId="{33E58C1D-C7EA-4DE2-B3CE-028CE66152F7}"/>
+          </ac:cxnSpMkLst>
+        </pc:cxnChg>
+        <pc:cxnChg chg="add mod">
+          <ac:chgData name="York, George W Civ USAF USAFA DF/DFEC" userId="1fb5875a-4594-4db2-80fb-f0db3de11280" providerId="ADAL" clId="{EEC52F0A-4381-4048-86DF-567F01407B4F}" dt="2022-04-12T17:02:10.016" v="253" actId="1076"/>
+          <ac:cxnSpMkLst>
+            <pc:docMk/>
+            <pc:sldMk cId="3416515774" sldId="390"/>
+            <ac:cxnSpMk id="262" creationId="{23FBC77B-29BC-42D8-961F-11311443649A}"/>
+          </ac:cxnSpMkLst>
+        </pc:cxnChg>
+        <pc:cxnChg chg="add mod">
+          <ac:chgData name="York, George W Civ USAF USAFA DF/DFEC" userId="1fb5875a-4594-4db2-80fb-f0db3de11280" providerId="ADAL" clId="{EEC52F0A-4381-4048-86DF-567F01407B4F}" dt="2022-04-12T17:02:10.016" v="253" actId="1076"/>
+          <ac:cxnSpMkLst>
+            <pc:docMk/>
+            <pc:sldMk cId="3416515774" sldId="390"/>
+            <ac:cxnSpMk id="263" creationId="{3E491593-4CC4-4BEE-B6B8-9FB853B2D748}"/>
+          </ac:cxnSpMkLst>
+        </pc:cxnChg>
+        <pc:cxnChg chg="add mod">
+          <ac:chgData name="York, George W Civ USAF USAFA DF/DFEC" userId="1fb5875a-4594-4db2-80fb-f0db3de11280" providerId="ADAL" clId="{EEC52F0A-4381-4048-86DF-567F01407B4F}" dt="2022-04-12T17:02:21.481" v="255" actId="1076"/>
+          <ac:cxnSpMkLst>
+            <pc:docMk/>
+            <pc:sldMk cId="3416515774" sldId="390"/>
+            <ac:cxnSpMk id="264" creationId="{ED1A6045-CEF1-4535-A022-56A97BE2BA5F}"/>
+          </ac:cxnSpMkLst>
+        </pc:cxnChg>
+        <pc:cxnChg chg="add mod">
+          <ac:chgData name="York, George W Civ USAF USAFA DF/DFEC" userId="1fb5875a-4594-4db2-80fb-f0db3de11280" providerId="ADAL" clId="{EEC52F0A-4381-4048-86DF-567F01407B4F}" dt="2022-04-12T17:02:49.170" v="259" actId="1076"/>
+          <ac:cxnSpMkLst>
+            <pc:docMk/>
+            <pc:sldMk cId="3416515774" sldId="390"/>
+            <ac:cxnSpMk id="265" creationId="{D8B576AF-AC5D-4AD3-B15E-D1FC7172C009}"/>
+          </ac:cxnSpMkLst>
+        </pc:cxnChg>
+        <pc:cxnChg chg="add del mod">
+          <ac:chgData name="York, George W Civ USAF USAFA DF/DFEC" userId="1fb5875a-4594-4db2-80fb-f0db3de11280" providerId="ADAL" clId="{EEC52F0A-4381-4048-86DF-567F01407B4F}" dt="2022-04-12T17:02:57.889" v="261" actId="478"/>
+          <ac:cxnSpMkLst>
+            <pc:docMk/>
+            <pc:sldMk cId="3416515774" sldId="390"/>
+            <ac:cxnSpMk id="266" creationId="{0C62C070-C46D-4560-948F-748BC4F12719}"/>
+          </ac:cxnSpMkLst>
+        </pc:cxnChg>
+        <pc:cxnChg chg="add mod">
+          <ac:chgData name="York, George W Civ USAF USAFA DF/DFEC" userId="1fb5875a-4594-4db2-80fb-f0db3de11280" providerId="ADAL" clId="{EEC52F0A-4381-4048-86DF-567F01407B4F}" dt="2022-04-12T17:03:15.954" v="263" actId="1076"/>
+          <ac:cxnSpMkLst>
+            <pc:docMk/>
+            <pc:sldMk cId="3416515774" sldId="390"/>
+            <ac:cxnSpMk id="267" creationId="{BDDF9C5F-F23F-4C01-89D6-8465ED5F4EC2}"/>
+          </ac:cxnSpMkLst>
+        </pc:cxnChg>
+        <pc:cxnChg chg="add mod">
+          <ac:chgData name="York, George W Civ USAF USAFA DF/DFEC" userId="1fb5875a-4594-4db2-80fb-f0db3de11280" providerId="ADAL" clId="{EEC52F0A-4381-4048-86DF-567F01407B4F}" dt="2022-04-12T17:03:19.455" v="264" actId="14100"/>
+          <ac:cxnSpMkLst>
+            <pc:docMk/>
+            <pc:sldMk cId="3416515774" sldId="390"/>
+            <ac:cxnSpMk id="268" creationId="{7DB564A6-E323-4A89-A444-FB607BCFC7C2}"/>
+          </ac:cxnSpMkLst>
+        </pc:cxnChg>
+        <pc:cxnChg chg="add mod">
+          <ac:chgData name="York, George W Civ USAF USAFA DF/DFEC" userId="1fb5875a-4594-4db2-80fb-f0db3de11280" providerId="ADAL" clId="{EEC52F0A-4381-4048-86DF-567F01407B4F}" dt="2022-04-12T17:05:18.146" v="302" actId="1076"/>
+          <ac:cxnSpMkLst>
+            <pc:docMk/>
+            <pc:sldMk cId="3416515774" sldId="390"/>
+            <ac:cxnSpMk id="272" creationId="{CF6B4A98-9FB8-4D0F-8445-1DF71E87735B}"/>
+          </ac:cxnSpMkLst>
+        </pc:cxnChg>
+        <pc:cxnChg chg="add mod">
+          <ac:chgData name="York, George W Civ USAF USAFA DF/DFEC" userId="1fb5875a-4594-4db2-80fb-f0db3de11280" providerId="ADAL" clId="{EEC52F0A-4381-4048-86DF-567F01407B4F}" dt="2022-04-12T17:05:18.146" v="302" actId="1076"/>
+          <ac:cxnSpMkLst>
+            <pc:docMk/>
+            <pc:sldMk cId="3416515774" sldId="390"/>
+            <ac:cxnSpMk id="273" creationId="{7CB87F36-B6E4-4D38-B10E-CE262E161CC4}"/>
+          </ac:cxnSpMkLst>
+        </pc:cxnChg>
+        <pc:cxnChg chg="add mod">
+          <ac:chgData name="York, George W Civ USAF USAFA DF/DFEC" userId="1fb5875a-4594-4db2-80fb-f0db3de11280" providerId="ADAL" clId="{EEC52F0A-4381-4048-86DF-567F01407B4F}" dt="2022-04-12T17:06:43.474" v="322" actId="1076"/>
+          <ac:cxnSpMkLst>
+            <pc:docMk/>
+            <pc:sldMk cId="3416515774" sldId="390"/>
+            <ac:cxnSpMk id="275" creationId="{84841EFD-7CA7-495B-885A-6C1B3CE99688}"/>
+          </ac:cxnSpMkLst>
+        </pc:cxnChg>
+        <pc:cxnChg chg="add mod">
+          <ac:chgData name="York, George W Civ USAF USAFA DF/DFEC" userId="1fb5875a-4594-4db2-80fb-f0db3de11280" providerId="ADAL" clId="{EEC52F0A-4381-4048-86DF-567F01407B4F}" dt="2022-04-12T17:07:13.238" v="331" actId="14100"/>
+          <ac:cxnSpMkLst>
+            <pc:docMk/>
+            <pc:sldMk cId="3416515774" sldId="390"/>
+            <ac:cxnSpMk id="276" creationId="{8F9CEC0D-4838-463F-9E9B-F3D646D1FEF3}"/>
+          </ac:cxnSpMkLst>
+        </pc:cxnChg>
+        <pc:cxnChg chg="add mod">
+          <ac:chgData name="York, George W Civ USAF USAFA DF/DFEC" userId="1fb5875a-4594-4db2-80fb-f0db3de11280" providerId="ADAL" clId="{EEC52F0A-4381-4048-86DF-567F01407B4F}" dt="2022-04-12T17:09:01.999" v="395" actId="14100"/>
+          <ac:cxnSpMkLst>
+            <pc:docMk/>
+            <pc:sldMk cId="3416515774" sldId="390"/>
+            <ac:cxnSpMk id="280" creationId="{19FF6B6C-8C23-4740-B7B6-FA9F9F90BE47}"/>
+          </ac:cxnSpMkLst>
+        </pc:cxnChg>
+      </pc:sldChg>
+    </pc:docChg>
+  </pc:docChgLst>
+</pc:chgInfo>
+</file>
+
 <file path=ppt/handoutMasters/handoutMaster1.xml><?xml version="1.0" encoding="utf-8"?>
 <p:handoutMaster xmlns:a="http://schemas.openxmlformats.org/drawingml/2006/main" xmlns:r="http://schemas.openxmlformats.org/officeDocument/2006/relationships" xmlns:p="http://schemas.openxmlformats.org/presentationml/2006/main">
   <p:cSld>
@@ -1277,7 +2090,7 @@
                 </a:spcAft>
                 <a:defRPr/>
               </a:pPr>
-              <a:t>6 April 2022</a:t>
+              <a:t>12 April 2022</a:t>
             </a:fld>
             <a:endParaRPr lang="en-US" sz="1800">
               <a:solidFill>
@@ -1521,7 +2334,7 @@
                 </a:spcAft>
                 <a:defRPr/>
               </a:pPr>
-              <a:t>6 April 2022</a:t>
+              <a:t>12 April 2022</a:t>
             </a:fld>
             <a:endParaRPr lang="en-US" sz="1800">
               <a:solidFill>
@@ -1734,7 +2547,7 @@
                 </a:spcAft>
                 <a:defRPr/>
               </a:pPr>
-              <a:t>6 April 2022</a:t>
+              <a:t>12 April 2022</a:t>
             </a:fld>
             <a:endParaRPr lang="en-US" sz="1800">
               <a:solidFill>
@@ -1962,7 +2775,7 @@
                 </a:spcAft>
                 <a:defRPr/>
               </a:pPr>
-              <a:t>6 April 2022</a:t>
+              <a:t>12 April 2022</a:t>
             </a:fld>
             <a:endParaRPr lang="en-US" sz="1800">
               <a:solidFill>
@@ -2219,7 +3032,7 @@
                 </a:spcAft>
                 <a:defRPr/>
               </a:pPr>
-              <a:t>6 April 2022</a:t>
+              <a:t>12 April 2022</a:t>
             </a:fld>
             <a:endParaRPr lang="en-US" sz="1800">
               <a:solidFill>
@@ -2570,7 +3383,7 @@
                 </a:spcAft>
                 <a:defRPr/>
               </a:pPr>
-              <a:t>6 April 2022</a:t>
+              <a:t>12 April 2022</a:t>
             </a:fld>
             <a:endParaRPr lang="en-US" sz="1800">
               <a:solidFill>
@@ -3060,7 +3873,7 @@
                 </a:spcAft>
                 <a:defRPr/>
               </a:pPr>
-              <a:t>6 April 2022</a:t>
+              <a:t>12 April 2022</a:t>
             </a:fld>
             <a:endParaRPr lang="en-US" sz="1800">
               <a:solidFill>
@@ -3243,7 +4056,7 @@
                 </a:spcAft>
                 <a:defRPr/>
               </a:pPr>
-              <a:t>6 April 2022</a:t>
+              <a:t>12 April 2022</a:t>
             </a:fld>
             <a:endParaRPr lang="en-US" sz="1800">
               <a:solidFill>
@@ -3404,7 +4217,7 @@
                 </a:spcAft>
                 <a:defRPr/>
               </a:pPr>
-              <a:t>6 April 2022</a:t>
+              <a:t>12 April 2022</a:t>
             </a:fld>
             <a:endParaRPr lang="en-US" sz="1800">
               <a:solidFill>
@@ -3745,7 +4558,7 @@
                 </a:spcAft>
                 <a:defRPr/>
               </a:pPr>
-              <a:t>6 April 2022</a:t>
+              <a:t>12 April 2022</a:t>
             </a:fld>
             <a:endParaRPr lang="en-US" sz="1800">
               <a:solidFill>
@@ -4064,7 +4877,7 @@
                 </a:spcAft>
                 <a:defRPr/>
               </a:pPr>
-              <a:t>6 April 2022</a:t>
+              <a:t>12 April 2022</a:t>
             </a:fld>
             <a:endParaRPr lang="en-US" sz="1800">
               <a:solidFill>
@@ -4961,6 +5774,71 @@
           <a:chExt cx="0" cy="0"/>
         </a:xfrm>
       </p:grpSpPr>
+      <p:pic>
+        <p:nvPicPr>
+          <p:cNvPr id="175" name="Picture 174">
+            <a:extLst>
+              <a:ext uri="{FF2B5EF4-FFF2-40B4-BE49-F238E27FC236}">
+                <a16:creationId xmlns:a16="http://schemas.microsoft.com/office/drawing/2014/main" id="{35D46210-12ED-49C2-857C-0F4CBB8FC5AE}"/>
+              </a:ext>
+            </a:extLst>
+          </p:cNvPr>
+          <p:cNvPicPr>
+            <a:picLocks noChangeAspect="1"/>
+          </p:cNvPicPr>
+          <p:nvPr/>
+        </p:nvPicPr>
+        <p:blipFill>
+          <a:blip r:embed="rId2"/>
+          <a:stretch>
+            <a:fillRect/>
+          </a:stretch>
+        </p:blipFill>
+        <p:spPr>
+          <a:xfrm>
+            <a:off x="4417095" y="4354865"/>
+            <a:ext cx="1257300" cy="638175"/>
+          </a:xfrm>
+          <a:prstGeom prst="rect">
+            <a:avLst/>
+          </a:prstGeom>
+        </p:spPr>
+      </p:pic>
+      <p:sp>
+        <p:nvSpPr>
+          <p:cNvPr id="240" name="TextBox 239"/>
+          <p:cNvSpPr txBox="1"/>
+          <p:nvPr/>
+        </p:nvSpPr>
+        <p:spPr>
+          <a:xfrm>
+            <a:off x="4802764" y="4175701"/>
+            <a:ext cx="284545" cy="276999"/>
+          </a:xfrm>
+          <a:prstGeom prst="rect">
+            <a:avLst/>
+          </a:prstGeom>
+          <a:solidFill>
+            <a:schemeClr val="bg1"/>
+          </a:solidFill>
+        </p:spPr>
+        <p:txBody>
+          <a:bodyPr wrap="square" rtlCol="0">
+            <a:spAutoFit/>
+          </a:bodyPr>
+          <a:lstStyle/>
+          <a:p>
+            <a:r>
+              <a:rPr lang="en-US" sz="1200" dirty="0">
+                <a:latin typeface="Tahoma" panose="020B0604030504040204" pitchFamily="34" charset="0"/>
+                <a:ea typeface="Tahoma" panose="020B0604030504040204" pitchFamily="34" charset="0"/>
+                <a:cs typeface="Tahoma" panose="020B0604030504040204" pitchFamily="34" charset="0"/>
+              </a:rPr>
+              <a:t>8</a:t>
+            </a:r>
+          </a:p>
+        </p:txBody>
+      </p:sp>
       <p:sp>
         <p:nvSpPr>
           <p:cNvPr id="2" name="Title 1"/>
@@ -5050,30 +5928,6 @@
           <a:xfrm>
             <a:off x="1639693" y="3778002"/>
             <a:ext cx="1257300" cy="638175"/>
-          </a:xfrm>
-          <a:prstGeom prst="rect">
-            <a:avLst/>
-          </a:prstGeom>
-        </p:spPr>
-      </p:pic>
-      <p:pic>
-        <p:nvPicPr>
-          <p:cNvPr id="11" name="Picture 10"/>
-          <p:cNvPicPr>
-            <a:picLocks noChangeAspect="1"/>
-          </p:cNvPicPr>
-          <p:nvPr/>
-        </p:nvPicPr>
-        <p:blipFill>
-          <a:blip r:embed="rId3"/>
-          <a:stretch>
-            <a:fillRect/>
-          </a:stretch>
-        </p:blipFill>
-        <p:spPr>
-          <a:xfrm>
-            <a:off x="3595339" y="1329831"/>
-            <a:ext cx="6667500" cy="4219575"/>
           </a:xfrm>
           <a:prstGeom prst="rect">
             <a:avLst/>
@@ -5361,8 +6215,8 @@
         </p:nvSpPr>
         <p:spPr>
           <a:xfrm>
-            <a:off x="4030823" y="5519361"/>
-            <a:ext cx="2397195" cy="276999"/>
+            <a:off x="3911942" y="5238208"/>
+            <a:ext cx="2397195" cy="461665"/>
           </a:xfrm>
           <a:prstGeom prst="rect">
             <a:avLst/>
@@ -5377,6 +6231,29 @@
           </a:bodyPr>
           <a:lstStyle/>
           <a:p>
+            <a:pPr algn="ctr">
+              <a:spcBef>
+                <a:spcPts val="0"/>
+              </a:spcBef>
+            </a:pPr>
+            <a:r>
+              <a:rPr lang="en-US" sz="1200" dirty="0">
+                <a:solidFill>
+                  <a:srgbClr val="FF0000"/>
+                </a:solidFill>
+                <a:latin typeface="Tahoma" panose="020B0604030504040204" pitchFamily="34" charset="0"/>
+                <a:ea typeface="Tahoma" panose="020B0604030504040204" pitchFamily="34" charset="0"/>
+                <a:cs typeface="Tahoma" panose="020B0604030504040204" pitchFamily="34" charset="0"/>
+              </a:rPr>
+              <a:t>Interpolated Value</a:t>
+            </a:r>
+          </a:p>
+          <a:p>
+            <a:pPr algn="ctr">
+              <a:spcBef>
+                <a:spcPts val="0"/>
+              </a:spcBef>
+            </a:pPr>
             <a:r>
               <a:rPr lang="en-US" sz="1200" dirty="0">
                 <a:latin typeface="Tahoma" panose="020B0604030504040204" pitchFamily="34" charset="0"/>
@@ -8542,7 +9419,7 @@
                     <a:ea typeface="Tahoma" panose="020B0604030504040204" pitchFamily="34" charset="0"/>
                     <a:cs typeface="Tahoma" panose="020B0604030504040204" pitchFamily="34" charset="0"/>
                   </a:rPr>
-                  <a:t>cw2</a:t>
+                  <a:t>cw3</a:t>
                 </a:r>
               </a:p>
             </p:txBody>
@@ -8625,7 +9502,7 @@
         </p:nvSpPr>
         <p:spPr>
           <a:xfrm>
-            <a:off x="5397959" y="3600386"/>
+            <a:off x="5326547" y="3600386"/>
             <a:ext cx="790514" cy="276999"/>
           </a:xfrm>
           <a:prstGeom prst="rect">
@@ -8664,7 +9541,7 @@
         </p:nvSpPr>
         <p:spPr>
           <a:xfrm>
-            <a:off x="4186331" y="1614046"/>
+            <a:off x="4168501" y="1613833"/>
             <a:ext cx="284545" cy="276999"/>
           </a:xfrm>
           <a:prstGeom prst="rect">
@@ -8699,7 +9576,7 @@
         </p:nvSpPr>
         <p:spPr>
           <a:xfrm>
-            <a:off x="4807065" y="1594703"/>
+            <a:off x="4784914" y="1596693"/>
             <a:ext cx="284545" cy="276999"/>
           </a:xfrm>
           <a:prstGeom prst="rect">
@@ -8799,7 +9676,7 @@
         </p:nvSpPr>
         <p:spPr>
           <a:xfrm>
-            <a:off x="5410787" y="1299294"/>
+            <a:off x="5030280" y="1606146"/>
             <a:ext cx="790514" cy="276999"/>
           </a:xfrm>
           <a:prstGeom prst="rect">
@@ -8838,7 +9715,7 @@
         </p:nvSpPr>
         <p:spPr>
           <a:xfrm>
-            <a:off x="5854645" y="1891045"/>
+            <a:off x="5468414" y="1899850"/>
             <a:ext cx="284545" cy="276999"/>
           </a:xfrm>
           <a:prstGeom prst="rect">
@@ -8873,7 +9750,7 @@
         </p:nvSpPr>
         <p:spPr>
           <a:xfrm>
-            <a:off x="4519385" y="2448213"/>
+            <a:off x="4429394" y="2461149"/>
             <a:ext cx="284545" cy="276999"/>
           </a:xfrm>
           <a:prstGeom prst="rect">
@@ -8908,7 +9785,7 @@
         </p:nvSpPr>
         <p:spPr>
           <a:xfrm>
-            <a:off x="4810934" y="3272146"/>
+            <a:off x="4720849" y="3276490"/>
             <a:ext cx="379965" cy="276999"/>
           </a:xfrm>
           <a:prstGeom prst="rect">
@@ -8930,7 +9807,7 @@
                 <a:ea typeface="Tahoma" panose="020B0604030504040204" pitchFamily="34" charset="0"/>
                 <a:cs typeface="Tahoma" panose="020B0604030504040204" pitchFamily="34" charset="0"/>
               </a:rPr>
-              <a:t>12</a:t>
+              <a:t>13</a:t>
             </a:r>
           </a:p>
         </p:txBody>
@@ -9031,7 +9908,7 @@
                 <a:ea typeface="Tahoma" panose="020B0604030504040204" pitchFamily="34" charset="0"/>
                 <a:cs typeface="Tahoma" panose="020B0604030504040204" pitchFamily="34" charset="0"/>
               </a:rPr>
-              <a:t>Q8.4</a:t>
+              <a:t>Q9.4</a:t>
             </a:r>
           </a:p>
         </p:txBody>
@@ -9083,8 +9960,8 @@
         </p:nvSpPr>
         <p:spPr>
           <a:xfrm>
-            <a:off x="4244045" y="3627848"/>
-            <a:ext cx="956205" cy="430887"/>
+            <a:off x="4177527" y="3571731"/>
+            <a:ext cx="1031749" cy="600164"/>
           </a:xfrm>
           <a:prstGeom prst="rect">
             <a:avLst/>
@@ -9092,6 +9969,11 @@
           <a:solidFill>
             <a:schemeClr val="bg1"/>
           </a:solidFill>
+          <a:ln>
+            <a:solidFill>
+              <a:schemeClr val="tx1"/>
+            </a:solidFill>
+          </a:ln>
         </p:spPr>
         <p:txBody>
           <a:bodyPr wrap="square" rtlCol="0">
@@ -9128,7 +10010,7 @@
                 <a:ea typeface="Tahoma" panose="020B0604030504040204" pitchFamily="34" charset="0"/>
                 <a:cs typeface="Tahoma" panose="020B0604030504040204" pitchFamily="34" charset="0"/>
               </a:rPr>
-              <a:t>truncate</a:t>
+              <a:t>Remove ‘0’ &amp; truncate</a:t>
             </a:r>
           </a:p>
         </p:txBody>
@@ -9141,7 +10023,7 @@
         </p:nvSpPr>
         <p:spPr>
           <a:xfrm>
-            <a:off x="3762375" y="2488555"/>
+            <a:off x="3834948" y="2408782"/>
             <a:ext cx="576240" cy="276999"/>
           </a:xfrm>
           <a:prstGeom prst="rect">
@@ -9174,13 +10056,48 @@
       </p:sp>
       <p:sp>
         <p:nvSpPr>
-          <p:cNvPr id="240" name="TextBox 239"/>
+          <p:cNvPr id="241" name="TextBox 240"/>
           <p:cNvSpPr txBox="1"/>
           <p:nvPr/>
         </p:nvSpPr>
         <p:spPr>
           <a:xfrm>
-            <a:off x="4810934" y="4123602"/>
+            <a:off x="2404369" y="374587"/>
+            <a:ext cx="776751" cy="276999"/>
+          </a:xfrm>
+          <a:prstGeom prst="rect">
+            <a:avLst/>
+          </a:prstGeom>
+          <a:solidFill>
+            <a:schemeClr val="bg1"/>
+          </a:solidFill>
+        </p:spPr>
+        <p:txBody>
+          <a:bodyPr wrap="none" rtlCol="0">
+            <a:spAutoFit/>
+          </a:bodyPr>
+          <a:lstStyle/>
+          <a:p>
+            <a:r>
+              <a:rPr lang="en-US" sz="1200" dirty="0">
+                <a:latin typeface="Tahoma" panose="020B0604030504040204" pitchFamily="34" charset="0"/>
+                <a:ea typeface="Tahoma" panose="020B0604030504040204" pitchFamily="34" charset="0"/>
+                <a:cs typeface="Tahoma" panose="020B0604030504040204" pitchFamily="34" charset="0"/>
+              </a:rPr>
+              <a:t>Switches</a:t>
+            </a:r>
+          </a:p>
+        </p:txBody>
+      </p:sp>
+      <p:sp>
+        <p:nvSpPr>
+          <p:cNvPr id="242" name="TextBox 241"/>
+          <p:cNvSpPr txBox="1"/>
+          <p:nvPr/>
+        </p:nvSpPr>
+        <p:spPr>
+          <a:xfrm>
+            <a:off x="5822310" y="3875078"/>
             <a:ext cx="284545" cy="276999"/>
           </a:xfrm>
           <a:prstGeom prst="rect">
@@ -9209,13 +10126,83 @@
       </p:sp>
       <p:sp>
         <p:nvSpPr>
-          <p:cNvPr id="241" name="TextBox 240"/>
+          <p:cNvPr id="243" name="TextBox 242"/>
           <p:cNvSpPr txBox="1"/>
           <p:nvPr/>
         </p:nvSpPr>
         <p:spPr>
           <a:xfrm>
-            <a:off x="2404369" y="374587"/>
+            <a:off x="5108328" y="4929804"/>
+            <a:ext cx="284545" cy="276999"/>
+          </a:xfrm>
+          <a:prstGeom prst="rect">
+            <a:avLst/>
+          </a:prstGeom>
+          <a:solidFill>
+            <a:schemeClr val="bg1"/>
+          </a:solidFill>
+        </p:spPr>
+        <p:txBody>
+          <a:bodyPr wrap="square" rtlCol="0">
+            <a:spAutoFit/>
+          </a:bodyPr>
+          <a:lstStyle/>
+          <a:p>
+            <a:r>
+              <a:rPr lang="en-US" sz="1200" dirty="0">
+                <a:latin typeface="Tahoma" panose="020B0604030504040204" pitchFamily="34" charset="0"/>
+                <a:ea typeface="Tahoma" panose="020B0604030504040204" pitchFamily="34" charset="0"/>
+                <a:cs typeface="Tahoma" panose="020B0604030504040204" pitchFamily="34" charset="0"/>
+              </a:rPr>
+              <a:t>8</a:t>
+            </a:r>
+          </a:p>
+        </p:txBody>
+      </p:sp>
+      <p:sp>
+        <p:nvSpPr>
+          <p:cNvPr id="244" name="TextBox 243"/>
+          <p:cNvSpPr txBox="1"/>
+          <p:nvPr/>
+        </p:nvSpPr>
+        <p:spPr>
+          <a:xfrm>
+            <a:off x="6950491" y="2378763"/>
+            <a:ext cx="284545" cy="276999"/>
+          </a:xfrm>
+          <a:prstGeom prst="rect">
+            <a:avLst/>
+          </a:prstGeom>
+          <a:solidFill>
+            <a:schemeClr val="bg1"/>
+          </a:solidFill>
+        </p:spPr>
+        <p:txBody>
+          <a:bodyPr wrap="square" rtlCol="0">
+            <a:spAutoFit/>
+          </a:bodyPr>
+          <a:lstStyle/>
+          <a:p>
+            <a:r>
+              <a:rPr lang="en-US" sz="1200" dirty="0">
+                <a:latin typeface="Tahoma" panose="020B0604030504040204" pitchFamily="34" charset="0"/>
+                <a:ea typeface="Tahoma" panose="020B0604030504040204" pitchFamily="34" charset="0"/>
+                <a:cs typeface="Tahoma" panose="020B0604030504040204" pitchFamily="34" charset="0"/>
+              </a:rPr>
+              <a:t>8</a:t>
+            </a:r>
+          </a:p>
+        </p:txBody>
+      </p:sp>
+      <p:sp>
+        <p:nvSpPr>
+          <p:cNvPr id="245" name="TextBox 244"/>
+          <p:cNvSpPr txBox="1"/>
+          <p:nvPr/>
+        </p:nvSpPr>
+        <p:spPr>
+          <a:xfrm>
+            <a:off x="8211002" y="1066100"/>
             <a:ext cx="776751" cy="276999"/>
           </a:xfrm>
           <a:prstGeom prst="rect">
@@ -9244,153 +10231,13 @@
       </p:sp>
       <p:sp>
         <p:nvSpPr>
-          <p:cNvPr id="242" name="TextBox 241"/>
-          <p:cNvSpPr txBox="1"/>
-          <p:nvPr/>
-        </p:nvSpPr>
-        <p:spPr>
-          <a:xfrm>
-            <a:off x="5885909" y="3934529"/>
-            <a:ext cx="284545" cy="276999"/>
-          </a:xfrm>
-          <a:prstGeom prst="rect">
-            <a:avLst/>
-          </a:prstGeom>
-          <a:solidFill>
-            <a:schemeClr val="bg1"/>
-          </a:solidFill>
-        </p:spPr>
-        <p:txBody>
-          <a:bodyPr wrap="square" rtlCol="0">
-            <a:spAutoFit/>
-          </a:bodyPr>
-          <a:lstStyle/>
-          <a:p>
-            <a:r>
-              <a:rPr lang="en-US" sz="1200" dirty="0">
-                <a:latin typeface="Tahoma" panose="020B0604030504040204" pitchFamily="34" charset="0"/>
-                <a:ea typeface="Tahoma" panose="020B0604030504040204" pitchFamily="34" charset="0"/>
-                <a:cs typeface="Tahoma" panose="020B0604030504040204" pitchFamily="34" charset="0"/>
-              </a:rPr>
-              <a:t>8</a:t>
-            </a:r>
-          </a:p>
-        </p:txBody>
-      </p:sp>
-      <p:sp>
-        <p:nvSpPr>
-          <p:cNvPr id="243" name="TextBox 242"/>
-          <p:cNvSpPr txBox="1"/>
-          <p:nvPr/>
-        </p:nvSpPr>
-        <p:spPr>
-          <a:xfrm>
-            <a:off x="5113414" y="4962262"/>
-            <a:ext cx="284545" cy="276999"/>
-          </a:xfrm>
-          <a:prstGeom prst="rect">
-            <a:avLst/>
-          </a:prstGeom>
-          <a:solidFill>
-            <a:schemeClr val="bg1"/>
-          </a:solidFill>
-        </p:spPr>
-        <p:txBody>
-          <a:bodyPr wrap="square" rtlCol="0">
-            <a:spAutoFit/>
-          </a:bodyPr>
-          <a:lstStyle/>
-          <a:p>
-            <a:r>
-              <a:rPr lang="en-US" sz="1200" dirty="0">
-                <a:latin typeface="Tahoma" panose="020B0604030504040204" pitchFamily="34" charset="0"/>
-                <a:ea typeface="Tahoma" panose="020B0604030504040204" pitchFamily="34" charset="0"/>
-                <a:cs typeface="Tahoma" panose="020B0604030504040204" pitchFamily="34" charset="0"/>
-              </a:rPr>
-              <a:t>8</a:t>
-            </a:r>
-          </a:p>
-        </p:txBody>
-      </p:sp>
-      <p:sp>
-        <p:nvSpPr>
-          <p:cNvPr id="244" name="TextBox 243"/>
-          <p:cNvSpPr txBox="1"/>
-          <p:nvPr/>
-        </p:nvSpPr>
-        <p:spPr>
-          <a:xfrm>
-            <a:off x="6945715" y="2108409"/>
-            <a:ext cx="284545" cy="276999"/>
-          </a:xfrm>
-          <a:prstGeom prst="rect">
-            <a:avLst/>
-          </a:prstGeom>
-          <a:solidFill>
-            <a:schemeClr val="bg1"/>
-          </a:solidFill>
-        </p:spPr>
-        <p:txBody>
-          <a:bodyPr wrap="square" rtlCol="0">
-            <a:spAutoFit/>
-          </a:bodyPr>
-          <a:lstStyle/>
-          <a:p>
-            <a:r>
-              <a:rPr lang="en-US" sz="1200" dirty="0">
-                <a:latin typeface="Tahoma" panose="020B0604030504040204" pitchFamily="34" charset="0"/>
-                <a:ea typeface="Tahoma" panose="020B0604030504040204" pitchFamily="34" charset="0"/>
-                <a:cs typeface="Tahoma" panose="020B0604030504040204" pitchFamily="34" charset="0"/>
-              </a:rPr>
-              <a:t>8</a:t>
-            </a:r>
-          </a:p>
-        </p:txBody>
-      </p:sp>
-      <p:sp>
-        <p:nvSpPr>
-          <p:cNvPr id="245" name="TextBox 244"/>
-          <p:cNvSpPr txBox="1"/>
-          <p:nvPr/>
-        </p:nvSpPr>
-        <p:spPr>
-          <a:xfrm>
-            <a:off x="7740364" y="1329629"/>
-            <a:ext cx="776751" cy="276999"/>
-          </a:xfrm>
-          <a:prstGeom prst="rect">
-            <a:avLst/>
-          </a:prstGeom>
-          <a:solidFill>
-            <a:schemeClr val="bg1"/>
-          </a:solidFill>
-        </p:spPr>
-        <p:txBody>
-          <a:bodyPr wrap="none" rtlCol="0">
-            <a:spAutoFit/>
-          </a:bodyPr>
-          <a:lstStyle/>
-          <a:p>
-            <a:r>
-              <a:rPr lang="en-US" sz="1200" dirty="0">
-                <a:latin typeface="Tahoma" panose="020B0604030504040204" pitchFamily="34" charset="0"/>
-                <a:ea typeface="Tahoma" panose="020B0604030504040204" pitchFamily="34" charset="0"/>
-                <a:cs typeface="Tahoma" panose="020B0604030504040204" pitchFamily="34" charset="0"/>
-              </a:rPr>
-              <a:t>Switches</a:t>
-            </a:r>
-          </a:p>
-        </p:txBody>
-      </p:sp>
-      <p:sp>
-        <p:nvSpPr>
           <p:cNvPr id="246" name="Rectangle 245"/>
           <p:cNvSpPr/>
           <p:nvPr/>
         </p:nvSpPr>
         <p:spPr bwMode="auto">
           <a:xfrm>
-            <a:off x="8238575" y="1728289"/>
+            <a:off x="8398705" y="1535047"/>
             <a:ext cx="403401" cy="242802"/>
           </a:xfrm>
           <a:prstGeom prst="rect">
@@ -9750,7 +10597,7 @@
         </p:nvSpPr>
         <p:spPr>
           <a:xfrm>
-            <a:off x="8168095" y="2092550"/>
+            <a:off x="8247541" y="2040438"/>
             <a:ext cx="284545" cy="276999"/>
           </a:xfrm>
           <a:prstGeom prst="rect">
@@ -9785,7 +10632,7 @@
         </p:nvSpPr>
         <p:spPr>
           <a:xfrm>
-            <a:off x="8166573" y="2400345"/>
+            <a:off x="8510314" y="2017818"/>
             <a:ext cx="513933" cy="276999"/>
           </a:xfrm>
           <a:prstGeom prst="rect">
@@ -9808,7 +10655,7 @@
                 <a:ea typeface="Tahoma" panose="020B0604030504040204" pitchFamily="34" charset="0"/>
                 <a:cs typeface="Tahoma" panose="020B0604030504040204" pitchFamily="34" charset="0"/>
               </a:rPr>
-              <a:t>Q4.4</a:t>
+              <a:t>Q8.0</a:t>
             </a:r>
           </a:p>
         </p:txBody>
@@ -10041,7 +10888,7 @@
         </p:nvSpPr>
         <p:spPr>
           <a:xfrm>
-            <a:off x="7332425" y="3401988"/>
+            <a:off x="7241552" y="3247155"/>
             <a:ext cx="662237" cy="276999"/>
           </a:xfrm>
           <a:prstGeom prst="rect">
@@ -10064,17 +10911,17 @@
                 <a:ea typeface="Tahoma" panose="020B0604030504040204" pitchFamily="34" charset="0"/>
                 <a:cs typeface="Tahoma" panose="020B0604030504040204" pitchFamily="34" charset="0"/>
               </a:rPr>
-              <a:t>Q12.4</a:t>
-            </a:r>
-          </a:p>
-        </p:txBody>
-      </p:sp>
-      <p:sp>
-        <p:nvSpPr>
-          <p:cNvPr id="162" name="TextBox 161">
+              <a:t>Q17.0</a:t>
+            </a:r>
+          </a:p>
+        </p:txBody>
+      </p:sp>
+      <p:sp>
+        <p:nvSpPr>
+          <p:cNvPr id="163" name="TextBox 162">
             <a:extLst>
               <a:ext uri="{FF2B5EF4-FFF2-40B4-BE49-F238E27FC236}">
-                <a16:creationId xmlns:a16="http://schemas.microsoft.com/office/drawing/2014/main" id="{0180380B-A4F9-4F0D-966D-7F1FC1F9B29A}"/>
+                <a16:creationId xmlns:a16="http://schemas.microsoft.com/office/drawing/2014/main" id="{47F61A86-CD47-4821-A55B-E7F5835F3611}"/>
               </a:ext>
             </a:extLst>
           </p:cNvPr>
@@ -10083,7 +10930,7 @@
         </p:nvSpPr>
         <p:spPr>
           <a:xfrm>
-            <a:off x="4166068" y="4183652"/>
+            <a:off x="3798924" y="1124000"/>
             <a:ext cx="513933" cy="276999"/>
           </a:xfrm>
           <a:prstGeom prst="rect">
@@ -10113,10 +10960,10 @@
       </p:sp>
       <p:sp>
         <p:nvSpPr>
-          <p:cNvPr id="163" name="TextBox 162">
+          <p:cNvPr id="169" name="TextBox 168">
             <a:extLst>
               <a:ext uri="{FF2B5EF4-FFF2-40B4-BE49-F238E27FC236}">
-                <a16:creationId xmlns:a16="http://schemas.microsoft.com/office/drawing/2014/main" id="{47F61A86-CD47-4821-A55B-E7F5835F3611}"/>
+                <a16:creationId xmlns:a16="http://schemas.microsoft.com/office/drawing/2014/main" id="{F92D90D9-B54D-44EF-B100-BFA48FFB3B2C}"/>
               </a:ext>
             </a:extLst>
           </p:cNvPr>
@@ -10125,7 +10972,92 @@
         </p:nvSpPr>
         <p:spPr>
           <a:xfrm>
-            <a:off x="4123309" y="1108202"/>
+            <a:off x="5155742" y="1439075"/>
+            <a:ext cx="513933" cy="276999"/>
+          </a:xfrm>
+          <a:prstGeom prst="rect">
+            <a:avLst/>
+          </a:prstGeom>
+          <a:noFill/>
+        </p:spPr>
+        <p:txBody>
+          <a:bodyPr wrap="square" rtlCol="0">
+            <a:spAutoFit/>
+          </a:bodyPr>
+          <a:lstStyle/>
+          <a:p>
+            <a:r>
+              <a:rPr lang="en-US" sz="1200" dirty="0">
+                <a:solidFill>
+                  <a:srgbClr val="FF0000"/>
+                </a:solidFill>
+                <a:latin typeface="Tahoma" panose="020B0604030504040204" pitchFamily="34" charset="0"/>
+                <a:ea typeface="Tahoma" panose="020B0604030504040204" pitchFamily="34" charset="0"/>
+                <a:cs typeface="Tahoma" panose="020B0604030504040204" pitchFamily="34" charset="0"/>
+              </a:rPr>
+              <a:t>Q0.4</a:t>
+            </a:r>
+          </a:p>
+        </p:txBody>
+      </p:sp>
+      <p:sp>
+        <p:nvSpPr>
+          <p:cNvPr id="170" name="TextBox 169">
+            <a:extLst>
+              <a:ext uri="{FF2B5EF4-FFF2-40B4-BE49-F238E27FC236}">
+                <a16:creationId xmlns:a16="http://schemas.microsoft.com/office/drawing/2014/main" id="{EF76A9EF-79DC-4531-8035-5F16B983B11B}"/>
+              </a:ext>
+            </a:extLst>
+          </p:cNvPr>
+          <p:cNvSpPr txBox="1"/>
+          <p:nvPr/>
+        </p:nvSpPr>
+        <p:spPr>
+          <a:xfrm>
+            <a:off x="6309137" y="4083367"/>
+            <a:ext cx="778186" cy="461665"/>
+          </a:xfrm>
+          <a:prstGeom prst="rect">
+            <a:avLst/>
+          </a:prstGeom>
+          <a:noFill/>
+        </p:spPr>
+        <p:txBody>
+          <a:bodyPr wrap="square" rtlCol="0">
+            <a:spAutoFit/>
+          </a:bodyPr>
+          <a:lstStyle/>
+          <a:p>
+            <a:pPr algn="ctr"/>
+            <a:r>
+              <a:rPr lang="en-US" sz="1200" dirty="0">
+                <a:solidFill>
+                  <a:srgbClr val="FF0000"/>
+                </a:solidFill>
+                <a:latin typeface="Tahoma" panose="020B0604030504040204" pitchFamily="34" charset="0"/>
+                <a:ea typeface="Tahoma" panose="020B0604030504040204" pitchFamily="34" charset="0"/>
+                <a:cs typeface="Tahoma" panose="020B0604030504040204" pitchFamily="34" charset="0"/>
+              </a:rPr>
+              <a:t>18 or 16 MSBs?</a:t>
+            </a:r>
+          </a:p>
+        </p:txBody>
+      </p:sp>
+      <p:sp>
+        <p:nvSpPr>
+          <p:cNvPr id="171" name="TextBox 170">
+            <a:extLst>
+              <a:ext uri="{FF2B5EF4-FFF2-40B4-BE49-F238E27FC236}">
+                <a16:creationId xmlns:a16="http://schemas.microsoft.com/office/drawing/2014/main" id="{67005973-6FE0-40B9-B106-06C0E7C01726}"/>
+              </a:ext>
+            </a:extLst>
+          </p:cNvPr>
+          <p:cNvSpPr txBox="1"/>
+          <p:nvPr/>
+        </p:nvSpPr>
+        <p:spPr>
+          <a:xfrm>
+            <a:off x="4535618" y="1111587"/>
             <a:ext cx="513933" cy="276999"/>
           </a:xfrm>
           <a:prstGeom prst="rect">
@@ -10155,10 +11087,10 @@
       </p:sp>
       <p:sp>
         <p:nvSpPr>
-          <p:cNvPr id="169" name="TextBox 168">
+          <p:cNvPr id="172" name="TextBox 171">
             <a:extLst>
               <a:ext uri="{FF2B5EF4-FFF2-40B4-BE49-F238E27FC236}">
-                <a16:creationId xmlns:a16="http://schemas.microsoft.com/office/drawing/2014/main" id="{F92D90D9-B54D-44EF-B100-BFA48FFB3B2C}"/>
+                <a16:creationId xmlns:a16="http://schemas.microsoft.com/office/drawing/2014/main" id="{AA6A0382-FD87-4E4F-BA50-F0C9E45882E0}"/>
               </a:ext>
             </a:extLst>
           </p:cNvPr>
@@ -10167,8 +11099,8 @@
         </p:nvSpPr>
         <p:spPr>
           <a:xfrm>
-            <a:off x="5536249" y="1132223"/>
-            <a:ext cx="513933" cy="276999"/>
+            <a:off x="1503232" y="5595726"/>
+            <a:ext cx="626867" cy="276999"/>
           </a:xfrm>
           <a:prstGeom prst="rect">
             <a:avLst/>
@@ -10190,17 +11122,107 @@
                 <a:ea typeface="Tahoma" panose="020B0604030504040204" pitchFamily="34" charset="0"/>
                 <a:cs typeface="Tahoma" panose="020B0604030504040204" pitchFamily="34" charset="0"/>
               </a:rPr>
-              <a:t>Q0.4</a:t>
-            </a:r>
-          </a:p>
-        </p:txBody>
-      </p:sp>
-      <p:sp>
-        <p:nvSpPr>
-          <p:cNvPr id="170" name="TextBox 169">
+              <a:t>signed</a:t>
+            </a:r>
+          </a:p>
+        </p:txBody>
+      </p:sp>
+      <p:pic>
+        <p:nvPicPr>
+          <p:cNvPr id="173" name="Picture 172">
             <a:extLst>
               <a:ext uri="{FF2B5EF4-FFF2-40B4-BE49-F238E27FC236}">
-                <a16:creationId xmlns:a16="http://schemas.microsoft.com/office/drawing/2014/main" id="{EF76A9EF-79DC-4531-8035-5F16B983B11B}"/>
+                <a16:creationId xmlns:a16="http://schemas.microsoft.com/office/drawing/2014/main" id="{151598FE-D1A7-4B97-8B28-CDC6B36BD066}"/>
+              </a:ext>
+            </a:extLst>
+          </p:cNvPr>
+          <p:cNvPicPr>
+            <a:picLocks noChangeAspect="1"/>
+          </p:cNvPicPr>
+          <p:nvPr/>
+        </p:nvPicPr>
+        <p:blipFill>
+          <a:blip r:embed="rId2"/>
+          <a:stretch>
+            <a:fillRect/>
+          </a:stretch>
+        </p:blipFill>
+        <p:spPr>
+          <a:xfrm>
+            <a:off x="3780494" y="1845222"/>
+            <a:ext cx="1257300" cy="638175"/>
+          </a:xfrm>
+          <a:prstGeom prst="rect">
+            <a:avLst/>
+          </a:prstGeom>
+        </p:spPr>
+      </p:pic>
+      <p:pic>
+        <p:nvPicPr>
+          <p:cNvPr id="174" name="Picture 173">
+            <a:extLst>
+              <a:ext uri="{FF2B5EF4-FFF2-40B4-BE49-F238E27FC236}">
+                <a16:creationId xmlns:a16="http://schemas.microsoft.com/office/drawing/2014/main" id="{F93A9617-CC80-4CFB-817B-566AD7451367}"/>
+              </a:ext>
+            </a:extLst>
+          </p:cNvPr>
+          <p:cNvPicPr>
+            <a:picLocks noChangeAspect="1"/>
+          </p:cNvPicPr>
+          <p:nvPr/>
+        </p:nvPicPr>
+        <p:blipFill>
+          <a:blip r:embed="rId2"/>
+          <a:stretch>
+            <a:fillRect/>
+          </a:stretch>
+        </p:blipFill>
+        <p:spPr>
+          <a:xfrm>
+            <a:off x="4069247" y="2685754"/>
+            <a:ext cx="1257300" cy="638175"/>
+          </a:xfrm>
+          <a:prstGeom prst="rect">
+            <a:avLst/>
+          </a:prstGeom>
+        </p:spPr>
+      </p:pic>
+      <p:pic>
+        <p:nvPicPr>
+          <p:cNvPr id="176" name="Picture 175">
+            <a:extLst>
+              <a:ext uri="{FF2B5EF4-FFF2-40B4-BE49-F238E27FC236}">
+                <a16:creationId xmlns:a16="http://schemas.microsoft.com/office/drawing/2014/main" id="{309D3B59-9DF6-4633-B1F4-1967147954B3}"/>
+              </a:ext>
+            </a:extLst>
+          </p:cNvPr>
+          <p:cNvPicPr>
+            <a:picLocks noChangeAspect="1"/>
+          </p:cNvPicPr>
+          <p:nvPr/>
+        </p:nvPicPr>
+        <p:blipFill>
+          <a:blip r:embed="rId2"/>
+          <a:stretch>
+            <a:fillRect/>
+          </a:stretch>
+        </p:blipFill>
+        <p:spPr>
+          <a:xfrm>
+            <a:off x="6574775" y="2669449"/>
+            <a:ext cx="1257300" cy="638175"/>
+          </a:xfrm>
+          <a:prstGeom prst="rect">
+            <a:avLst/>
+          </a:prstGeom>
+        </p:spPr>
+      </p:pic>
+      <p:sp>
+        <p:nvSpPr>
+          <p:cNvPr id="7" name="TextBox 6">
+            <a:extLst>
+              <a:ext uri="{FF2B5EF4-FFF2-40B4-BE49-F238E27FC236}">
+                <a16:creationId xmlns:a16="http://schemas.microsoft.com/office/drawing/2014/main" id="{6EA29404-1408-4446-A536-37142C70205F}"/>
               </a:ext>
             </a:extLst>
           </p:cNvPr>
@@ -10209,8 +11231,129 @@
         </p:nvSpPr>
         <p:spPr>
           <a:xfrm>
-            <a:off x="7301504" y="4600267"/>
-            <a:ext cx="809855" cy="276999"/>
+            <a:off x="4882294" y="2263203"/>
+            <a:ext cx="1055097" cy="246221"/>
+          </a:xfrm>
+          <a:prstGeom prst="rect">
+            <a:avLst/>
+          </a:prstGeom>
+          <a:solidFill>
+            <a:schemeClr val="bg1"/>
+          </a:solidFill>
+          <a:ln>
+            <a:solidFill>
+              <a:schemeClr val="tx1"/>
+            </a:solidFill>
+          </a:ln>
+        </p:spPr>
+        <p:txBody>
+          <a:bodyPr wrap="none" rtlCol="0">
+            <a:spAutoFit/>
+          </a:bodyPr>
+          <a:lstStyle/>
+          <a:p>
+            <a:r>
+              <a:rPr lang="en-US" sz="1000" dirty="0"/>
+              <a:t>Append ‘0’ </a:t>
+            </a:r>
+            <a:r>
+              <a:rPr lang="en-US" sz="1000" dirty="0" err="1"/>
+              <a:t>MSb</a:t>
+            </a:r>
+            <a:endParaRPr lang="en-US" sz="1000" dirty="0"/>
+          </a:p>
+        </p:txBody>
+      </p:sp>
+      <p:cxnSp>
+        <p:nvCxnSpPr>
+          <p:cNvPr id="177" name="Straight Connector 176">
+            <a:extLst>
+              <a:ext uri="{FF2B5EF4-FFF2-40B4-BE49-F238E27FC236}">
+                <a16:creationId xmlns:a16="http://schemas.microsoft.com/office/drawing/2014/main" id="{ABBCFCC4-4E13-44DA-9522-144B721811EB}"/>
+              </a:ext>
+            </a:extLst>
+          </p:cNvPr>
+          <p:cNvCxnSpPr>
+            <a:cxnSpLocks/>
+          </p:cNvCxnSpPr>
+          <p:nvPr/>
+        </p:nvCxnSpPr>
+        <p:spPr bwMode="auto">
+          <a:xfrm flipH="1">
+            <a:off x="4359136" y="2565478"/>
+            <a:ext cx="103454" cy="99875"/>
+          </a:xfrm>
+          <a:prstGeom prst="line">
+            <a:avLst/>
+          </a:prstGeom>
+          <a:solidFill>
+            <a:srgbClr val="0C2D83"/>
+          </a:solidFill>
+          <a:ln w="12700" cap="flat" cmpd="sng" algn="ctr">
+            <a:solidFill>
+              <a:schemeClr val="tx1"/>
+            </a:solidFill>
+            <a:prstDash val="solid"/>
+            <a:round/>
+            <a:headEnd type="none" w="med" len="med"/>
+            <a:tailEnd type="none" w="med" len="med"/>
+          </a:ln>
+          <a:effectLst/>
+        </p:spPr>
+      </p:cxnSp>
+      <p:cxnSp>
+        <p:nvCxnSpPr>
+          <p:cNvPr id="178" name="Straight Arrow Connector 177">
+            <a:extLst>
+              <a:ext uri="{FF2B5EF4-FFF2-40B4-BE49-F238E27FC236}">
+                <a16:creationId xmlns:a16="http://schemas.microsoft.com/office/drawing/2014/main" id="{9021B01D-FBC1-4DAA-B6CF-B7393A1B8005}"/>
+              </a:ext>
+            </a:extLst>
+          </p:cNvPr>
+          <p:cNvCxnSpPr>
+            <a:cxnSpLocks/>
+          </p:cNvCxnSpPr>
+          <p:nvPr/>
+        </p:nvCxnSpPr>
+        <p:spPr bwMode="auto">
+          <a:xfrm>
+            <a:off x="4408658" y="2446323"/>
+            <a:ext cx="5061" cy="346516"/>
+          </a:xfrm>
+          <a:prstGeom prst="straightConnector1">
+            <a:avLst/>
+          </a:prstGeom>
+          <a:solidFill>
+            <a:srgbClr val="0C2D83"/>
+          </a:solidFill>
+          <a:ln w="12700" cap="flat" cmpd="sng" algn="ctr">
+            <a:solidFill>
+              <a:schemeClr val="tx1"/>
+            </a:solidFill>
+            <a:prstDash val="solid"/>
+            <a:round/>
+            <a:headEnd type="none" w="med" len="med"/>
+            <a:tailEnd type="triangle"/>
+          </a:ln>
+          <a:effectLst/>
+        </p:spPr>
+      </p:cxnSp>
+      <p:sp>
+        <p:nvSpPr>
+          <p:cNvPr id="187" name="TextBox 186">
+            <a:extLst>
+              <a:ext uri="{FF2B5EF4-FFF2-40B4-BE49-F238E27FC236}">
+                <a16:creationId xmlns:a16="http://schemas.microsoft.com/office/drawing/2014/main" id="{A19897B2-2207-4207-AF29-695657656CE0}"/>
+              </a:ext>
+            </a:extLst>
+          </p:cNvPr>
+          <p:cNvSpPr txBox="1"/>
+          <p:nvPr/>
+        </p:nvSpPr>
+        <p:spPr>
+          <a:xfrm>
+            <a:off x="3505408" y="2416232"/>
+            <a:ext cx="513933" cy="276999"/>
           </a:xfrm>
           <a:prstGeom prst="rect">
             <a:avLst/>
@@ -10232,17 +11375,470 @@
                 <a:ea typeface="Tahoma" panose="020B0604030504040204" pitchFamily="34" charset="0"/>
                 <a:cs typeface="Tahoma" panose="020B0604030504040204" pitchFamily="34" charset="0"/>
               </a:rPr>
-              <a:t>16 MSBs</a:t>
-            </a:r>
-          </a:p>
-        </p:txBody>
-      </p:sp>
-      <p:sp>
-        <p:nvSpPr>
-          <p:cNvPr id="3" name="Rectangle 2">
+              <a:t>Q8.0</a:t>
+            </a:r>
+          </a:p>
+        </p:txBody>
+      </p:sp>
+      <p:cxnSp>
+        <p:nvCxnSpPr>
+          <p:cNvPr id="188" name="Straight Connector 187">
             <a:extLst>
               <a:ext uri="{FF2B5EF4-FFF2-40B4-BE49-F238E27FC236}">
-                <a16:creationId xmlns:a16="http://schemas.microsoft.com/office/drawing/2014/main" id="{EB08ACF1-E08C-4BEA-8AF5-D87B63163844}"/>
+                <a16:creationId xmlns:a16="http://schemas.microsoft.com/office/drawing/2014/main" id="{5B3B90D3-8EB5-40DD-B505-BF6ADB3E648B}"/>
+              </a:ext>
+            </a:extLst>
+          </p:cNvPr>
+          <p:cNvCxnSpPr>
+            <a:cxnSpLocks/>
+          </p:cNvCxnSpPr>
+          <p:nvPr/>
+        </p:nvCxnSpPr>
+        <p:spPr bwMode="auto">
+          <a:xfrm flipH="1">
+            <a:off x="4076381" y="1738947"/>
+            <a:ext cx="103454" cy="99875"/>
+          </a:xfrm>
+          <a:prstGeom prst="line">
+            <a:avLst/>
+          </a:prstGeom>
+          <a:solidFill>
+            <a:srgbClr val="0C2D83"/>
+          </a:solidFill>
+          <a:ln w="12700" cap="flat" cmpd="sng" algn="ctr">
+            <a:solidFill>
+              <a:schemeClr val="tx1"/>
+            </a:solidFill>
+            <a:prstDash val="solid"/>
+            <a:round/>
+            <a:headEnd type="none" w="med" len="med"/>
+            <a:tailEnd type="none" w="med" len="med"/>
+          </a:ln>
+          <a:effectLst/>
+        </p:spPr>
+      </p:cxnSp>
+      <p:cxnSp>
+        <p:nvCxnSpPr>
+          <p:cNvPr id="189" name="Straight Arrow Connector 188">
+            <a:extLst>
+              <a:ext uri="{FF2B5EF4-FFF2-40B4-BE49-F238E27FC236}">
+                <a16:creationId xmlns:a16="http://schemas.microsoft.com/office/drawing/2014/main" id="{A1658AA4-5938-41A5-998E-1A59B0B0F677}"/>
+              </a:ext>
+            </a:extLst>
+          </p:cNvPr>
+          <p:cNvCxnSpPr>
+            <a:cxnSpLocks/>
+          </p:cNvCxnSpPr>
+          <p:nvPr/>
+        </p:nvCxnSpPr>
+        <p:spPr bwMode="auto">
+          <a:xfrm>
+            <a:off x="4125903" y="1619792"/>
+            <a:ext cx="5061" cy="346516"/>
+          </a:xfrm>
+          <a:prstGeom prst="straightConnector1">
+            <a:avLst/>
+          </a:prstGeom>
+          <a:solidFill>
+            <a:srgbClr val="0C2D83"/>
+          </a:solidFill>
+          <a:ln w="12700" cap="flat" cmpd="sng" algn="ctr">
+            <a:solidFill>
+              <a:schemeClr val="tx1"/>
+            </a:solidFill>
+            <a:prstDash val="solid"/>
+            <a:round/>
+            <a:headEnd type="none" w="med" len="med"/>
+            <a:tailEnd type="triangle"/>
+          </a:ln>
+          <a:effectLst/>
+        </p:spPr>
+      </p:cxnSp>
+      <p:cxnSp>
+        <p:nvCxnSpPr>
+          <p:cNvPr id="190" name="Straight Connector 189">
+            <a:extLst>
+              <a:ext uri="{FF2B5EF4-FFF2-40B4-BE49-F238E27FC236}">
+                <a16:creationId xmlns:a16="http://schemas.microsoft.com/office/drawing/2014/main" id="{A8EC53DC-9901-4285-8F32-444CD2D4F930}"/>
+              </a:ext>
+            </a:extLst>
+          </p:cNvPr>
+          <p:cNvCxnSpPr>
+            <a:cxnSpLocks/>
+          </p:cNvCxnSpPr>
+          <p:nvPr/>
+        </p:nvCxnSpPr>
+        <p:spPr bwMode="auto">
+          <a:xfrm flipH="1">
+            <a:off x="4664417" y="1725783"/>
+            <a:ext cx="103454" cy="99875"/>
+          </a:xfrm>
+          <a:prstGeom prst="line">
+            <a:avLst/>
+          </a:prstGeom>
+          <a:solidFill>
+            <a:srgbClr val="0C2D83"/>
+          </a:solidFill>
+          <a:ln w="12700" cap="flat" cmpd="sng" algn="ctr">
+            <a:solidFill>
+              <a:schemeClr val="tx1"/>
+            </a:solidFill>
+            <a:prstDash val="solid"/>
+            <a:round/>
+            <a:headEnd type="none" w="med" len="med"/>
+            <a:tailEnd type="none" w="med" len="med"/>
+          </a:ln>
+          <a:effectLst/>
+        </p:spPr>
+      </p:cxnSp>
+      <p:cxnSp>
+        <p:nvCxnSpPr>
+          <p:cNvPr id="191" name="Straight Arrow Connector 190">
+            <a:extLst>
+              <a:ext uri="{FF2B5EF4-FFF2-40B4-BE49-F238E27FC236}">
+                <a16:creationId xmlns:a16="http://schemas.microsoft.com/office/drawing/2014/main" id="{8A8288DF-40FC-4DD3-AD11-3352D2876B3D}"/>
+              </a:ext>
+            </a:extLst>
+          </p:cNvPr>
+          <p:cNvCxnSpPr>
+            <a:cxnSpLocks/>
+          </p:cNvCxnSpPr>
+          <p:nvPr/>
+        </p:nvCxnSpPr>
+        <p:spPr bwMode="auto">
+          <a:xfrm>
+            <a:off x="4713939" y="1606628"/>
+            <a:ext cx="5061" cy="346516"/>
+          </a:xfrm>
+          <a:prstGeom prst="straightConnector1">
+            <a:avLst/>
+          </a:prstGeom>
+          <a:solidFill>
+            <a:srgbClr val="0C2D83"/>
+          </a:solidFill>
+          <a:ln w="12700" cap="flat" cmpd="sng" algn="ctr">
+            <a:solidFill>
+              <a:schemeClr val="tx1"/>
+            </a:solidFill>
+            <a:prstDash val="solid"/>
+            <a:round/>
+            <a:headEnd type="none" w="med" len="med"/>
+            <a:tailEnd type="triangle"/>
+          </a:ln>
+          <a:effectLst/>
+        </p:spPr>
+      </p:cxnSp>
+      <p:cxnSp>
+        <p:nvCxnSpPr>
+          <p:cNvPr id="192" name="Straight Connector 191">
+            <a:extLst>
+              <a:ext uri="{FF2B5EF4-FFF2-40B4-BE49-F238E27FC236}">
+                <a16:creationId xmlns:a16="http://schemas.microsoft.com/office/drawing/2014/main" id="{F538AB58-7E6A-409E-AFEE-A55B074F75CE}"/>
+              </a:ext>
+            </a:extLst>
+          </p:cNvPr>
+          <p:cNvCxnSpPr>
+            <a:cxnSpLocks/>
+          </p:cNvCxnSpPr>
+          <p:nvPr/>
+        </p:nvCxnSpPr>
+        <p:spPr bwMode="auto">
+          <a:xfrm flipH="1">
+            <a:off x="5343351" y="2023559"/>
+            <a:ext cx="103454" cy="99875"/>
+          </a:xfrm>
+          <a:prstGeom prst="line">
+            <a:avLst/>
+          </a:prstGeom>
+          <a:solidFill>
+            <a:srgbClr val="0C2D83"/>
+          </a:solidFill>
+          <a:ln w="12700" cap="flat" cmpd="sng" algn="ctr">
+            <a:solidFill>
+              <a:schemeClr val="tx1"/>
+            </a:solidFill>
+            <a:prstDash val="solid"/>
+            <a:round/>
+            <a:headEnd type="none" w="med" len="med"/>
+            <a:tailEnd type="none" w="med" len="med"/>
+          </a:ln>
+          <a:effectLst/>
+        </p:spPr>
+      </p:cxnSp>
+      <p:cxnSp>
+        <p:nvCxnSpPr>
+          <p:cNvPr id="193" name="Straight Arrow Connector 192">
+            <a:extLst>
+              <a:ext uri="{FF2B5EF4-FFF2-40B4-BE49-F238E27FC236}">
+                <a16:creationId xmlns:a16="http://schemas.microsoft.com/office/drawing/2014/main" id="{2A5BAA3F-7E42-4746-916B-E1DAA325B92A}"/>
+              </a:ext>
+            </a:extLst>
+          </p:cNvPr>
+          <p:cNvCxnSpPr>
+            <a:cxnSpLocks/>
+          </p:cNvCxnSpPr>
+          <p:nvPr/>
+        </p:nvCxnSpPr>
+        <p:spPr bwMode="auto">
+          <a:xfrm>
+            <a:off x="5392873" y="1904404"/>
+            <a:ext cx="5061" cy="346516"/>
+          </a:xfrm>
+          <a:prstGeom prst="straightConnector1">
+            <a:avLst/>
+          </a:prstGeom>
+          <a:solidFill>
+            <a:srgbClr val="0C2D83"/>
+          </a:solidFill>
+          <a:ln w="12700" cap="flat" cmpd="sng" algn="ctr">
+            <a:solidFill>
+              <a:schemeClr val="tx1"/>
+            </a:solidFill>
+            <a:prstDash val="solid"/>
+            <a:round/>
+            <a:headEnd type="none" w="med" len="med"/>
+            <a:tailEnd type="triangle"/>
+          </a:ln>
+          <a:effectLst/>
+        </p:spPr>
+      </p:cxnSp>
+      <p:sp>
+        <p:nvSpPr>
+          <p:cNvPr id="194" name="TextBox 193">
+            <a:extLst>
+              <a:ext uri="{FF2B5EF4-FFF2-40B4-BE49-F238E27FC236}">
+                <a16:creationId xmlns:a16="http://schemas.microsoft.com/office/drawing/2014/main" id="{A65B0AE0-E2DA-4E11-8A89-01726F2C9011}"/>
+              </a:ext>
+            </a:extLst>
+          </p:cNvPr>
+          <p:cNvSpPr txBox="1"/>
+          <p:nvPr/>
+        </p:nvSpPr>
+        <p:spPr>
+          <a:xfrm>
+            <a:off x="5061992" y="2521264"/>
+            <a:ext cx="284545" cy="246221"/>
+          </a:xfrm>
+          <a:prstGeom prst="rect">
+            <a:avLst/>
+          </a:prstGeom>
+          <a:solidFill>
+            <a:schemeClr val="bg1"/>
+          </a:solidFill>
+        </p:spPr>
+        <p:txBody>
+          <a:bodyPr wrap="square" rtlCol="0">
+            <a:spAutoFit/>
+          </a:bodyPr>
+          <a:lstStyle/>
+          <a:p>
+            <a:r>
+              <a:rPr lang="en-US" sz="1000" dirty="0">
+                <a:latin typeface="Tahoma" panose="020B0604030504040204" pitchFamily="34" charset="0"/>
+                <a:ea typeface="Tahoma" panose="020B0604030504040204" pitchFamily="34" charset="0"/>
+                <a:cs typeface="Tahoma" panose="020B0604030504040204" pitchFamily="34" charset="0"/>
+              </a:rPr>
+              <a:t>5</a:t>
+            </a:r>
+          </a:p>
+        </p:txBody>
+      </p:sp>
+      <p:cxnSp>
+        <p:nvCxnSpPr>
+          <p:cNvPr id="195" name="Straight Connector 194">
+            <a:extLst>
+              <a:ext uri="{FF2B5EF4-FFF2-40B4-BE49-F238E27FC236}">
+                <a16:creationId xmlns:a16="http://schemas.microsoft.com/office/drawing/2014/main" id="{684D3A98-35E8-40A0-B838-7414D05864B1}"/>
+              </a:ext>
+            </a:extLst>
+          </p:cNvPr>
+          <p:cNvCxnSpPr>
+            <a:cxnSpLocks/>
+          </p:cNvCxnSpPr>
+          <p:nvPr/>
+        </p:nvCxnSpPr>
+        <p:spPr bwMode="auto">
+          <a:xfrm flipH="1">
+            <a:off x="4943211" y="2574039"/>
+            <a:ext cx="103454" cy="99875"/>
+          </a:xfrm>
+          <a:prstGeom prst="line">
+            <a:avLst/>
+          </a:prstGeom>
+          <a:solidFill>
+            <a:srgbClr val="0C2D83"/>
+          </a:solidFill>
+          <a:ln w="12700" cap="flat" cmpd="sng" algn="ctr">
+            <a:solidFill>
+              <a:schemeClr val="tx1"/>
+            </a:solidFill>
+            <a:prstDash val="solid"/>
+            <a:round/>
+            <a:headEnd type="none" w="med" len="med"/>
+            <a:tailEnd type="none" w="med" len="med"/>
+          </a:ln>
+          <a:effectLst/>
+        </p:spPr>
+      </p:cxnSp>
+      <p:cxnSp>
+        <p:nvCxnSpPr>
+          <p:cNvPr id="196" name="Straight Arrow Connector 195">
+            <a:extLst>
+              <a:ext uri="{FF2B5EF4-FFF2-40B4-BE49-F238E27FC236}">
+                <a16:creationId xmlns:a16="http://schemas.microsoft.com/office/drawing/2014/main" id="{2A2C23A1-E27E-4A23-B44B-3F78B32AB3ED}"/>
+              </a:ext>
+            </a:extLst>
+          </p:cNvPr>
+          <p:cNvCxnSpPr>
+            <a:cxnSpLocks/>
+          </p:cNvCxnSpPr>
+          <p:nvPr/>
+        </p:nvCxnSpPr>
+        <p:spPr bwMode="auto">
+          <a:xfrm>
+            <a:off x="4989025" y="2509424"/>
+            <a:ext cx="8769" cy="291976"/>
+          </a:xfrm>
+          <a:prstGeom prst="straightConnector1">
+            <a:avLst/>
+          </a:prstGeom>
+          <a:solidFill>
+            <a:srgbClr val="0C2D83"/>
+          </a:solidFill>
+          <a:ln w="12700" cap="flat" cmpd="sng" algn="ctr">
+            <a:solidFill>
+              <a:schemeClr val="tx1"/>
+            </a:solidFill>
+            <a:prstDash val="solid"/>
+            <a:round/>
+            <a:headEnd type="none" w="med" len="med"/>
+            <a:tailEnd type="triangle"/>
+          </a:ln>
+          <a:effectLst/>
+        </p:spPr>
+      </p:cxnSp>
+      <p:sp>
+        <p:nvSpPr>
+          <p:cNvPr id="197" name="TextBox 196">
+            <a:extLst>
+              <a:ext uri="{FF2B5EF4-FFF2-40B4-BE49-F238E27FC236}">
+                <a16:creationId xmlns:a16="http://schemas.microsoft.com/office/drawing/2014/main" id="{28D97647-ED80-4294-86CC-16DEB27FC927}"/>
+              </a:ext>
+            </a:extLst>
+          </p:cNvPr>
+          <p:cNvSpPr txBox="1"/>
+          <p:nvPr/>
+        </p:nvSpPr>
+        <p:spPr>
+          <a:xfrm>
+            <a:off x="5239026" y="2522491"/>
+            <a:ext cx="513933" cy="276999"/>
+          </a:xfrm>
+          <a:prstGeom prst="rect">
+            <a:avLst/>
+          </a:prstGeom>
+          <a:noFill/>
+        </p:spPr>
+        <p:txBody>
+          <a:bodyPr wrap="square" rtlCol="0">
+            <a:spAutoFit/>
+          </a:bodyPr>
+          <a:lstStyle/>
+          <a:p>
+            <a:r>
+              <a:rPr lang="en-US" sz="1200" dirty="0">
+                <a:solidFill>
+                  <a:srgbClr val="FF0000"/>
+                </a:solidFill>
+                <a:latin typeface="Tahoma" panose="020B0604030504040204" pitchFamily="34" charset="0"/>
+                <a:ea typeface="Tahoma" panose="020B0604030504040204" pitchFamily="34" charset="0"/>
+                <a:cs typeface="Tahoma" panose="020B0604030504040204" pitchFamily="34" charset="0"/>
+              </a:rPr>
+              <a:t>Q1.4</a:t>
+            </a:r>
+          </a:p>
+        </p:txBody>
+      </p:sp>
+      <p:cxnSp>
+        <p:nvCxnSpPr>
+          <p:cNvPr id="198" name="Straight Connector 197">
+            <a:extLst>
+              <a:ext uri="{FF2B5EF4-FFF2-40B4-BE49-F238E27FC236}">
+                <a16:creationId xmlns:a16="http://schemas.microsoft.com/office/drawing/2014/main" id="{031124A9-7323-4143-BE5A-12A87D4746E6}"/>
+              </a:ext>
+            </a:extLst>
+          </p:cNvPr>
+          <p:cNvCxnSpPr>
+            <a:cxnSpLocks/>
+          </p:cNvCxnSpPr>
+          <p:nvPr/>
+        </p:nvCxnSpPr>
+        <p:spPr bwMode="auto">
+          <a:xfrm flipH="1">
+            <a:off x="4652083" y="3344434"/>
+            <a:ext cx="103454" cy="99875"/>
+          </a:xfrm>
+          <a:prstGeom prst="line">
+            <a:avLst/>
+          </a:prstGeom>
+          <a:solidFill>
+            <a:srgbClr val="0C2D83"/>
+          </a:solidFill>
+          <a:ln w="12700" cap="flat" cmpd="sng" algn="ctr">
+            <a:solidFill>
+              <a:schemeClr val="tx1"/>
+            </a:solidFill>
+            <a:prstDash val="solid"/>
+            <a:round/>
+            <a:headEnd type="none" w="med" len="med"/>
+            <a:tailEnd type="none" w="med" len="med"/>
+          </a:ln>
+          <a:effectLst/>
+        </p:spPr>
+      </p:cxnSp>
+      <p:cxnSp>
+        <p:nvCxnSpPr>
+          <p:cNvPr id="199" name="Straight Arrow Connector 198">
+            <a:extLst>
+              <a:ext uri="{FF2B5EF4-FFF2-40B4-BE49-F238E27FC236}">
+                <a16:creationId xmlns:a16="http://schemas.microsoft.com/office/drawing/2014/main" id="{83771592-B144-42DE-87E7-ADA230526AFE}"/>
+              </a:ext>
+            </a:extLst>
+          </p:cNvPr>
+          <p:cNvCxnSpPr>
+            <a:cxnSpLocks/>
+          </p:cNvCxnSpPr>
+          <p:nvPr/>
+        </p:nvCxnSpPr>
+        <p:spPr bwMode="auto">
+          <a:xfrm>
+            <a:off x="4697897" y="3279819"/>
+            <a:ext cx="8769" cy="291976"/>
+          </a:xfrm>
+          <a:prstGeom prst="straightConnector1">
+            <a:avLst/>
+          </a:prstGeom>
+          <a:solidFill>
+            <a:srgbClr val="0C2D83"/>
+          </a:solidFill>
+          <a:ln w="12700" cap="flat" cmpd="sng" algn="ctr">
+            <a:solidFill>
+              <a:schemeClr val="tx1"/>
+            </a:solidFill>
+            <a:prstDash val="solid"/>
+            <a:round/>
+            <a:headEnd type="none" w="med" len="med"/>
+            <a:tailEnd type="triangle"/>
+          </a:ln>
+          <a:effectLst/>
+        </p:spPr>
+      </p:cxnSp>
+      <p:sp>
+        <p:nvSpPr>
+          <p:cNvPr id="18" name="Rectangle 17">
+            <a:extLst>
+              <a:ext uri="{FF2B5EF4-FFF2-40B4-BE49-F238E27FC236}">
+                <a16:creationId xmlns:a16="http://schemas.microsoft.com/office/drawing/2014/main" id="{987539B4-6338-47CF-8124-1C673A28505F}"/>
               </a:ext>
             </a:extLst>
           </p:cNvPr>
@@ -10251,8 +11847,8 @@
         </p:nvSpPr>
         <p:spPr bwMode="auto">
           <a:xfrm>
-            <a:off x="8641976" y="1246166"/>
-            <a:ext cx="1617951" cy="4339314"/>
+            <a:off x="7074941" y="2983715"/>
+            <a:ext cx="256967" cy="229610"/>
           </a:xfrm>
           <a:prstGeom prst="rect">
             <a:avLst/>
@@ -10263,6 +11859,735 @@
           <a:ln w="12700" cap="flat" cmpd="sng" algn="ctr">
             <a:solidFill>
               <a:schemeClr val="bg1"/>
+            </a:solidFill>
+            <a:prstDash val="solid"/>
+            <a:round/>
+            <a:headEnd type="none" w="med" len="med"/>
+            <a:tailEnd type="none" w="med" len="med"/>
+          </a:ln>
+          <a:effectLst/>
+        </p:spPr>
+        <p:txBody>
+          <a:bodyPr vert="horz" wrap="square" lIns="91440" tIns="45720" rIns="91440" bIns="45720" numCol="1" rtlCol="0" anchor="ctr" anchorCtr="0" compatLnSpc="1">
+            <a:prstTxWarp prst="textNoShape">
+              <a:avLst/>
+            </a:prstTxWarp>
+          </a:bodyPr>
+          <a:lstStyle/>
+          <a:p>
+            <a:pPr marL="0" marR="0" indent="0" algn="ctr" defTabSz="914400" rtl="0" eaLnBrk="0" fontAlgn="base" latinLnBrk="0" hangingPunct="0">
+              <a:lnSpc>
+                <a:spcPct val="100000"/>
+              </a:lnSpc>
+              <a:spcBef>
+                <a:spcPct val="0"/>
+              </a:spcBef>
+              <a:spcAft>
+                <a:spcPct val="0"/>
+              </a:spcAft>
+              <a:buClrTx/>
+              <a:buSzTx/>
+              <a:buFontTx/>
+              <a:buNone/>
+              <a:tabLst/>
+            </a:pPr>
+            <a:r>
+              <a:rPr kumimoji="0" lang="en-US" sz="1400" b="1" i="0" u="none" strike="noStrike" cap="none" normalizeH="0" baseline="0" dirty="0">
+                <a:ln>
+                  <a:noFill/>
+                </a:ln>
+                <a:solidFill>
+                  <a:schemeClr val="tx1"/>
+                </a:solidFill>
+                <a:effectLst/>
+                <a:latin typeface="Arial" pitchFamily="34" charset="0"/>
+              </a:rPr>
+              <a:t>X</a:t>
+            </a:r>
+          </a:p>
+        </p:txBody>
+      </p:sp>
+      <p:sp>
+        <p:nvSpPr>
+          <p:cNvPr id="200" name="Rectangle 199">
+            <a:extLst>
+              <a:ext uri="{FF2B5EF4-FFF2-40B4-BE49-F238E27FC236}">
+                <a16:creationId xmlns:a16="http://schemas.microsoft.com/office/drawing/2014/main" id="{7DCF5C6C-D752-4021-92DA-30960D2508B8}"/>
+              </a:ext>
+            </a:extLst>
+          </p:cNvPr>
+          <p:cNvSpPr/>
+          <p:nvPr/>
+        </p:nvSpPr>
+        <p:spPr bwMode="auto">
+          <a:xfrm>
+            <a:off x="4284893" y="2170932"/>
+            <a:ext cx="256967" cy="188775"/>
+          </a:xfrm>
+          <a:prstGeom prst="rect">
+            <a:avLst/>
+          </a:prstGeom>
+          <a:solidFill>
+            <a:schemeClr val="bg1"/>
+          </a:solidFill>
+          <a:ln w="12700" cap="flat" cmpd="sng" algn="ctr">
+            <a:noFill/>
+            <a:prstDash val="solid"/>
+            <a:round/>
+            <a:headEnd type="none" w="med" len="med"/>
+            <a:tailEnd type="none" w="med" len="med"/>
+          </a:ln>
+          <a:effectLst/>
+        </p:spPr>
+        <p:txBody>
+          <a:bodyPr vert="horz" wrap="square" lIns="91440" tIns="45720" rIns="91440" bIns="45720" numCol="1" rtlCol="0" anchor="ctr" anchorCtr="0" compatLnSpc="1">
+            <a:prstTxWarp prst="textNoShape">
+              <a:avLst/>
+            </a:prstTxWarp>
+          </a:bodyPr>
+          <a:lstStyle/>
+          <a:p>
+            <a:pPr marL="0" marR="0" indent="0" algn="ctr" defTabSz="914400" rtl="0" eaLnBrk="0" fontAlgn="base" latinLnBrk="0" hangingPunct="0">
+              <a:lnSpc>
+                <a:spcPct val="100000"/>
+              </a:lnSpc>
+              <a:spcBef>
+                <a:spcPct val="0"/>
+              </a:spcBef>
+              <a:spcAft>
+                <a:spcPct val="0"/>
+              </a:spcAft>
+              <a:buClrTx/>
+              <a:buSzTx/>
+              <a:buFontTx/>
+              <a:buNone/>
+              <a:tabLst/>
+            </a:pPr>
+            <a:r>
+              <a:rPr kumimoji="0" lang="en-US" sz="1800" b="1" i="0" u="none" strike="noStrike" cap="none" normalizeH="0" baseline="0" dirty="0">
+                <a:ln>
+                  <a:noFill/>
+                </a:ln>
+                <a:solidFill>
+                  <a:schemeClr val="tx1"/>
+                </a:solidFill>
+                <a:effectLst/>
+                <a:latin typeface="Arial" pitchFamily="34" charset="0"/>
+              </a:rPr>
+              <a:t>-</a:t>
+            </a:r>
+          </a:p>
+        </p:txBody>
+      </p:sp>
+      <p:sp>
+        <p:nvSpPr>
+          <p:cNvPr id="201" name="Rectangle 200">
+            <a:extLst>
+              <a:ext uri="{FF2B5EF4-FFF2-40B4-BE49-F238E27FC236}">
+                <a16:creationId xmlns:a16="http://schemas.microsoft.com/office/drawing/2014/main" id="{BABF0F57-74F1-4755-AE26-DEF01443D82F}"/>
+              </a:ext>
+            </a:extLst>
+          </p:cNvPr>
+          <p:cNvSpPr/>
+          <p:nvPr/>
+        </p:nvSpPr>
+        <p:spPr bwMode="auto">
+          <a:xfrm>
+            <a:off x="4571666" y="2993042"/>
+            <a:ext cx="256967" cy="229610"/>
+          </a:xfrm>
+          <a:prstGeom prst="rect">
+            <a:avLst/>
+          </a:prstGeom>
+          <a:solidFill>
+            <a:schemeClr val="bg1"/>
+          </a:solidFill>
+          <a:ln w="12700" cap="flat" cmpd="sng" algn="ctr">
+            <a:solidFill>
+              <a:schemeClr val="bg1"/>
+            </a:solidFill>
+            <a:prstDash val="solid"/>
+            <a:round/>
+            <a:headEnd type="none" w="med" len="med"/>
+            <a:tailEnd type="none" w="med" len="med"/>
+          </a:ln>
+          <a:effectLst/>
+        </p:spPr>
+        <p:txBody>
+          <a:bodyPr vert="horz" wrap="square" lIns="91440" tIns="45720" rIns="91440" bIns="45720" numCol="1" rtlCol="0" anchor="ctr" anchorCtr="0" compatLnSpc="1">
+            <a:prstTxWarp prst="textNoShape">
+              <a:avLst/>
+            </a:prstTxWarp>
+          </a:bodyPr>
+          <a:lstStyle/>
+          <a:p>
+            <a:pPr marL="0" marR="0" indent="0" algn="ctr" defTabSz="914400" rtl="0" eaLnBrk="0" fontAlgn="base" latinLnBrk="0" hangingPunct="0">
+              <a:lnSpc>
+                <a:spcPct val="100000"/>
+              </a:lnSpc>
+              <a:spcBef>
+                <a:spcPct val="0"/>
+              </a:spcBef>
+              <a:spcAft>
+                <a:spcPct val="0"/>
+              </a:spcAft>
+              <a:buClrTx/>
+              <a:buSzTx/>
+              <a:buFontTx/>
+              <a:buNone/>
+              <a:tabLst/>
+            </a:pPr>
+            <a:r>
+              <a:rPr kumimoji="0" lang="en-US" sz="1400" b="1" i="0" u="none" strike="noStrike" cap="none" normalizeH="0" baseline="0" dirty="0">
+                <a:ln>
+                  <a:noFill/>
+                </a:ln>
+                <a:solidFill>
+                  <a:schemeClr val="tx1"/>
+                </a:solidFill>
+                <a:effectLst/>
+                <a:latin typeface="Arial" pitchFamily="34" charset="0"/>
+              </a:rPr>
+              <a:t>X</a:t>
+            </a:r>
+          </a:p>
+        </p:txBody>
+      </p:sp>
+      <p:cxnSp>
+        <p:nvCxnSpPr>
+          <p:cNvPr id="202" name="Straight Connector 201">
+            <a:extLst>
+              <a:ext uri="{FF2B5EF4-FFF2-40B4-BE49-F238E27FC236}">
+                <a16:creationId xmlns:a16="http://schemas.microsoft.com/office/drawing/2014/main" id="{BEE1951F-1E69-4181-835F-B354D0A9C7E7}"/>
+              </a:ext>
+            </a:extLst>
+          </p:cNvPr>
+          <p:cNvCxnSpPr>
+            <a:cxnSpLocks/>
+          </p:cNvCxnSpPr>
+          <p:nvPr/>
+        </p:nvCxnSpPr>
+        <p:spPr bwMode="auto">
+          <a:xfrm flipH="1">
+            <a:off x="4709723" y="4233290"/>
+            <a:ext cx="103454" cy="99875"/>
+          </a:xfrm>
+          <a:prstGeom prst="line">
+            <a:avLst/>
+          </a:prstGeom>
+          <a:solidFill>
+            <a:srgbClr val="0C2D83"/>
+          </a:solidFill>
+          <a:ln w="12700" cap="flat" cmpd="sng" algn="ctr">
+            <a:solidFill>
+              <a:schemeClr val="tx1"/>
+            </a:solidFill>
+            <a:prstDash val="solid"/>
+            <a:round/>
+            <a:headEnd type="none" w="med" len="med"/>
+            <a:tailEnd type="none" w="med" len="med"/>
+          </a:ln>
+          <a:effectLst/>
+        </p:spPr>
+      </p:cxnSp>
+      <p:cxnSp>
+        <p:nvCxnSpPr>
+          <p:cNvPr id="203" name="Straight Arrow Connector 202">
+            <a:extLst>
+              <a:ext uri="{FF2B5EF4-FFF2-40B4-BE49-F238E27FC236}">
+                <a16:creationId xmlns:a16="http://schemas.microsoft.com/office/drawing/2014/main" id="{F1E408EB-4CDB-47DA-92C0-869CF729CCE0}"/>
+              </a:ext>
+            </a:extLst>
+          </p:cNvPr>
+          <p:cNvCxnSpPr>
+            <a:cxnSpLocks/>
+          </p:cNvCxnSpPr>
+          <p:nvPr/>
+        </p:nvCxnSpPr>
+        <p:spPr bwMode="auto">
+          <a:xfrm>
+            <a:off x="4755537" y="4168675"/>
+            <a:ext cx="8769" cy="291976"/>
+          </a:xfrm>
+          <a:prstGeom prst="straightConnector1">
+            <a:avLst/>
+          </a:prstGeom>
+          <a:solidFill>
+            <a:srgbClr val="0C2D83"/>
+          </a:solidFill>
+          <a:ln w="12700" cap="flat" cmpd="sng" algn="ctr">
+            <a:solidFill>
+              <a:schemeClr val="tx1"/>
+            </a:solidFill>
+            <a:prstDash val="solid"/>
+            <a:round/>
+            <a:headEnd type="none" w="med" len="med"/>
+            <a:tailEnd type="triangle"/>
+          </a:ln>
+          <a:effectLst/>
+        </p:spPr>
+      </p:cxnSp>
+      <p:cxnSp>
+        <p:nvCxnSpPr>
+          <p:cNvPr id="204" name="Straight Arrow Connector 203">
+            <a:extLst>
+              <a:ext uri="{FF2B5EF4-FFF2-40B4-BE49-F238E27FC236}">
+                <a16:creationId xmlns:a16="http://schemas.microsoft.com/office/drawing/2014/main" id="{F5BB9C36-B831-4207-B2DE-D828E7F21520}"/>
+              </a:ext>
+            </a:extLst>
+          </p:cNvPr>
+          <p:cNvCxnSpPr>
+            <a:cxnSpLocks/>
+          </p:cNvCxnSpPr>
+          <p:nvPr/>
+        </p:nvCxnSpPr>
+        <p:spPr bwMode="auto">
+          <a:xfrm>
+            <a:off x="5341957" y="4176410"/>
+            <a:ext cx="8769" cy="291976"/>
+          </a:xfrm>
+          <a:prstGeom prst="straightConnector1">
+            <a:avLst/>
+          </a:prstGeom>
+          <a:solidFill>
+            <a:srgbClr val="0C2D83"/>
+          </a:solidFill>
+          <a:ln w="12700" cap="flat" cmpd="sng" algn="ctr">
+            <a:solidFill>
+              <a:schemeClr val="tx1"/>
+            </a:solidFill>
+            <a:prstDash val="solid"/>
+            <a:round/>
+            <a:headEnd type="none" w="med" len="med"/>
+            <a:tailEnd type="triangle"/>
+          </a:ln>
+          <a:effectLst/>
+        </p:spPr>
+      </p:cxnSp>
+      <p:cxnSp>
+        <p:nvCxnSpPr>
+          <p:cNvPr id="205" name="Straight Connector 204">
+            <a:extLst>
+              <a:ext uri="{FF2B5EF4-FFF2-40B4-BE49-F238E27FC236}">
+                <a16:creationId xmlns:a16="http://schemas.microsoft.com/office/drawing/2014/main" id="{F7858DA8-6DE5-4DB4-A24D-B5D436577FEA}"/>
+              </a:ext>
+            </a:extLst>
+          </p:cNvPr>
+          <p:cNvCxnSpPr>
+            <a:cxnSpLocks/>
+          </p:cNvCxnSpPr>
+          <p:nvPr/>
+        </p:nvCxnSpPr>
+        <p:spPr bwMode="auto">
+          <a:xfrm flipH="1">
+            <a:off x="5725653" y="3952515"/>
+            <a:ext cx="103454" cy="99875"/>
+          </a:xfrm>
+          <a:prstGeom prst="line">
+            <a:avLst/>
+          </a:prstGeom>
+          <a:solidFill>
+            <a:srgbClr val="0C2D83"/>
+          </a:solidFill>
+          <a:ln w="12700" cap="flat" cmpd="sng" algn="ctr">
+            <a:solidFill>
+              <a:schemeClr val="tx1"/>
+            </a:solidFill>
+            <a:prstDash val="solid"/>
+            <a:round/>
+            <a:headEnd type="none" w="med" len="med"/>
+            <a:tailEnd type="none" w="med" len="med"/>
+          </a:ln>
+          <a:effectLst/>
+        </p:spPr>
+      </p:cxnSp>
+      <p:cxnSp>
+        <p:nvCxnSpPr>
+          <p:cNvPr id="206" name="Straight Arrow Connector 205">
+            <a:extLst>
+              <a:ext uri="{FF2B5EF4-FFF2-40B4-BE49-F238E27FC236}">
+                <a16:creationId xmlns:a16="http://schemas.microsoft.com/office/drawing/2014/main" id="{376E4B03-412B-4524-BBCA-3D628F76F7CB}"/>
+              </a:ext>
+            </a:extLst>
+          </p:cNvPr>
+          <p:cNvCxnSpPr>
+            <a:cxnSpLocks/>
+          </p:cNvCxnSpPr>
+          <p:nvPr/>
+        </p:nvCxnSpPr>
+        <p:spPr bwMode="auto">
+          <a:xfrm>
+            <a:off x="5771467" y="3887900"/>
+            <a:ext cx="8769" cy="291976"/>
+          </a:xfrm>
+          <a:prstGeom prst="straightConnector1">
+            <a:avLst/>
+          </a:prstGeom>
+          <a:solidFill>
+            <a:srgbClr val="0C2D83"/>
+          </a:solidFill>
+          <a:ln w="12700" cap="flat" cmpd="sng" algn="ctr">
+            <a:solidFill>
+              <a:schemeClr val="tx1"/>
+            </a:solidFill>
+            <a:prstDash val="solid"/>
+            <a:round/>
+            <a:headEnd type="none" w="med" len="med"/>
+            <a:tailEnd type="none"/>
+          </a:ln>
+          <a:effectLst/>
+        </p:spPr>
+      </p:cxnSp>
+      <p:cxnSp>
+        <p:nvCxnSpPr>
+          <p:cNvPr id="20" name="Straight Connector 19">
+            <a:extLst>
+              <a:ext uri="{FF2B5EF4-FFF2-40B4-BE49-F238E27FC236}">
+                <a16:creationId xmlns:a16="http://schemas.microsoft.com/office/drawing/2014/main" id="{E50453FF-1B4B-4FC7-81CB-9EB7295778EC}"/>
+              </a:ext>
+            </a:extLst>
+          </p:cNvPr>
+          <p:cNvCxnSpPr/>
+          <p:nvPr/>
+        </p:nvCxnSpPr>
+        <p:spPr bwMode="auto">
+          <a:xfrm>
+            <a:off x="5341957" y="4175701"/>
+            <a:ext cx="447048" cy="0"/>
+          </a:xfrm>
+          <a:prstGeom prst="line">
+            <a:avLst/>
+          </a:prstGeom>
+          <a:solidFill>
+            <a:srgbClr val="0C2D83"/>
+          </a:solidFill>
+          <a:ln w="12700" cap="flat" cmpd="sng" algn="ctr">
+            <a:solidFill>
+              <a:schemeClr val="tx1"/>
+            </a:solidFill>
+            <a:prstDash val="solid"/>
+            <a:round/>
+            <a:headEnd type="none" w="med" len="med"/>
+            <a:tailEnd type="none" w="med" len="med"/>
+          </a:ln>
+          <a:effectLst/>
+        </p:spPr>
+      </p:cxnSp>
+      <p:sp>
+        <p:nvSpPr>
+          <p:cNvPr id="207" name="TextBox 206">
+            <a:extLst>
+              <a:ext uri="{FF2B5EF4-FFF2-40B4-BE49-F238E27FC236}">
+                <a16:creationId xmlns:a16="http://schemas.microsoft.com/office/drawing/2014/main" id="{48ABF5BC-65AB-452D-A272-1B1680F7C880}"/>
+              </a:ext>
+            </a:extLst>
+          </p:cNvPr>
+          <p:cNvSpPr txBox="1"/>
+          <p:nvPr/>
+        </p:nvSpPr>
+        <p:spPr>
+          <a:xfrm>
+            <a:off x="5448601" y="3433555"/>
+            <a:ext cx="513933" cy="276999"/>
+          </a:xfrm>
+          <a:prstGeom prst="rect">
+            <a:avLst/>
+          </a:prstGeom>
+          <a:noFill/>
+        </p:spPr>
+        <p:txBody>
+          <a:bodyPr wrap="square" rtlCol="0">
+            <a:spAutoFit/>
+          </a:bodyPr>
+          <a:lstStyle/>
+          <a:p>
+            <a:r>
+              <a:rPr lang="en-US" sz="1200" dirty="0">
+                <a:solidFill>
+                  <a:srgbClr val="FF0000"/>
+                </a:solidFill>
+                <a:latin typeface="Tahoma" panose="020B0604030504040204" pitchFamily="34" charset="0"/>
+                <a:ea typeface="Tahoma" panose="020B0604030504040204" pitchFamily="34" charset="0"/>
+                <a:cs typeface="Tahoma" panose="020B0604030504040204" pitchFamily="34" charset="0"/>
+              </a:rPr>
+              <a:t>Q8.0</a:t>
+            </a:r>
+          </a:p>
+        </p:txBody>
+      </p:sp>
+      <p:sp>
+        <p:nvSpPr>
+          <p:cNvPr id="162" name="TextBox 161">
+            <a:extLst>
+              <a:ext uri="{FF2B5EF4-FFF2-40B4-BE49-F238E27FC236}">
+                <a16:creationId xmlns:a16="http://schemas.microsoft.com/office/drawing/2014/main" id="{0180380B-A4F9-4F0D-966D-7F1FC1F9B29A}"/>
+              </a:ext>
+            </a:extLst>
+          </p:cNvPr>
+          <p:cNvSpPr txBox="1"/>
+          <p:nvPr/>
+        </p:nvSpPr>
+        <p:spPr>
+          <a:xfrm>
+            <a:off x="4157826" y="4162183"/>
+            <a:ext cx="513933" cy="276999"/>
+          </a:xfrm>
+          <a:prstGeom prst="rect">
+            <a:avLst/>
+          </a:prstGeom>
+          <a:noFill/>
+        </p:spPr>
+        <p:txBody>
+          <a:bodyPr wrap="square" rtlCol="0">
+            <a:spAutoFit/>
+          </a:bodyPr>
+          <a:lstStyle/>
+          <a:p>
+            <a:r>
+              <a:rPr lang="en-US" sz="1200" dirty="0">
+                <a:solidFill>
+                  <a:srgbClr val="FF0000"/>
+                </a:solidFill>
+                <a:latin typeface="Tahoma" panose="020B0604030504040204" pitchFamily="34" charset="0"/>
+                <a:ea typeface="Tahoma" panose="020B0604030504040204" pitchFamily="34" charset="0"/>
+                <a:cs typeface="Tahoma" panose="020B0604030504040204" pitchFamily="34" charset="0"/>
+              </a:rPr>
+              <a:t>Q8.0</a:t>
+            </a:r>
+          </a:p>
+        </p:txBody>
+      </p:sp>
+      <p:cxnSp>
+        <p:nvCxnSpPr>
+          <p:cNvPr id="208" name="Straight Connector 207">
+            <a:extLst>
+              <a:ext uri="{FF2B5EF4-FFF2-40B4-BE49-F238E27FC236}">
+                <a16:creationId xmlns:a16="http://schemas.microsoft.com/office/drawing/2014/main" id="{814B894D-1371-4C9B-9F35-4A894E3237C7}"/>
+              </a:ext>
+            </a:extLst>
+          </p:cNvPr>
+          <p:cNvCxnSpPr>
+            <a:cxnSpLocks/>
+          </p:cNvCxnSpPr>
+          <p:nvPr/>
+        </p:nvCxnSpPr>
+        <p:spPr bwMode="auto">
+          <a:xfrm flipH="1">
+            <a:off x="4996466" y="5002389"/>
+            <a:ext cx="103454" cy="99875"/>
+          </a:xfrm>
+          <a:prstGeom prst="line">
+            <a:avLst/>
+          </a:prstGeom>
+          <a:solidFill>
+            <a:srgbClr val="0C2D83"/>
+          </a:solidFill>
+          <a:ln w="12700" cap="flat" cmpd="sng" algn="ctr">
+            <a:solidFill>
+              <a:schemeClr val="tx1"/>
+            </a:solidFill>
+            <a:prstDash val="solid"/>
+            <a:round/>
+            <a:headEnd type="none" w="med" len="med"/>
+            <a:tailEnd type="none" w="med" len="med"/>
+          </a:ln>
+          <a:effectLst/>
+        </p:spPr>
+      </p:cxnSp>
+      <p:cxnSp>
+        <p:nvCxnSpPr>
+          <p:cNvPr id="209" name="Straight Arrow Connector 208">
+            <a:extLst>
+              <a:ext uri="{FF2B5EF4-FFF2-40B4-BE49-F238E27FC236}">
+                <a16:creationId xmlns:a16="http://schemas.microsoft.com/office/drawing/2014/main" id="{E1BC25F6-43D4-435D-9C5C-061F13358D73}"/>
+              </a:ext>
+            </a:extLst>
+          </p:cNvPr>
+          <p:cNvCxnSpPr>
+            <a:cxnSpLocks/>
+          </p:cNvCxnSpPr>
+          <p:nvPr/>
+        </p:nvCxnSpPr>
+        <p:spPr bwMode="auto">
+          <a:xfrm>
+            <a:off x="5042280" y="4937774"/>
+            <a:ext cx="8769" cy="291976"/>
+          </a:xfrm>
+          <a:prstGeom prst="straightConnector1">
+            <a:avLst/>
+          </a:prstGeom>
+          <a:solidFill>
+            <a:srgbClr val="0C2D83"/>
+          </a:solidFill>
+          <a:ln w="12700" cap="flat" cmpd="sng" algn="ctr">
+            <a:solidFill>
+              <a:schemeClr val="tx1"/>
+            </a:solidFill>
+            <a:prstDash val="solid"/>
+            <a:round/>
+            <a:headEnd type="none" w="med" len="med"/>
+            <a:tailEnd type="triangle"/>
+          </a:ln>
+          <a:effectLst/>
+        </p:spPr>
+      </p:cxnSp>
+      <p:sp>
+        <p:nvSpPr>
+          <p:cNvPr id="223" name="TextBox 222">
+            <a:extLst>
+              <a:ext uri="{FF2B5EF4-FFF2-40B4-BE49-F238E27FC236}">
+                <a16:creationId xmlns:a16="http://schemas.microsoft.com/office/drawing/2014/main" id="{65369131-D151-4C67-BF10-5E6FAEBC7EAA}"/>
+              </a:ext>
+            </a:extLst>
+          </p:cNvPr>
+          <p:cNvSpPr txBox="1"/>
+          <p:nvPr/>
+        </p:nvSpPr>
+        <p:spPr>
+          <a:xfrm>
+            <a:off x="5264026" y="4916029"/>
+            <a:ext cx="513933" cy="276999"/>
+          </a:xfrm>
+          <a:prstGeom prst="rect">
+            <a:avLst/>
+          </a:prstGeom>
+          <a:noFill/>
+        </p:spPr>
+        <p:txBody>
+          <a:bodyPr wrap="square" rtlCol="0">
+            <a:spAutoFit/>
+          </a:bodyPr>
+          <a:lstStyle/>
+          <a:p>
+            <a:r>
+              <a:rPr lang="en-US" sz="1200" dirty="0">
+                <a:solidFill>
+                  <a:srgbClr val="FF0000"/>
+                </a:solidFill>
+                <a:latin typeface="Tahoma" panose="020B0604030504040204" pitchFamily="34" charset="0"/>
+                <a:ea typeface="Tahoma" panose="020B0604030504040204" pitchFamily="34" charset="0"/>
+                <a:cs typeface="Tahoma" panose="020B0604030504040204" pitchFamily="34" charset="0"/>
+              </a:rPr>
+              <a:t>Q8.0</a:t>
+            </a:r>
+          </a:p>
+        </p:txBody>
+      </p:sp>
+      <p:sp>
+        <p:nvSpPr>
+          <p:cNvPr id="228" name="TextBox 227">
+            <a:extLst>
+              <a:ext uri="{FF2B5EF4-FFF2-40B4-BE49-F238E27FC236}">
+                <a16:creationId xmlns:a16="http://schemas.microsoft.com/office/drawing/2014/main" id="{8953EA30-1597-4A84-973E-DA80E81DA034}"/>
+              </a:ext>
+            </a:extLst>
+          </p:cNvPr>
+          <p:cNvSpPr txBox="1"/>
+          <p:nvPr/>
+        </p:nvSpPr>
+        <p:spPr>
+          <a:xfrm>
+            <a:off x="5980382" y="2127180"/>
+            <a:ext cx="1435200" cy="276999"/>
+          </a:xfrm>
+          <a:prstGeom prst="rect">
+            <a:avLst/>
+          </a:prstGeom>
+          <a:solidFill>
+            <a:schemeClr val="bg1"/>
+          </a:solidFill>
+        </p:spPr>
+        <p:txBody>
+          <a:bodyPr wrap="none" rtlCol="0">
+            <a:spAutoFit/>
+          </a:bodyPr>
+          <a:lstStyle/>
+          <a:p>
+            <a:pPr algn="ctr">
+              <a:spcBef>
+                <a:spcPts val="0"/>
+              </a:spcBef>
+            </a:pPr>
+            <a:r>
+              <a:rPr lang="en-US" sz="1200" dirty="0">
+                <a:solidFill>
+                  <a:srgbClr val="FF0000"/>
+                </a:solidFill>
+                <a:latin typeface="Tahoma" panose="020B0604030504040204" pitchFamily="34" charset="0"/>
+                <a:ea typeface="Tahoma" panose="020B0604030504040204" pitchFamily="34" charset="0"/>
+                <a:cs typeface="Tahoma" panose="020B0604030504040204" pitchFamily="34" charset="0"/>
+              </a:rPr>
+              <a:t>Interpolated Value</a:t>
+            </a:r>
+          </a:p>
+        </p:txBody>
+      </p:sp>
+      <p:sp>
+        <p:nvSpPr>
+          <p:cNvPr id="230" name="TextBox 229">
+            <a:extLst>
+              <a:ext uri="{FF2B5EF4-FFF2-40B4-BE49-F238E27FC236}">
+                <a16:creationId xmlns:a16="http://schemas.microsoft.com/office/drawing/2014/main" id="{304DAB2A-EE63-4424-8372-4D6B2650C451}"/>
+              </a:ext>
+            </a:extLst>
+          </p:cNvPr>
+          <p:cNvSpPr txBox="1"/>
+          <p:nvPr/>
+        </p:nvSpPr>
+        <p:spPr>
+          <a:xfrm>
+            <a:off x="6592158" y="1917033"/>
+            <a:ext cx="513933" cy="276999"/>
+          </a:xfrm>
+          <a:prstGeom prst="rect">
+            <a:avLst/>
+          </a:prstGeom>
+          <a:noFill/>
+        </p:spPr>
+        <p:txBody>
+          <a:bodyPr wrap="square" rtlCol="0">
+            <a:spAutoFit/>
+          </a:bodyPr>
+          <a:lstStyle/>
+          <a:p>
+            <a:r>
+              <a:rPr lang="en-US" sz="1200" dirty="0">
+                <a:solidFill>
+                  <a:srgbClr val="FF0000"/>
+                </a:solidFill>
+                <a:latin typeface="Tahoma" panose="020B0604030504040204" pitchFamily="34" charset="0"/>
+                <a:ea typeface="Tahoma" panose="020B0604030504040204" pitchFamily="34" charset="0"/>
+                <a:cs typeface="Tahoma" panose="020B0604030504040204" pitchFamily="34" charset="0"/>
+              </a:rPr>
+              <a:t>Q8.0</a:t>
+            </a:r>
+          </a:p>
+        </p:txBody>
+      </p:sp>
+      <p:sp>
+        <p:nvSpPr>
+          <p:cNvPr id="252" name="Rectangle 251">
+            <a:extLst>
+              <a:ext uri="{FF2B5EF4-FFF2-40B4-BE49-F238E27FC236}">
+                <a16:creationId xmlns:a16="http://schemas.microsoft.com/office/drawing/2014/main" id="{1376497A-9560-4EE7-9EFB-4C16CED348F0}"/>
+              </a:ext>
+            </a:extLst>
+          </p:cNvPr>
+          <p:cNvSpPr/>
+          <p:nvPr/>
+        </p:nvSpPr>
+        <p:spPr bwMode="auto">
+          <a:xfrm>
+            <a:off x="7657328" y="1595612"/>
+            <a:ext cx="1060560" cy="367384"/>
+          </a:xfrm>
+          <a:prstGeom prst="rect">
+            <a:avLst/>
+          </a:prstGeom>
+          <a:noFill/>
+          <a:ln w="12700" cap="flat" cmpd="sng" algn="ctr">
+            <a:solidFill>
+              <a:schemeClr val="tx1"/>
             </a:solidFill>
             <a:prstDash val="solid"/>
             <a:round/>
@@ -10308,32 +12633,32 @@
           </a:p>
         </p:txBody>
       </p:sp>
-      <p:sp>
-        <p:nvSpPr>
-          <p:cNvPr id="5" name="Rectangle 4">
+      <p:cxnSp>
+        <p:nvCxnSpPr>
+          <p:cNvPr id="253" name="Straight Connector 252">
             <a:extLst>
               <a:ext uri="{FF2B5EF4-FFF2-40B4-BE49-F238E27FC236}">
-                <a16:creationId xmlns:a16="http://schemas.microsoft.com/office/drawing/2014/main" id="{F2C69A48-A708-4737-B2E1-B91F36EA9432}"/>
+                <a16:creationId xmlns:a16="http://schemas.microsoft.com/office/drawing/2014/main" id="{67066F75-D07B-4B1C-9906-53F3C2B26E8D}"/>
               </a:ext>
             </a:extLst>
           </p:cNvPr>
-          <p:cNvSpPr/>
-          <p:nvPr/>
-        </p:nvSpPr>
+          <p:cNvCxnSpPr/>
+          <p:nvPr/>
+        </p:nvCxnSpPr>
         <p:spPr bwMode="auto">
           <a:xfrm>
-            <a:off x="7686482" y="4899671"/>
-            <a:ext cx="1378813" cy="870293"/>
-          </a:xfrm>
-          <a:prstGeom prst="rect">
-            <a:avLst/>
-          </a:prstGeom>
-          <a:solidFill>
-            <a:schemeClr val="bg1"/>
+            <a:off x="7654684" y="1810767"/>
+            <a:ext cx="74104" cy="61844"/>
+          </a:xfrm>
+          <a:prstGeom prst="line">
+            <a:avLst/>
+          </a:prstGeom>
+          <a:solidFill>
+            <a:srgbClr val="0C2D83"/>
           </a:solidFill>
           <a:ln w="12700" cap="flat" cmpd="sng" algn="ctr">
             <a:solidFill>
-              <a:schemeClr val="bg1"/>
+              <a:schemeClr val="tx1"/>
             </a:solidFill>
             <a:prstDash val="solid"/>
             <a:round/>
@@ -10342,8 +12667,1160 @@
           </a:ln>
           <a:effectLst/>
         </p:spPr>
-        <p:txBody>
-          <a:bodyPr vert="horz" wrap="square" lIns="91440" tIns="45720" rIns="91440" bIns="45720" numCol="1" rtlCol="0" anchor="t" anchorCtr="0" compatLnSpc="1">
+      </p:cxnSp>
+      <p:cxnSp>
+        <p:nvCxnSpPr>
+          <p:cNvPr id="254" name="Straight Connector 253">
+            <a:extLst>
+              <a:ext uri="{FF2B5EF4-FFF2-40B4-BE49-F238E27FC236}">
+                <a16:creationId xmlns:a16="http://schemas.microsoft.com/office/drawing/2014/main" id="{DD2A6E5C-C174-4F6A-A36A-EE940B99CC22}"/>
+              </a:ext>
+            </a:extLst>
+          </p:cNvPr>
+          <p:cNvCxnSpPr/>
+          <p:nvPr/>
+        </p:nvCxnSpPr>
+        <p:spPr bwMode="auto">
+          <a:xfrm flipH="1">
+            <a:off x="7654684" y="1872611"/>
+            <a:ext cx="69770" cy="60671"/>
+          </a:xfrm>
+          <a:prstGeom prst="line">
+            <a:avLst/>
+          </a:prstGeom>
+          <a:solidFill>
+            <a:srgbClr val="0C2D83"/>
+          </a:solidFill>
+          <a:ln w="12700" cap="flat" cmpd="sng" algn="ctr">
+            <a:solidFill>
+              <a:schemeClr val="tx1"/>
+            </a:solidFill>
+            <a:prstDash val="solid"/>
+            <a:round/>
+            <a:headEnd type="none" w="med" len="med"/>
+            <a:tailEnd type="none" w="med" len="med"/>
+          </a:ln>
+          <a:effectLst/>
+        </p:spPr>
+      </p:cxnSp>
+      <p:sp>
+        <p:nvSpPr>
+          <p:cNvPr id="255" name="TextBox 254">
+            <a:extLst>
+              <a:ext uri="{FF2B5EF4-FFF2-40B4-BE49-F238E27FC236}">
+                <a16:creationId xmlns:a16="http://schemas.microsoft.com/office/drawing/2014/main" id="{84C8A656-C8C7-40DE-AB7D-AA9118210377}"/>
+              </a:ext>
+            </a:extLst>
+          </p:cNvPr>
+          <p:cNvSpPr txBox="1"/>
+          <p:nvPr/>
+        </p:nvSpPr>
+        <p:spPr>
+          <a:xfrm>
+            <a:off x="7772979" y="1549278"/>
+            <a:ext cx="904735" cy="276999"/>
+          </a:xfrm>
+          <a:prstGeom prst="rect">
+            <a:avLst/>
+          </a:prstGeom>
+          <a:noFill/>
+        </p:spPr>
+        <p:txBody>
+          <a:bodyPr wrap="none" rtlCol="0">
+            <a:spAutoFit/>
+          </a:bodyPr>
+          <a:lstStyle/>
+          <a:p>
+            <a:r>
+              <a:rPr lang="en-US" sz="1200" dirty="0">
+                <a:latin typeface="Tahoma" panose="020B0604030504040204" pitchFamily="34" charset="0"/>
+                <a:ea typeface="Tahoma" panose="020B0604030504040204" pitchFamily="34" charset="0"/>
+                <a:cs typeface="Tahoma" panose="020B0604030504040204" pitchFamily="34" charset="0"/>
+              </a:rPr>
+              <a:t>Amplify By</a:t>
+            </a:r>
+          </a:p>
+        </p:txBody>
+      </p:sp>
+      <p:cxnSp>
+        <p:nvCxnSpPr>
+          <p:cNvPr id="256" name="Straight Arrow Connector 255">
+            <a:extLst>
+              <a:ext uri="{FF2B5EF4-FFF2-40B4-BE49-F238E27FC236}">
+                <a16:creationId xmlns:a16="http://schemas.microsoft.com/office/drawing/2014/main" id="{46B85E2F-480B-4C7C-873C-8F153C2B1A36}"/>
+              </a:ext>
+            </a:extLst>
+          </p:cNvPr>
+          <p:cNvCxnSpPr/>
+          <p:nvPr/>
+        </p:nvCxnSpPr>
+        <p:spPr bwMode="auto">
+          <a:xfrm>
+            <a:off x="7447262" y="1734288"/>
+            <a:ext cx="207422" cy="0"/>
+          </a:xfrm>
+          <a:prstGeom prst="straightConnector1">
+            <a:avLst/>
+          </a:prstGeom>
+          <a:solidFill>
+            <a:srgbClr val="0C2D83"/>
+          </a:solidFill>
+          <a:ln w="12700" cap="flat" cmpd="sng" algn="ctr">
+            <a:solidFill>
+              <a:srgbClr val="00B050"/>
+            </a:solidFill>
+            <a:prstDash val="solid"/>
+            <a:round/>
+            <a:headEnd type="none" w="med" len="med"/>
+            <a:tailEnd type="triangle"/>
+          </a:ln>
+          <a:effectLst/>
+        </p:spPr>
+      </p:cxnSp>
+      <p:cxnSp>
+        <p:nvCxnSpPr>
+          <p:cNvPr id="257" name="Straight Connector 256">
+            <a:extLst>
+              <a:ext uri="{FF2B5EF4-FFF2-40B4-BE49-F238E27FC236}">
+                <a16:creationId xmlns:a16="http://schemas.microsoft.com/office/drawing/2014/main" id="{3E9B85C2-6F2E-4E62-ABAE-69285E45E9EE}"/>
+              </a:ext>
+            </a:extLst>
+          </p:cNvPr>
+          <p:cNvCxnSpPr/>
+          <p:nvPr/>
+        </p:nvCxnSpPr>
+        <p:spPr bwMode="auto">
+          <a:xfrm flipH="1">
+            <a:off x="8148636" y="1403984"/>
+            <a:ext cx="103454" cy="99875"/>
+          </a:xfrm>
+          <a:prstGeom prst="line">
+            <a:avLst/>
+          </a:prstGeom>
+          <a:solidFill>
+            <a:srgbClr val="0C2D83"/>
+          </a:solidFill>
+          <a:ln w="12700" cap="flat" cmpd="sng" algn="ctr">
+            <a:solidFill>
+              <a:schemeClr val="tx1"/>
+            </a:solidFill>
+            <a:prstDash val="solid"/>
+            <a:round/>
+            <a:headEnd type="none" w="med" len="med"/>
+            <a:tailEnd type="none" w="med" len="med"/>
+          </a:ln>
+          <a:effectLst/>
+        </p:spPr>
+      </p:cxnSp>
+      <p:cxnSp>
+        <p:nvCxnSpPr>
+          <p:cNvPr id="258" name="Straight Arrow Connector 257">
+            <a:extLst>
+              <a:ext uri="{FF2B5EF4-FFF2-40B4-BE49-F238E27FC236}">
+                <a16:creationId xmlns:a16="http://schemas.microsoft.com/office/drawing/2014/main" id="{33E58C1D-C7EA-4DE2-B3CE-028CE66152F7}"/>
+              </a:ext>
+            </a:extLst>
+          </p:cNvPr>
+          <p:cNvCxnSpPr>
+            <a:cxnSpLocks/>
+          </p:cNvCxnSpPr>
+          <p:nvPr/>
+        </p:nvCxnSpPr>
+        <p:spPr bwMode="auto">
+          <a:xfrm>
+            <a:off x="8192103" y="1252514"/>
+            <a:ext cx="5061" cy="346516"/>
+          </a:xfrm>
+          <a:prstGeom prst="straightConnector1">
+            <a:avLst/>
+          </a:prstGeom>
+          <a:solidFill>
+            <a:srgbClr val="0C2D83"/>
+          </a:solidFill>
+          <a:ln w="12700" cap="flat" cmpd="sng" algn="ctr">
+            <a:solidFill>
+              <a:schemeClr val="tx1"/>
+            </a:solidFill>
+            <a:prstDash val="solid"/>
+            <a:round/>
+            <a:headEnd type="none" w="med" len="med"/>
+            <a:tailEnd type="triangle"/>
+          </a:ln>
+          <a:effectLst/>
+        </p:spPr>
+      </p:cxnSp>
+      <p:sp>
+        <p:nvSpPr>
+          <p:cNvPr id="259" name="TextBox 258">
+            <a:extLst>
+              <a:ext uri="{FF2B5EF4-FFF2-40B4-BE49-F238E27FC236}">
+                <a16:creationId xmlns:a16="http://schemas.microsoft.com/office/drawing/2014/main" id="{A1FC83DE-205A-41FC-A236-1B0ADE2ED929}"/>
+              </a:ext>
+            </a:extLst>
+          </p:cNvPr>
+          <p:cNvSpPr txBox="1"/>
+          <p:nvPr/>
+        </p:nvSpPr>
+        <p:spPr>
+          <a:xfrm>
+            <a:off x="7832278" y="1282031"/>
+            <a:ext cx="284545" cy="276999"/>
+          </a:xfrm>
+          <a:prstGeom prst="rect">
+            <a:avLst/>
+          </a:prstGeom>
+          <a:solidFill>
+            <a:schemeClr val="bg1"/>
+          </a:solidFill>
+        </p:spPr>
+        <p:txBody>
+          <a:bodyPr wrap="square" rtlCol="0">
+            <a:spAutoFit/>
+          </a:bodyPr>
+          <a:lstStyle/>
+          <a:p>
+            <a:r>
+              <a:rPr lang="en-US" sz="1200" dirty="0">
+                <a:latin typeface="Tahoma" panose="020B0604030504040204" pitchFamily="34" charset="0"/>
+                <a:ea typeface="Tahoma" panose="020B0604030504040204" pitchFamily="34" charset="0"/>
+                <a:cs typeface="Tahoma" panose="020B0604030504040204" pitchFamily="34" charset="0"/>
+              </a:rPr>
+              <a:t>8</a:t>
+            </a:r>
+          </a:p>
+        </p:txBody>
+      </p:sp>
+      <p:cxnSp>
+        <p:nvCxnSpPr>
+          <p:cNvPr id="262" name="Straight Connector 261">
+            <a:extLst>
+              <a:ext uri="{FF2B5EF4-FFF2-40B4-BE49-F238E27FC236}">
+                <a16:creationId xmlns:a16="http://schemas.microsoft.com/office/drawing/2014/main" id="{23FBC77B-29BC-42D8-961F-11311443649A}"/>
+              </a:ext>
+            </a:extLst>
+          </p:cNvPr>
+          <p:cNvCxnSpPr>
+            <a:cxnSpLocks/>
+          </p:cNvCxnSpPr>
+          <p:nvPr/>
+        </p:nvCxnSpPr>
+        <p:spPr bwMode="auto">
+          <a:xfrm flipH="1">
+            <a:off x="8140050" y="2081049"/>
+            <a:ext cx="103454" cy="99875"/>
+          </a:xfrm>
+          <a:prstGeom prst="line">
+            <a:avLst/>
+          </a:prstGeom>
+          <a:solidFill>
+            <a:srgbClr val="0C2D83"/>
+          </a:solidFill>
+          <a:ln w="12700" cap="flat" cmpd="sng" algn="ctr">
+            <a:solidFill>
+              <a:schemeClr val="tx1"/>
+            </a:solidFill>
+            <a:prstDash val="solid"/>
+            <a:round/>
+            <a:headEnd type="none" w="med" len="med"/>
+            <a:tailEnd type="none" w="med" len="med"/>
+          </a:ln>
+          <a:effectLst/>
+        </p:spPr>
+      </p:cxnSp>
+      <p:cxnSp>
+        <p:nvCxnSpPr>
+          <p:cNvPr id="263" name="Straight Arrow Connector 262">
+            <a:extLst>
+              <a:ext uri="{FF2B5EF4-FFF2-40B4-BE49-F238E27FC236}">
+                <a16:creationId xmlns:a16="http://schemas.microsoft.com/office/drawing/2014/main" id="{3E491593-4CC4-4BEE-B6B8-9FB853B2D748}"/>
+              </a:ext>
+            </a:extLst>
+          </p:cNvPr>
+          <p:cNvCxnSpPr>
+            <a:cxnSpLocks/>
+          </p:cNvCxnSpPr>
+          <p:nvPr/>
+        </p:nvCxnSpPr>
+        <p:spPr bwMode="auto">
+          <a:xfrm>
+            <a:off x="8189572" y="1961894"/>
+            <a:ext cx="5061" cy="346516"/>
+          </a:xfrm>
+          <a:prstGeom prst="straightConnector1">
+            <a:avLst/>
+          </a:prstGeom>
+          <a:solidFill>
+            <a:srgbClr val="0C2D83"/>
+          </a:solidFill>
+          <a:ln w="12700" cap="flat" cmpd="sng" algn="ctr">
+            <a:solidFill>
+              <a:schemeClr val="tx1"/>
+            </a:solidFill>
+            <a:prstDash val="solid"/>
+            <a:round/>
+            <a:headEnd type="none" w="med" len="med"/>
+            <a:tailEnd type="triangle"/>
+          </a:ln>
+          <a:effectLst/>
+        </p:spPr>
+      </p:cxnSp>
+      <p:cxnSp>
+        <p:nvCxnSpPr>
+          <p:cNvPr id="264" name="Straight Connector 263">
+            <a:extLst>
+              <a:ext uri="{FF2B5EF4-FFF2-40B4-BE49-F238E27FC236}">
+                <a16:creationId xmlns:a16="http://schemas.microsoft.com/office/drawing/2014/main" id="{ED1A6045-CEF1-4535-A022-56A97BE2BA5F}"/>
+              </a:ext>
+            </a:extLst>
+          </p:cNvPr>
+          <p:cNvCxnSpPr>
+            <a:cxnSpLocks/>
+          </p:cNvCxnSpPr>
+          <p:nvPr/>
+        </p:nvCxnSpPr>
+        <p:spPr bwMode="auto">
+          <a:xfrm flipH="1">
+            <a:off x="6867960" y="2511375"/>
+            <a:ext cx="103454" cy="99875"/>
+          </a:xfrm>
+          <a:prstGeom prst="line">
+            <a:avLst/>
+          </a:prstGeom>
+          <a:solidFill>
+            <a:srgbClr val="0C2D83"/>
+          </a:solidFill>
+          <a:ln w="12700" cap="flat" cmpd="sng" algn="ctr">
+            <a:solidFill>
+              <a:schemeClr val="tx1"/>
+            </a:solidFill>
+            <a:prstDash val="solid"/>
+            <a:round/>
+            <a:headEnd type="none" w="med" len="med"/>
+            <a:tailEnd type="none" w="med" len="med"/>
+          </a:ln>
+          <a:effectLst/>
+        </p:spPr>
+      </p:cxnSp>
+      <p:cxnSp>
+        <p:nvCxnSpPr>
+          <p:cNvPr id="265" name="Straight Arrow Connector 264">
+            <a:extLst>
+              <a:ext uri="{FF2B5EF4-FFF2-40B4-BE49-F238E27FC236}">
+                <a16:creationId xmlns:a16="http://schemas.microsoft.com/office/drawing/2014/main" id="{D8B576AF-AC5D-4AD3-B15E-D1FC7172C009}"/>
+              </a:ext>
+            </a:extLst>
+          </p:cNvPr>
+          <p:cNvCxnSpPr>
+            <a:cxnSpLocks/>
+          </p:cNvCxnSpPr>
+          <p:nvPr/>
+        </p:nvCxnSpPr>
+        <p:spPr bwMode="auto">
+          <a:xfrm>
+            <a:off x="6911770" y="2436450"/>
+            <a:ext cx="5061" cy="346516"/>
+          </a:xfrm>
+          <a:prstGeom prst="straightConnector1">
+            <a:avLst/>
+          </a:prstGeom>
+          <a:solidFill>
+            <a:srgbClr val="0C2D83"/>
+          </a:solidFill>
+          <a:ln w="12700" cap="flat" cmpd="sng" algn="ctr">
+            <a:solidFill>
+              <a:schemeClr val="tx1"/>
+            </a:solidFill>
+            <a:prstDash val="solid"/>
+            <a:round/>
+            <a:headEnd type="none" w="med" len="med"/>
+            <a:tailEnd type="triangle"/>
+          </a:ln>
+          <a:effectLst/>
+        </p:spPr>
+      </p:cxnSp>
+      <p:cxnSp>
+        <p:nvCxnSpPr>
+          <p:cNvPr id="267" name="Straight Connector 266">
+            <a:extLst>
+              <a:ext uri="{FF2B5EF4-FFF2-40B4-BE49-F238E27FC236}">
+                <a16:creationId xmlns:a16="http://schemas.microsoft.com/office/drawing/2014/main" id="{BDDF9C5F-F23F-4C01-89D6-8465ED5F4EC2}"/>
+              </a:ext>
+            </a:extLst>
+          </p:cNvPr>
+          <p:cNvCxnSpPr>
+            <a:cxnSpLocks/>
+          </p:cNvCxnSpPr>
+          <p:nvPr/>
+        </p:nvCxnSpPr>
+        <p:spPr bwMode="auto">
+          <a:xfrm flipH="1">
+            <a:off x="7457196" y="2565619"/>
+            <a:ext cx="103454" cy="99875"/>
+          </a:xfrm>
+          <a:prstGeom prst="line">
+            <a:avLst/>
+          </a:prstGeom>
+          <a:solidFill>
+            <a:srgbClr val="0C2D83"/>
+          </a:solidFill>
+          <a:ln w="12700" cap="flat" cmpd="sng" algn="ctr">
+            <a:solidFill>
+              <a:schemeClr val="tx1"/>
+            </a:solidFill>
+            <a:prstDash val="solid"/>
+            <a:round/>
+            <a:headEnd type="none" w="med" len="med"/>
+            <a:tailEnd type="none" w="med" len="med"/>
+          </a:ln>
+          <a:effectLst/>
+        </p:spPr>
+      </p:cxnSp>
+      <p:cxnSp>
+        <p:nvCxnSpPr>
+          <p:cNvPr id="268" name="Straight Arrow Connector 267">
+            <a:extLst>
+              <a:ext uri="{FF2B5EF4-FFF2-40B4-BE49-F238E27FC236}">
+                <a16:creationId xmlns:a16="http://schemas.microsoft.com/office/drawing/2014/main" id="{7DB564A6-E323-4A89-A444-FB607BCFC7C2}"/>
+              </a:ext>
+            </a:extLst>
+          </p:cNvPr>
+          <p:cNvCxnSpPr>
+            <a:cxnSpLocks/>
+          </p:cNvCxnSpPr>
+          <p:nvPr/>
+        </p:nvCxnSpPr>
+        <p:spPr bwMode="auto">
+          <a:xfrm>
+            <a:off x="7511779" y="2533650"/>
+            <a:ext cx="0" cy="259330"/>
+          </a:xfrm>
+          <a:prstGeom prst="straightConnector1">
+            <a:avLst/>
+          </a:prstGeom>
+          <a:solidFill>
+            <a:srgbClr val="0C2D83"/>
+          </a:solidFill>
+          <a:ln w="12700" cap="flat" cmpd="sng" algn="ctr">
+            <a:solidFill>
+              <a:schemeClr val="tx1"/>
+            </a:solidFill>
+            <a:prstDash val="solid"/>
+            <a:round/>
+            <a:headEnd type="none" w="med" len="med"/>
+            <a:tailEnd type="triangle"/>
+          </a:ln>
+          <a:effectLst/>
+        </p:spPr>
+      </p:cxnSp>
+      <p:sp>
+        <p:nvSpPr>
+          <p:cNvPr id="269" name="TextBox 268">
+            <a:extLst>
+              <a:ext uri="{FF2B5EF4-FFF2-40B4-BE49-F238E27FC236}">
+                <a16:creationId xmlns:a16="http://schemas.microsoft.com/office/drawing/2014/main" id="{13C5F92F-39C0-4BD8-8E64-DCDFEC0281AF}"/>
+              </a:ext>
+            </a:extLst>
+          </p:cNvPr>
+          <p:cNvSpPr txBox="1"/>
+          <p:nvPr/>
+        </p:nvSpPr>
+        <p:spPr>
+          <a:xfrm>
+            <a:off x="7564158" y="2518081"/>
+            <a:ext cx="284545" cy="246221"/>
+          </a:xfrm>
+          <a:prstGeom prst="rect">
+            <a:avLst/>
+          </a:prstGeom>
+          <a:solidFill>
+            <a:schemeClr val="bg1"/>
+          </a:solidFill>
+        </p:spPr>
+        <p:txBody>
+          <a:bodyPr wrap="square" rtlCol="0">
+            <a:spAutoFit/>
+          </a:bodyPr>
+          <a:lstStyle/>
+          <a:p>
+            <a:r>
+              <a:rPr lang="en-US" sz="1000" dirty="0">
+                <a:latin typeface="Tahoma" panose="020B0604030504040204" pitchFamily="34" charset="0"/>
+                <a:ea typeface="Tahoma" panose="020B0604030504040204" pitchFamily="34" charset="0"/>
+                <a:cs typeface="Tahoma" panose="020B0604030504040204" pitchFamily="34" charset="0"/>
+              </a:rPr>
+              <a:t>9</a:t>
+            </a:r>
+          </a:p>
+        </p:txBody>
+      </p:sp>
+      <p:sp>
+        <p:nvSpPr>
+          <p:cNvPr id="261" name="TextBox 260">
+            <a:extLst>
+              <a:ext uri="{FF2B5EF4-FFF2-40B4-BE49-F238E27FC236}">
+                <a16:creationId xmlns:a16="http://schemas.microsoft.com/office/drawing/2014/main" id="{7131B2AF-67D3-45AC-9E41-618D3B308D55}"/>
+              </a:ext>
+            </a:extLst>
+          </p:cNvPr>
+          <p:cNvSpPr txBox="1"/>
+          <p:nvPr/>
+        </p:nvSpPr>
+        <p:spPr>
+          <a:xfrm>
+            <a:off x="7385178" y="2292951"/>
+            <a:ext cx="1055097" cy="246221"/>
+          </a:xfrm>
+          <a:prstGeom prst="rect">
+            <a:avLst/>
+          </a:prstGeom>
+          <a:solidFill>
+            <a:schemeClr val="bg1"/>
+          </a:solidFill>
+          <a:ln>
+            <a:solidFill>
+              <a:schemeClr val="tx1"/>
+            </a:solidFill>
+          </a:ln>
+        </p:spPr>
+        <p:txBody>
+          <a:bodyPr wrap="none" rtlCol="0">
+            <a:spAutoFit/>
+          </a:bodyPr>
+          <a:lstStyle/>
+          <a:p>
+            <a:r>
+              <a:rPr lang="en-US" sz="1000" dirty="0"/>
+              <a:t>Append ‘0’ </a:t>
+            </a:r>
+            <a:r>
+              <a:rPr lang="en-US" sz="1000" dirty="0" err="1"/>
+              <a:t>MSb</a:t>
+            </a:r>
+            <a:endParaRPr lang="en-US" sz="1000" dirty="0"/>
+          </a:p>
+        </p:txBody>
+      </p:sp>
+      <p:sp>
+        <p:nvSpPr>
+          <p:cNvPr id="270" name="TextBox 269">
+            <a:extLst>
+              <a:ext uri="{FF2B5EF4-FFF2-40B4-BE49-F238E27FC236}">
+                <a16:creationId xmlns:a16="http://schemas.microsoft.com/office/drawing/2014/main" id="{9724EDB6-00CE-4546-A289-0767AC4A71D8}"/>
+              </a:ext>
+            </a:extLst>
+          </p:cNvPr>
+          <p:cNvSpPr txBox="1"/>
+          <p:nvPr/>
+        </p:nvSpPr>
+        <p:spPr>
+          <a:xfrm>
+            <a:off x="6692705" y="3538761"/>
+            <a:ext cx="1031749" cy="430887"/>
+          </a:xfrm>
+          <a:prstGeom prst="rect">
+            <a:avLst/>
+          </a:prstGeom>
+          <a:solidFill>
+            <a:schemeClr val="bg1"/>
+          </a:solidFill>
+          <a:ln>
+            <a:solidFill>
+              <a:schemeClr val="tx1"/>
+            </a:solidFill>
+          </a:ln>
+        </p:spPr>
+        <p:txBody>
+          <a:bodyPr wrap="square" rtlCol="0">
+            <a:spAutoFit/>
+          </a:bodyPr>
+          <a:lstStyle/>
+          <a:p>
+            <a:pPr algn="ctr">
+              <a:spcBef>
+                <a:spcPts val="0"/>
+              </a:spcBef>
+            </a:pPr>
+            <a:r>
+              <a:rPr lang="en-US" sz="1100" dirty="0">
+                <a:solidFill>
+                  <a:schemeClr val="accent2"/>
+                </a:solidFill>
+                <a:latin typeface="Tahoma" panose="020B0604030504040204" pitchFamily="34" charset="0"/>
+                <a:ea typeface="Tahoma" panose="020B0604030504040204" pitchFamily="34" charset="0"/>
+                <a:cs typeface="Tahoma" panose="020B0604030504040204" pitchFamily="34" charset="0"/>
+              </a:rPr>
+              <a:t>remove ‘0’ &amp; truncate</a:t>
+            </a:r>
+          </a:p>
+        </p:txBody>
+      </p:sp>
+      <p:sp>
+        <p:nvSpPr>
+          <p:cNvPr id="271" name="TextBox 270">
+            <a:extLst>
+              <a:ext uri="{FF2B5EF4-FFF2-40B4-BE49-F238E27FC236}">
+                <a16:creationId xmlns:a16="http://schemas.microsoft.com/office/drawing/2014/main" id="{4319F221-1F47-41AA-AFA2-2227A730FC76}"/>
+              </a:ext>
+            </a:extLst>
+          </p:cNvPr>
+          <p:cNvSpPr txBox="1"/>
+          <p:nvPr/>
+        </p:nvSpPr>
+        <p:spPr>
+          <a:xfrm>
+            <a:off x="6799507" y="3260180"/>
+            <a:ext cx="360133" cy="276999"/>
+          </a:xfrm>
+          <a:prstGeom prst="rect">
+            <a:avLst/>
+          </a:prstGeom>
+          <a:solidFill>
+            <a:schemeClr val="bg1"/>
+          </a:solidFill>
+        </p:spPr>
+        <p:txBody>
+          <a:bodyPr wrap="square" rtlCol="0">
+            <a:spAutoFit/>
+          </a:bodyPr>
+          <a:lstStyle/>
+          <a:p>
+            <a:r>
+              <a:rPr lang="en-US" sz="1200" dirty="0">
+                <a:latin typeface="Tahoma" panose="020B0604030504040204" pitchFamily="34" charset="0"/>
+                <a:ea typeface="Tahoma" panose="020B0604030504040204" pitchFamily="34" charset="0"/>
+                <a:cs typeface="Tahoma" panose="020B0604030504040204" pitchFamily="34" charset="0"/>
+              </a:rPr>
+              <a:t>17</a:t>
+            </a:r>
+          </a:p>
+        </p:txBody>
+      </p:sp>
+      <p:cxnSp>
+        <p:nvCxnSpPr>
+          <p:cNvPr id="272" name="Straight Connector 271">
+            <a:extLst>
+              <a:ext uri="{FF2B5EF4-FFF2-40B4-BE49-F238E27FC236}">
+                <a16:creationId xmlns:a16="http://schemas.microsoft.com/office/drawing/2014/main" id="{CF6B4A98-9FB8-4D0F-8445-1DF71E87735B}"/>
+              </a:ext>
+            </a:extLst>
+          </p:cNvPr>
+          <p:cNvCxnSpPr>
+            <a:cxnSpLocks/>
+          </p:cNvCxnSpPr>
+          <p:nvPr/>
+        </p:nvCxnSpPr>
+        <p:spPr bwMode="auto">
+          <a:xfrm flipH="1">
+            <a:off x="7144784" y="3339097"/>
+            <a:ext cx="103454" cy="99875"/>
+          </a:xfrm>
+          <a:prstGeom prst="line">
+            <a:avLst/>
+          </a:prstGeom>
+          <a:solidFill>
+            <a:srgbClr val="0C2D83"/>
+          </a:solidFill>
+          <a:ln w="12700" cap="flat" cmpd="sng" algn="ctr">
+            <a:solidFill>
+              <a:schemeClr val="tx1"/>
+            </a:solidFill>
+            <a:prstDash val="solid"/>
+            <a:round/>
+            <a:headEnd type="none" w="med" len="med"/>
+            <a:tailEnd type="none" w="med" len="med"/>
+          </a:ln>
+          <a:effectLst/>
+        </p:spPr>
+      </p:cxnSp>
+      <p:cxnSp>
+        <p:nvCxnSpPr>
+          <p:cNvPr id="273" name="Straight Arrow Connector 272">
+            <a:extLst>
+              <a:ext uri="{FF2B5EF4-FFF2-40B4-BE49-F238E27FC236}">
+                <a16:creationId xmlns:a16="http://schemas.microsoft.com/office/drawing/2014/main" id="{7CB87F36-B6E4-4D38-B10E-CE262E161CC4}"/>
+              </a:ext>
+            </a:extLst>
+          </p:cNvPr>
+          <p:cNvCxnSpPr>
+            <a:cxnSpLocks/>
+          </p:cNvCxnSpPr>
+          <p:nvPr/>
+        </p:nvCxnSpPr>
+        <p:spPr bwMode="auto">
+          <a:xfrm>
+            <a:off x="7194306" y="3219942"/>
+            <a:ext cx="5061" cy="346516"/>
+          </a:xfrm>
+          <a:prstGeom prst="straightConnector1">
+            <a:avLst/>
+          </a:prstGeom>
+          <a:solidFill>
+            <a:srgbClr val="0C2D83"/>
+          </a:solidFill>
+          <a:ln w="12700" cap="flat" cmpd="sng" algn="ctr">
+            <a:solidFill>
+              <a:schemeClr val="tx1"/>
+            </a:solidFill>
+            <a:prstDash val="solid"/>
+            <a:round/>
+            <a:headEnd type="none" w="med" len="med"/>
+            <a:tailEnd type="triangle"/>
+          </a:ln>
+          <a:effectLst/>
+        </p:spPr>
+      </p:cxnSp>
+      <p:cxnSp>
+        <p:nvCxnSpPr>
+          <p:cNvPr id="24" name="Straight Arrow Connector 23">
+            <a:extLst>
+              <a:ext uri="{FF2B5EF4-FFF2-40B4-BE49-F238E27FC236}">
+                <a16:creationId xmlns:a16="http://schemas.microsoft.com/office/drawing/2014/main" id="{90E45FB6-7D91-4C9C-97E2-E4A8FAA6A2D6}"/>
+              </a:ext>
+            </a:extLst>
+          </p:cNvPr>
+          <p:cNvCxnSpPr/>
+          <p:nvPr/>
+        </p:nvCxnSpPr>
+        <p:spPr bwMode="auto">
+          <a:xfrm>
+            <a:off x="7159640" y="4439182"/>
+            <a:ext cx="1740520" cy="0"/>
+          </a:xfrm>
+          <a:prstGeom prst="straightConnector1">
+            <a:avLst/>
+          </a:prstGeom>
+          <a:solidFill>
+            <a:srgbClr val="0C2D83"/>
+          </a:solidFill>
+          <a:ln w="12700" cap="flat" cmpd="sng" algn="ctr">
+            <a:solidFill>
+              <a:schemeClr val="tx1"/>
+            </a:solidFill>
+            <a:prstDash val="solid"/>
+            <a:round/>
+            <a:headEnd type="none" w="med" len="med"/>
+            <a:tailEnd type="triangle"/>
+          </a:ln>
+          <a:effectLst/>
+        </p:spPr>
+      </p:cxnSp>
+      <p:sp>
+        <p:nvSpPr>
+          <p:cNvPr id="274" name="TextBox 273">
+            <a:extLst>
+              <a:ext uri="{FF2B5EF4-FFF2-40B4-BE49-F238E27FC236}">
+                <a16:creationId xmlns:a16="http://schemas.microsoft.com/office/drawing/2014/main" id="{8A9DF16F-EEE6-4A75-A428-1E812E89C467}"/>
+              </a:ext>
+            </a:extLst>
+          </p:cNvPr>
+          <p:cNvSpPr txBox="1"/>
+          <p:nvPr/>
+        </p:nvSpPr>
+        <p:spPr>
+          <a:xfrm>
+            <a:off x="7181423" y="3987949"/>
+            <a:ext cx="387436" cy="276999"/>
+          </a:xfrm>
+          <a:prstGeom prst="rect">
+            <a:avLst/>
+          </a:prstGeom>
+          <a:solidFill>
+            <a:schemeClr val="bg1"/>
+          </a:solidFill>
+        </p:spPr>
+        <p:txBody>
+          <a:bodyPr wrap="square" rtlCol="0">
+            <a:spAutoFit/>
+          </a:bodyPr>
+          <a:lstStyle/>
+          <a:p>
+            <a:r>
+              <a:rPr lang="en-US" sz="1200" dirty="0">
+                <a:latin typeface="Tahoma" panose="020B0604030504040204" pitchFamily="34" charset="0"/>
+                <a:ea typeface="Tahoma" panose="020B0604030504040204" pitchFamily="34" charset="0"/>
+                <a:cs typeface="Tahoma" panose="020B0604030504040204" pitchFamily="34" charset="0"/>
+              </a:rPr>
+              <a:t>16</a:t>
+            </a:r>
+          </a:p>
+        </p:txBody>
+      </p:sp>
+      <p:cxnSp>
+        <p:nvCxnSpPr>
+          <p:cNvPr id="275" name="Straight Connector 274">
+            <a:extLst>
+              <a:ext uri="{FF2B5EF4-FFF2-40B4-BE49-F238E27FC236}">
+                <a16:creationId xmlns:a16="http://schemas.microsoft.com/office/drawing/2014/main" id="{84841EFD-7CA7-495B-885A-6C1B3CE99688}"/>
+              </a:ext>
+            </a:extLst>
+          </p:cNvPr>
+          <p:cNvCxnSpPr>
+            <a:cxnSpLocks/>
+          </p:cNvCxnSpPr>
+          <p:nvPr/>
+        </p:nvCxnSpPr>
+        <p:spPr bwMode="auto">
+          <a:xfrm flipH="1">
+            <a:off x="7119870" y="4037587"/>
+            <a:ext cx="103454" cy="99875"/>
+          </a:xfrm>
+          <a:prstGeom prst="line">
+            <a:avLst/>
+          </a:prstGeom>
+          <a:solidFill>
+            <a:srgbClr val="0C2D83"/>
+          </a:solidFill>
+          <a:ln w="12700" cap="flat" cmpd="sng" algn="ctr">
+            <a:solidFill>
+              <a:schemeClr val="tx1"/>
+            </a:solidFill>
+            <a:prstDash val="solid"/>
+            <a:round/>
+            <a:headEnd type="none" w="med" len="med"/>
+            <a:tailEnd type="none" w="med" len="med"/>
+          </a:ln>
+          <a:effectLst/>
+        </p:spPr>
+      </p:cxnSp>
+      <p:cxnSp>
+        <p:nvCxnSpPr>
+          <p:cNvPr id="276" name="Straight Arrow Connector 275">
+            <a:extLst>
+              <a:ext uri="{FF2B5EF4-FFF2-40B4-BE49-F238E27FC236}">
+                <a16:creationId xmlns:a16="http://schemas.microsoft.com/office/drawing/2014/main" id="{8F9CEC0D-4838-463F-9E9B-F3D646D1FEF3}"/>
+              </a:ext>
+            </a:extLst>
+          </p:cNvPr>
+          <p:cNvCxnSpPr>
+            <a:cxnSpLocks/>
+          </p:cNvCxnSpPr>
+          <p:nvPr/>
+        </p:nvCxnSpPr>
+        <p:spPr bwMode="auto">
+          <a:xfrm>
+            <a:off x="7165684" y="3972972"/>
+            <a:ext cx="1768" cy="466210"/>
+          </a:xfrm>
+          <a:prstGeom prst="straightConnector1">
+            <a:avLst/>
+          </a:prstGeom>
+          <a:solidFill>
+            <a:srgbClr val="0C2D83"/>
+          </a:solidFill>
+          <a:ln w="12700" cap="flat" cmpd="sng" algn="ctr">
+            <a:solidFill>
+              <a:schemeClr val="tx1"/>
+            </a:solidFill>
+            <a:prstDash val="solid"/>
+            <a:round/>
+            <a:headEnd type="none" w="med" len="med"/>
+            <a:tailEnd type="none"/>
+          </a:ln>
+          <a:effectLst/>
+        </p:spPr>
+      </p:cxnSp>
+      <p:sp>
+        <p:nvSpPr>
+          <p:cNvPr id="277" name="TextBox 276">
+            <a:extLst>
+              <a:ext uri="{FF2B5EF4-FFF2-40B4-BE49-F238E27FC236}">
+                <a16:creationId xmlns:a16="http://schemas.microsoft.com/office/drawing/2014/main" id="{CC3058E3-4CCC-4C4B-A9DC-A5BA0BFFBE04}"/>
+              </a:ext>
+            </a:extLst>
+          </p:cNvPr>
+          <p:cNvSpPr txBox="1"/>
+          <p:nvPr/>
+        </p:nvSpPr>
+        <p:spPr>
+          <a:xfrm>
+            <a:off x="7459658" y="3959018"/>
+            <a:ext cx="662237" cy="276999"/>
+          </a:xfrm>
+          <a:prstGeom prst="rect">
+            <a:avLst/>
+          </a:prstGeom>
+          <a:noFill/>
+        </p:spPr>
+        <p:txBody>
+          <a:bodyPr wrap="square" rtlCol="0">
+            <a:spAutoFit/>
+          </a:bodyPr>
+          <a:lstStyle/>
+          <a:p>
+            <a:r>
+              <a:rPr lang="en-US" sz="1200" dirty="0">
+                <a:solidFill>
+                  <a:srgbClr val="FF0000"/>
+                </a:solidFill>
+                <a:latin typeface="Tahoma" panose="020B0604030504040204" pitchFamily="34" charset="0"/>
+                <a:ea typeface="Tahoma" panose="020B0604030504040204" pitchFamily="34" charset="0"/>
+                <a:cs typeface="Tahoma" panose="020B0604030504040204" pitchFamily="34" charset="0"/>
+              </a:rPr>
+              <a:t>Q16.0</a:t>
+            </a:r>
+          </a:p>
+        </p:txBody>
+      </p:sp>
+      <p:sp>
+        <p:nvSpPr>
+          <p:cNvPr id="278" name="TextBox 277">
+            <a:extLst>
+              <a:ext uri="{FF2B5EF4-FFF2-40B4-BE49-F238E27FC236}">
+                <a16:creationId xmlns:a16="http://schemas.microsoft.com/office/drawing/2014/main" id="{C51B761A-BE9D-42B1-8BF1-510A803B21A8}"/>
+              </a:ext>
+            </a:extLst>
+          </p:cNvPr>
+          <p:cNvSpPr txBox="1"/>
+          <p:nvPr/>
+        </p:nvSpPr>
+        <p:spPr>
+          <a:xfrm>
+            <a:off x="7023809" y="4468023"/>
+            <a:ext cx="1901482" cy="400110"/>
+          </a:xfrm>
+          <a:prstGeom prst="rect">
+            <a:avLst/>
+          </a:prstGeom>
+          <a:solidFill>
+            <a:schemeClr val="bg1"/>
+          </a:solidFill>
+        </p:spPr>
+        <p:txBody>
+          <a:bodyPr wrap="none" rtlCol="0">
+            <a:spAutoFit/>
+          </a:bodyPr>
+          <a:lstStyle/>
+          <a:p>
+            <a:pPr algn="ctr">
+              <a:spcBef>
+                <a:spcPts val="0"/>
+              </a:spcBef>
+            </a:pPr>
+            <a:r>
+              <a:rPr lang="en-US" sz="1000" dirty="0" err="1">
+                <a:latin typeface="Tahoma" panose="020B0604030504040204" pitchFamily="34" charset="0"/>
+                <a:ea typeface="Tahoma" panose="020B0604030504040204" pitchFamily="34" charset="0"/>
+                <a:cs typeface="Tahoma" panose="020B0604030504040204" pitchFamily="34" charset="0"/>
+              </a:rPr>
+              <a:t>Amplified_Interpolated</a:t>
+            </a:r>
+            <a:r>
+              <a:rPr lang="en-US" sz="1000" dirty="0">
+                <a:latin typeface="Tahoma" panose="020B0604030504040204" pitchFamily="34" charset="0"/>
+                <a:ea typeface="Tahoma" panose="020B0604030504040204" pitchFamily="34" charset="0"/>
+                <a:cs typeface="Tahoma" panose="020B0604030504040204" pitchFamily="34" charset="0"/>
+              </a:rPr>
+              <a:t> Output</a:t>
+            </a:r>
+          </a:p>
+          <a:p>
+            <a:pPr algn="ctr">
+              <a:spcBef>
+                <a:spcPts val="0"/>
+              </a:spcBef>
+            </a:pPr>
+            <a:r>
+              <a:rPr lang="en-US" sz="1000" dirty="0">
+                <a:solidFill>
+                  <a:srgbClr val="FF0000"/>
+                </a:solidFill>
+                <a:latin typeface="Tahoma" panose="020B0604030504040204" pitchFamily="34" charset="0"/>
+                <a:ea typeface="Tahoma" panose="020B0604030504040204" pitchFamily="34" charset="0"/>
+                <a:cs typeface="Tahoma" panose="020B0604030504040204" pitchFamily="34" charset="0"/>
+              </a:rPr>
+              <a:t>signed</a:t>
+            </a:r>
+          </a:p>
+        </p:txBody>
+      </p:sp>
+      <p:sp>
+        <p:nvSpPr>
+          <p:cNvPr id="279" name="TextBox 278">
+            <a:extLst>
+              <a:ext uri="{FF2B5EF4-FFF2-40B4-BE49-F238E27FC236}">
+                <a16:creationId xmlns:a16="http://schemas.microsoft.com/office/drawing/2014/main" id="{C97CEF08-EB4D-42CC-A5E7-08D66724C10A}"/>
+              </a:ext>
+            </a:extLst>
+          </p:cNvPr>
+          <p:cNvSpPr txBox="1"/>
+          <p:nvPr/>
+        </p:nvSpPr>
+        <p:spPr>
+          <a:xfrm>
+            <a:off x="7241552" y="4945273"/>
+            <a:ext cx="1447833" cy="400110"/>
+          </a:xfrm>
+          <a:prstGeom prst="rect">
+            <a:avLst/>
+          </a:prstGeom>
+          <a:solidFill>
+            <a:schemeClr val="bg1"/>
+          </a:solidFill>
+        </p:spPr>
+        <p:txBody>
+          <a:bodyPr wrap="none" rtlCol="0">
+            <a:spAutoFit/>
+          </a:bodyPr>
+          <a:lstStyle/>
+          <a:p>
+            <a:pPr algn="ctr">
+              <a:spcBef>
+                <a:spcPts val="0"/>
+              </a:spcBef>
+            </a:pPr>
+            <a:r>
+              <a:rPr lang="en-US" sz="1000" dirty="0" err="1">
+                <a:latin typeface="Tahoma" panose="020B0604030504040204" pitchFamily="34" charset="0"/>
+                <a:ea typeface="Tahoma" panose="020B0604030504040204" pitchFamily="34" charset="0"/>
+                <a:cs typeface="Tahoma" panose="020B0604030504040204" pitchFamily="34" charset="0"/>
+              </a:rPr>
+              <a:t>Uninterpolated</a:t>
+            </a:r>
+            <a:r>
+              <a:rPr lang="en-US" sz="1000" dirty="0">
+                <a:latin typeface="Tahoma" panose="020B0604030504040204" pitchFamily="34" charset="0"/>
+                <a:ea typeface="Tahoma" panose="020B0604030504040204" pitchFamily="34" charset="0"/>
+                <a:cs typeface="Tahoma" panose="020B0604030504040204" pitchFamily="34" charset="0"/>
+              </a:rPr>
+              <a:t> Output</a:t>
+            </a:r>
+          </a:p>
+          <a:p>
+            <a:pPr algn="ctr">
+              <a:spcBef>
+                <a:spcPts val="0"/>
+              </a:spcBef>
+            </a:pPr>
+            <a:r>
+              <a:rPr lang="en-US" sz="1000" dirty="0">
+                <a:solidFill>
+                  <a:srgbClr val="FF0000"/>
+                </a:solidFill>
+                <a:latin typeface="Tahoma" panose="020B0604030504040204" pitchFamily="34" charset="0"/>
+                <a:ea typeface="Tahoma" panose="020B0604030504040204" pitchFamily="34" charset="0"/>
+                <a:cs typeface="Tahoma" panose="020B0604030504040204" pitchFamily="34" charset="0"/>
+              </a:rPr>
+              <a:t>signed</a:t>
+            </a:r>
+          </a:p>
+        </p:txBody>
+      </p:sp>
+      <p:cxnSp>
+        <p:nvCxnSpPr>
+          <p:cNvPr id="280" name="Straight Arrow Connector 279">
+            <a:extLst>
+              <a:ext uri="{FF2B5EF4-FFF2-40B4-BE49-F238E27FC236}">
+                <a16:creationId xmlns:a16="http://schemas.microsoft.com/office/drawing/2014/main" id="{19FF6B6C-8C23-4740-B7B6-FA9F9F90BE47}"/>
+              </a:ext>
+            </a:extLst>
+          </p:cNvPr>
+          <p:cNvCxnSpPr>
+            <a:cxnSpLocks/>
+          </p:cNvCxnSpPr>
+          <p:nvPr/>
+        </p:nvCxnSpPr>
+        <p:spPr bwMode="auto">
+          <a:xfrm flipV="1">
+            <a:off x="6979573" y="4913444"/>
+            <a:ext cx="1907340" cy="2585"/>
+          </a:xfrm>
+          <a:prstGeom prst="straightConnector1">
+            <a:avLst/>
+          </a:prstGeom>
+          <a:solidFill>
+            <a:srgbClr val="0C2D83"/>
+          </a:solidFill>
+          <a:ln w="12700" cap="flat" cmpd="sng" algn="ctr">
+            <a:solidFill>
+              <a:schemeClr val="tx1"/>
+            </a:solidFill>
+            <a:prstDash val="solid"/>
+            <a:round/>
+            <a:headEnd type="none" w="med" len="med"/>
+            <a:tailEnd type="triangle"/>
+          </a:ln>
+          <a:effectLst/>
+        </p:spPr>
+      </p:cxnSp>
+      <p:sp>
+        <p:nvSpPr>
+          <p:cNvPr id="281" name="TextBox 280">
+            <a:extLst>
+              <a:ext uri="{FF2B5EF4-FFF2-40B4-BE49-F238E27FC236}">
+                <a16:creationId xmlns:a16="http://schemas.microsoft.com/office/drawing/2014/main" id="{0AED3B7C-1EAE-424B-AC72-3C2FB1CA4A32}"/>
+              </a:ext>
+            </a:extLst>
+          </p:cNvPr>
+          <p:cNvSpPr txBox="1"/>
+          <p:nvPr/>
+        </p:nvSpPr>
+        <p:spPr>
+          <a:xfrm>
+            <a:off x="6371848" y="4779185"/>
+            <a:ext cx="607725" cy="276999"/>
+          </a:xfrm>
+          <a:prstGeom prst="rect">
+            <a:avLst/>
+          </a:prstGeom>
+          <a:solidFill>
+            <a:schemeClr val="bg1"/>
+          </a:solidFill>
+        </p:spPr>
+        <p:txBody>
+          <a:bodyPr wrap="square" rtlCol="0">
+            <a:spAutoFit/>
+          </a:bodyPr>
+          <a:lstStyle/>
+          <a:p>
+            <a:pPr algn="ctr"/>
+            <a:r>
+              <a:rPr lang="en-US" sz="1200" dirty="0">
+                <a:solidFill>
+                  <a:srgbClr val="FF0000"/>
+                </a:solidFill>
+                <a:latin typeface="Tahoma" panose="020B0604030504040204" pitchFamily="34" charset="0"/>
+                <a:ea typeface="Tahoma" panose="020B0604030504040204" pitchFamily="34" charset="0"/>
+                <a:cs typeface="Tahoma" panose="020B0604030504040204" pitchFamily="34" charset="0"/>
+              </a:rPr>
+              <a:t>Base</a:t>
+            </a:r>
+          </a:p>
+        </p:txBody>
+      </p:sp>
+      <p:sp>
+        <p:nvSpPr>
+          <p:cNvPr id="282" name="Rectangle 281">
+            <a:extLst>
+              <a:ext uri="{FF2B5EF4-FFF2-40B4-BE49-F238E27FC236}">
+                <a16:creationId xmlns:a16="http://schemas.microsoft.com/office/drawing/2014/main" id="{CE927B96-20D9-4993-A13E-86860A14200E}"/>
+              </a:ext>
+            </a:extLst>
+          </p:cNvPr>
+          <p:cNvSpPr/>
+          <p:nvPr/>
+        </p:nvSpPr>
+        <p:spPr bwMode="auto">
+          <a:xfrm>
+            <a:off x="2072807" y="909150"/>
+            <a:ext cx="534868" cy="188775"/>
+          </a:xfrm>
+          <a:prstGeom prst="rect">
+            <a:avLst/>
+          </a:prstGeom>
+          <a:solidFill>
+            <a:schemeClr val="bg1"/>
+          </a:solidFill>
+          <a:ln w="12700" cap="flat" cmpd="sng" algn="ctr">
+            <a:noFill/>
+            <a:prstDash val="solid"/>
+            <a:round/>
+            <a:headEnd type="none" w="med" len="med"/>
+            <a:tailEnd type="none" w="med" len="med"/>
+          </a:ln>
+          <a:effectLst/>
+        </p:spPr>
+        <p:txBody>
+          <a:bodyPr vert="horz" wrap="square" lIns="91440" tIns="45720" rIns="91440" bIns="45720" numCol="1" rtlCol="0" anchor="ctr" anchorCtr="0" compatLnSpc="1">
             <a:prstTxWarp prst="textNoShape">
               <a:avLst/>
             </a:prstTxWarp>
@@ -10366,16 +13843,19 @@
               <a:buNone/>
               <a:tabLst/>
             </a:pPr>
-            <a:endParaRPr kumimoji="0" lang="en-US" sz="1400" b="0" i="0" u="none" strike="noStrike" cap="none" normalizeH="0" baseline="0">
-              <a:ln>
-                <a:noFill/>
-              </a:ln>
-              <a:solidFill>
-                <a:schemeClr val="tx1"/>
-              </a:solidFill>
-              <a:effectLst/>
-              <a:latin typeface="Arial" pitchFamily="34" charset="0"/>
-            </a:endParaRPr>
+            <a:r>
+              <a:rPr kumimoji="0" lang="en-US" sz="1800" b="1" i="0" u="none" strike="noStrike" cap="none" normalizeH="0" baseline="0" dirty="0">
+                <a:ln>
+                  <a:noFill/>
+                </a:ln>
+                <a:solidFill>
+                  <a:schemeClr val="tx1"/>
+                </a:solidFill>
+                <a:effectLst/>
+                <a:latin typeface="Arial" pitchFamily="34" charset="0"/>
+              </a:rPr>
+              <a:t>+  -</a:t>
+            </a:r>
           </a:p>
         </p:txBody>
       </p:sp>

</xml_diff>

<commit_message>
updated for new use of switches
</commit_message>
<xml_diff>
--- a/lab/lab4/Interpolation_block_diagram.pptx
+++ b/lab/lab4/Interpolation_block_diagram.pptx
@@ -2090,7 +2090,7 @@
                 </a:spcAft>
                 <a:defRPr/>
               </a:pPr>
-              <a:t>12 April 2022</a:t>
+              <a:t>15 April 2022</a:t>
             </a:fld>
             <a:endParaRPr lang="en-US" sz="1800">
               <a:solidFill>
@@ -2334,7 +2334,7 @@
                 </a:spcAft>
                 <a:defRPr/>
               </a:pPr>
-              <a:t>12 April 2022</a:t>
+              <a:t>15 April 2022</a:t>
             </a:fld>
             <a:endParaRPr lang="en-US" sz="1800">
               <a:solidFill>
@@ -2547,7 +2547,7 @@
                 </a:spcAft>
                 <a:defRPr/>
               </a:pPr>
-              <a:t>12 April 2022</a:t>
+              <a:t>15 April 2022</a:t>
             </a:fld>
             <a:endParaRPr lang="en-US" sz="1800">
               <a:solidFill>
@@ -2775,7 +2775,7 @@
                 </a:spcAft>
                 <a:defRPr/>
               </a:pPr>
-              <a:t>12 April 2022</a:t>
+              <a:t>15 April 2022</a:t>
             </a:fld>
             <a:endParaRPr lang="en-US" sz="1800">
               <a:solidFill>
@@ -3032,7 +3032,7 @@
                 </a:spcAft>
                 <a:defRPr/>
               </a:pPr>
-              <a:t>12 April 2022</a:t>
+              <a:t>15 April 2022</a:t>
             </a:fld>
             <a:endParaRPr lang="en-US" sz="1800">
               <a:solidFill>
@@ -3383,7 +3383,7 @@
                 </a:spcAft>
                 <a:defRPr/>
               </a:pPr>
-              <a:t>12 April 2022</a:t>
+              <a:t>15 April 2022</a:t>
             </a:fld>
             <a:endParaRPr lang="en-US" sz="1800">
               <a:solidFill>
@@ -3873,7 +3873,7 @@
                 </a:spcAft>
                 <a:defRPr/>
               </a:pPr>
-              <a:t>12 April 2022</a:t>
+              <a:t>15 April 2022</a:t>
             </a:fld>
             <a:endParaRPr lang="en-US" sz="1800">
               <a:solidFill>
@@ -4056,7 +4056,7 @@
                 </a:spcAft>
                 <a:defRPr/>
               </a:pPr>
-              <a:t>12 April 2022</a:t>
+              <a:t>15 April 2022</a:t>
             </a:fld>
             <a:endParaRPr lang="en-US" sz="1800">
               <a:solidFill>
@@ -4217,7 +4217,7 @@
                 </a:spcAft>
                 <a:defRPr/>
               </a:pPr>
-              <a:t>12 April 2022</a:t>
+              <a:t>15 April 2022</a:t>
             </a:fld>
             <a:endParaRPr lang="en-US" sz="1800">
               <a:solidFill>
@@ -4558,7 +4558,7 @@
                 </a:spcAft>
                 <a:defRPr/>
               </a:pPr>
-              <a:t>12 April 2022</a:t>
+              <a:t>15 April 2022</a:t>
             </a:fld>
             <a:endParaRPr lang="en-US" sz="1800">
               <a:solidFill>
@@ -4877,7 +4877,7 @@
                 </a:spcAft>
                 <a:defRPr/>
               </a:pPr>
-              <a:t>12 April 2022</a:t>
+              <a:t>15 April 2022</a:t>
             </a:fld>
             <a:endParaRPr lang="en-US" sz="1800">
               <a:solidFill>
@@ -5774,6 +5774,50 @@
           <a:chExt cx="0" cy="0"/>
         </a:xfrm>
       </p:grpSpPr>
+      <p:sp>
+        <p:nvSpPr>
+          <p:cNvPr id="298" name="TextBox 297">
+            <a:extLst>
+              <a:ext uri="{FF2B5EF4-FFF2-40B4-BE49-F238E27FC236}">
+                <a16:creationId xmlns:a16="http://schemas.microsoft.com/office/drawing/2014/main" id="{C4F08FDE-7E06-4476-A838-67574A55175B}"/>
+              </a:ext>
+            </a:extLst>
+          </p:cNvPr>
+          <p:cNvSpPr txBox="1"/>
+          <p:nvPr/>
+        </p:nvSpPr>
+        <p:spPr>
+          <a:xfrm>
+            <a:off x="2099092" y="895166"/>
+            <a:ext cx="696024" cy="276999"/>
+          </a:xfrm>
+          <a:prstGeom prst="rect">
+            <a:avLst/>
+          </a:prstGeom>
+          <a:solidFill>
+            <a:schemeClr val="bg1"/>
+          </a:solidFill>
+        </p:spPr>
+        <p:txBody>
+          <a:bodyPr wrap="none" rtlCol="0">
+            <a:spAutoFit/>
+          </a:bodyPr>
+          <a:lstStyle/>
+          <a:p>
+            <a:r>
+              <a:rPr lang="en-US" sz="1200" dirty="0">
+                <a:solidFill>
+                  <a:srgbClr val="FF0000"/>
+                </a:solidFill>
+                <a:latin typeface="Tahoma" panose="020B0604030504040204" pitchFamily="34" charset="0"/>
+                <a:ea typeface="Tahoma" panose="020B0604030504040204" pitchFamily="34" charset="0"/>
+                <a:cs typeface="Tahoma" panose="020B0604030504040204" pitchFamily="34" charset="0"/>
+              </a:rPr>
+              <a:t>X = 1.0</a:t>
+            </a:r>
+          </a:p>
+        </p:txBody>
+      </p:sp>
       <p:pic>
         <p:nvPicPr>
           <p:cNvPr id="175" name="Picture 174">
@@ -5936,7 +5980,7 @@
       </p:pic>
       <p:pic>
         <p:nvPicPr>
-          <p:cNvPr id="6" name="Picture 5"/>
+          <p:cNvPr id="9" name="Picture 8"/>
           <p:cNvPicPr>
             <a:picLocks noChangeAspect="1"/>
           </p:cNvPicPr>
@@ -5950,30 +5994,6 @@
         </p:blipFill>
         <p:spPr>
           <a:xfrm>
-            <a:off x="1697809" y="579263"/>
-            <a:ext cx="1257300" cy="638175"/>
-          </a:xfrm>
-          <a:prstGeom prst="rect">
-            <a:avLst/>
-          </a:prstGeom>
-        </p:spPr>
-      </p:pic>
-      <p:pic>
-        <p:nvPicPr>
-          <p:cNvPr id="9" name="Picture 8"/>
-          <p:cNvPicPr>
-            <a:picLocks noChangeAspect="1"/>
-          </p:cNvPicPr>
-          <p:nvPr/>
-        </p:nvPicPr>
-        <p:blipFill>
-          <a:blip r:embed="rId2"/>
-          <a:stretch>
-            <a:fillRect/>
-          </a:stretch>
-        </p:blipFill>
-        <p:spPr>
-          <a:xfrm>
             <a:off x="1383044" y="2090641"/>
             <a:ext cx="1257300" cy="638175"/>
           </a:xfrm>
@@ -5984,19 +6004,172 @@
       </p:pic>
       <p:sp>
         <p:nvSpPr>
-          <p:cNvPr id="12" name="Rectangle 11"/>
-          <p:cNvSpPr/>
-          <p:nvPr/>
-        </p:nvSpPr>
+          <p:cNvPr id="17" name="TextBox 16"/>
+          <p:cNvSpPr txBox="1"/>
+          <p:nvPr/>
+        </p:nvSpPr>
+        <p:spPr>
+          <a:xfrm>
+            <a:off x="2410120" y="1827435"/>
+            <a:ext cx="849143" cy="276999"/>
+          </a:xfrm>
+          <a:prstGeom prst="rect">
+            <a:avLst/>
+          </a:prstGeom>
+          <a:noFill/>
+        </p:spPr>
+        <p:txBody>
+          <a:bodyPr wrap="none" rtlCol="0">
+            <a:spAutoFit/>
+          </a:bodyPr>
+          <a:lstStyle/>
+          <a:p>
+            <a:r>
+              <a:rPr lang="en-US" sz="1200" dirty="0">
+                <a:solidFill>
+                  <a:srgbClr val="FF0000"/>
+                </a:solidFill>
+                <a:latin typeface="Tahoma" panose="020B0604030504040204" pitchFamily="34" charset="0"/>
+                <a:ea typeface="Tahoma" panose="020B0604030504040204" pitchFamily="34" charset="0"/>
+                <a:cs typeface="Tahoma" panose="020B0604030504040204" pitchFamily="34" charset="0"/>
+              </a:rPr>
+              <a:t>Phase </a:t>
+            </a:r>
+            <a:r>
+              <a:rPr lang="en-US" sz="1200" dirty="0" err="1">
+                <a:solidFill>
+                  <a:srgbClr val="FF0000"/>
+                </a:solidFill>
+                <a:latin typeface="Tahoma" panose="020B0604030504040204" pitchFamily="34" charset="0"/>
+                <a:ea typeface="Tahoma" panose="020B0604030504040204" pitchFamily="34" charset="0"/>
+                <a:cs typeface="Tahoma" panose="020B0604030504040204" pitchFamily="34" charset="0"/>
+              </a:rPr>
+              <a:t>Inc</a:t>
+            </a:r>
+            <a:endParaRPr lang="en-US" sz="1200" dirty="0">
+              <a:solidFill>
+                <a:srgbClr val="FF0000"/>
+              </a:solidFill>
+              <a:latin typeface="Tahoma" panose="020B0604030504040204" pitchFamily="34" charset="0"/>
+              <a:ea typeface="Tahoma" panose="020B0604030504040204" pitchFamily="34" charset="0"/>
+              <a:cs typeface="Tahoma" panose="020B0604030504040204" pitchFamily="34" charset="0"/>
+            </a:endParaRPr>
+          </a:p>
+        </p:txBody>
+      </p:sp>
+      <p:sp>
+        <p:nvSpPr>
+          <p:cNvPr id="30" name="TextBox 29"/>
+          <p:cNvSpPr txBox="1"/>
+          <p:nvPr/>
+        </p:nvSpPr>
+        <p:spPr>
+          <a:xfrm>
+            <a:off x="3911942" y="5238208"/>
+            <a:ext cx="2397195" cy="461665"/>
+          </a:xfrm>
+          <a:prstGeom prst="rect">
+            <a:avLst/>
+          </a:prstGeom>
+          <a:solidFill>
+            <a:schemeClr val="bg1"/>
+          </a:solidFill>
+        </p:spPr>
+        <p:txBody>
+          <a:bodyPr wrap="none" rtlCol="0">
+            <a:spAutoFit/>
+          </a:bodyPr>
+          <a:lstStyle/>
+          <a:p>
+            <a:pPr algn="ctr">
+              <a:spcBef>
+                <a:spcPts val="0"/>
+              </a:spcBef>
+            </a:pPr>
+            <a:r>
+              <a:rPr lang="en-US" sz="1200" dirty="0">
+                <a:solidFill>
+                  <a:srgbClr val="FF0000"/>
+                </a:solidFill>
+                <a:latin typeface="Tahoma" panose="020B0604030504040204" pitchFamily="34" charset="0"/>
+                <a:ea typeface="Tahoma" panose="020B0604030504040204" pitchFamily="34" charset="0"/>
+                <a:cs typeface="Tahoma" panose="020B0604030504040204" pitchFamily="34" charset="0"/>
+              </a:rPr>
+              <a:t>Interpolated Value</a:t>
+            </a:r>
+          </a:p>
+          <a:p>
+            <a:pPr algn="ctr">
+              <a:spcBef>
+                <a:spcPts val="0"/>
+              </a:spcBef>
+            </a:pPr>
+            <a:r>
+              <a:rPr lang="en-US" sz="1200" dirty="0">
+                <a:latin typeface="Tahoma" panose="020B0604030504040204" pitchFamily="34" charset="0"/>
+                <a:ea typeface="Tahoma" panose="020B0604030504040204" pitchFamily="34" charset="0"/>
+                <a:cs typeface="Tahoma" panose="020B0604030504040204" pitchFamily="34" charset="0"/>
+              </a:rPr>
+              <a:t>= Base + (Next – Base) * Offset</a:t>
+            </a:r>
+          </a:p>
+        </p:txBody>
+      </p:sp>
+      <p:sp>
+        <p:nvSpPr>
+          <p:cNvPr id="3096" name="TextBox 3095"/>
+          <p:cNvSpPr txBox="1"/>
+          <p:nvPr/>
+        </p:nvSpPr>
+        <p:spPr>
+          <a:xfrm>
+            <a:off x="2777355" y="1468129"/>
+            <a:ext cx="513933" cy="276999"/>
+          </a:xfrm>
+          <a:prstGeom prst="rect">
+            <a:avLst/>
+          </a:prstGeom>
+          <a:noFill/>
+        </p:spPr>
+        <p:txBody>
+          <a:bodyPr wrap="square" rtlCol="0">
+            <a:spAutoFit/>
+          </a:bodyPr>
+          <a:lstStyle/>
+          <a:p>
+            <a:r>
+              <a:rPr lang="en-US" sz="1200" dirty="0">
+                <a:solidFill>
+                  <a:srgbClr val="FF0000"/>
+                </a:solidFill>
+                <a:latin typeface="Tahoma" panose="020B0604030504040204" pitchFamily="34" charset="0"/>
+                <a:ea typeface="Tahoma" panose="020B0604030504040204" pitchFamily="34" charset="0"/>
+                <a:cs typeface="Tahoma" panose="020B0604030504040204" pitchFamily="34" charset="0"/>
+              </a:rPr>
+              <a:t>Q4.4</a:t>
+            </a:r>
+          </a:p>
+        </p:txBody>
+      </p:sp>
+      <p:cxnSp>
+        <p:nvCxnSpPr>
+          <p:cNvPr id="3100" name="Straight Arrow Connector 3099"/>
+          <p:cNvCxnSpPr>
+            <a:cxnSpLocks/>
+          </p:cNvCxnSpPr>
+          <p:nvPr/>
+        </p:nvCxnSpPr>
         <p:spPr bwMode="auto">
-          <a:xfrm>
-            <a:off x="1777035" y="1437794"/>
-            <a:ext cx="1060560" cy="367384"/>
-          </a:xfrm>
-          <a:prstGeom prst="rect">
-            <a:avLst/>
-          </a:prstGeom>
-          <a:noFill/>
+          <a:xfrm flipH="1">
+            <a:off x="2307049" y="1805178"/>
+            <a:ext cx="266" cy="420543"/>
+          </a:xfrm>
+          <a:prstGeom prst="straightConnector1">
+            <a:avLst/>
+          </a:prstGeom>
+          <a:solidFill>
+            <a:srgbClr val="0C2D83"/>
+          </a:solidFill>
           <a:ln w="12700" cap="flat" cmpd="sng" algn="ctr">
             <a:solidFill>
               <a:schemeClr val="tx1"/>
@@ -6004,57 +6177,21 @@
             <a:prstDash val="solid"/>
             <a:round/>
             <a:headEnd type="none" w="med" len="med"/>
-            <a:tailEnd type="none" w="med" len="med"/>
+            <a:tailEnd type="triangle"/>
           </a:ln>
           <a:effectLst/>
         </p:spPr>
-        <p:txBody>
-          <a:bodyPr vert="horz" wrap="square" lIns="91440" tIns="45720" rIns="91440" bIns="45720" numCol="1" rtlCol="0" anchor="t" anchorCtr="0" compatLnSpc="1">
-            <a:prstTxWarp prst="textNoShape">
-              <a:avLst/>
-            </a:prstTxWarp>
-          </a:bodyPr>
-          <a:lstStyle/>
-          <a:p>
-            <a:pPr marL="0" marR="0" indent="0" algn="ctr" defTabSz="914400" rtl="0" eaLnBrk="0" fontAlgn="base" latinLnBrk="0" hangingPunct="0">
-              <a:lnSpc>
-                <a:spcPct val="100000"/>
-              </a:lnSpc>
-              <a:spcBef>
-                <a:spcPct val="0"/>
-              </a:spcBef>
-              <a:spcAft>
-                <a:spcPct val="0"/>
-              </a:spcAft>
-              <a:buClrTx/>
-              <a:buSzTx/>
-              <a:buFontTx/>
-              <a:buNone/>
-              <a:tabLst/>
-            </a:pPr>
-            <a:endParaRPr kumimoji="0" lang="en-US" sz="1400" b="0" i="0" u="none" strike="noStrike" cap="none" normalizeH="0" baseline="0">
-              <a:ln>
-                <a:noFill/>
-              </a:ln>
-              <a:solidFill>
-                <a:schemeClr val="tx1"/>
-              </a:solidFill>
-              <a:effectLst/>
-              <a:latin typeface="Arial" pitchFamily="34" charset="0"/>
-            </a:endParaRPr>
-          </a:p>
-        </p:txBody>
-      </p:sp>
+      </p:cxnSp>
       <p:cxnSp>
         <p:nvCxnSpPr>
-          <p:cNvPr id="14" name="Straight Connector 13"/>
+          <p:cNvPr id="63" name="Straight Connector 62"/>
           <p:cNvCxnSpPr/>
           <p:nvPr/>
         </p:nvCxnSpPr>
         <p:spPr bwMode="auto">
-          <a:xfrm>
-            <a:off x="1774391" y="1652949"/>
-            <a:ext cx="74104" cy="61844"/>
+          <a:xfrm flipH="1">
+            <a:off x="2255322" y="1855369"/>
+            <a:ext cx="103454" cy="99875"/>
           </a:xfrm>
           <a:prstGeom prst="line">
             <a:avLst/>
@@ -6074,387 +6211,15 @@
           <a:effectLst/>
         </p:spPr>
       </p:cxnSp>
-      <p:cxnSp>
-        <p:nvCxnSpPr>
-          <p:cNvPr id="16" name="Straight Connector 15"/>
-          <p:cNvCxnSpPr/>
-          <p:nvPr/>
-        </p:nvCxnSpPr>
-        <p:spPr bwMode="auto">
-          <a:xfrm flipH="1">
-            <a:off x="1774391" y="1714793"/>
-            <a:ext cx="69770" cy="60671"/>
-          </a:xfrm>
-          <a:prstGeom prst="line">
-            <a:avLst/>
-          </a:prstGeom>
-          <a:solidFill>
-            <a:srgbClr val="0C2D83"/>
-          </a:solidFill>
-          <a:ln w="12700" cap="flat" cmpd="sng" algn="ctr">
-            <a:solidFill>
-              <a:schemeClr val="tx1"/>
-            </a:solidFill>
-            <a:prstDash val="solid"/>
-            <a:round/>
-            <a:headEnd type="none" w="med" len="med"/>
-            <a:tailEnd type="none" w="med" len="med"/>
-          </a:ln>
-          <a:effectLst/>
-        </p:spPr>
-      </p:cxnSp>
-      <p:sp>
-        <p:nvSpPr>
-          <p:cNvPr id="17" name="TextBox 16"/>
+      <p:sp>
+        <p:nvSpPr>
+          <p:cNvPr id="64" name="TextBox 63"/>
           <p:cNvSpPr txBox="1"/>
           <p:nvPr/>
         </p:nvSpPr>
         <p:spPr>
           <a:xfrm>
-            <a:off x="1892686" y="1391460"/>
-            <a:ext cx="849143" cy="276999"/>
-          </a:xfrm>
-          <a:prstGeom prst="rect">
-            <a:avLst/>
-          </a:prstGeom>
-          <a:noFill/>
-        </p:spPr>
-        <p:txBody>
-          <a:bodyPr wrap="none" rtlCol="0">
-            <a:spAutoFit/>
-          </a:bodyPr>
-          <a:lstStyle/>
-          <a:p>
-            <a:r>
-              <a:rPr lang="en-US" sz="1200" dirty="0">
-                <a:latin typeface="Tahoma" panose="020B0604030504040204" pitchFamily="34" charset="0"/>
-                <a:ea typeface="Tahoma" panose="020B0604030504040204" pitchFamily="34" charset="0"/>
-                <a:cs typeface="Tahoma" panose="020B0604030504040204" pitchFamily="34" charset="0"/>
-              </a:rPr>
-              <a:t>Phase </a:t>
-            </a:r>
-            <a:r>
-              <a:rPr lang="en-US" sz="1200" dirty="0" err="1">
-                <a:latin typeface="Tahoma" panose="020B0604030504040204" pitchFamily="34" charset="0"/>
-                <a:ea typeface="Tahoma" panose="020B0604030504040204" pitchFamily="34" charset="0"/>
-                <a:cs typeface="Tahoma" panose="020B0604030504040204" pitchFamily="34" charset="0"/>
-              </a:rPr>
-              <a:t>Inc</a:t>
-            </a:r>
-            <a:endParaRPr lang="en-US" sz="1200" dirty="0">
-              <a:latin typeface="Tahoma" panose="020B0604030504040204" pitchFamily="34" charset="0"/>
-              <a:ea typeface="Tahoma" panose="020B0604030504040204" pitchFamily="34" charset="0"/>
-              <a:cs typeface="Tahoma" panose="020B0604030504040204" pitchFamily="34" charset="0"/>
-            </a:endParaRPr>
-          </a:p>
-        </p:txBody>
-      </p:sp>
-      <p:cxnSp>
-        <p:nvCxnSpPr>
-          <p:cNvPr id="21" name="Straight Arrow Connector 20"/>
-          <p:cNvCxnSpPr/>
-          <p:nvPr/>
-        </p:nvCxnSpPr>
-        <p:spPr bwMode="auto">
-          <a:xfrm>
-            <a:off x="1566969" y="1576470"/>
-            <a:ext cx="207422" cy="0"/>
-          </a:xfrm>
-          <a:prstGeom prst="straightConnector1">
-            <a:avLst/>
-          </a:prstGeom>
-          <a:solidFill>
-            <a:srgbClr val="0C2D83"/>
-          </a:solidFill>
-          <a:ln w="12700" cap="flat" cmpd="sng" algn="ctr">
-            <a:solidFill>
-              <a:srgbClr val="00B050"/>
-            </a:solidFill>
-            <a:prstDash val="solid"/>
-            <a:round/>
-            <a:headEnd type="none" w="med" len="med"/>
-            <a:tailEnd type="triangle"/>
-          </a:ln>
-          <a:effectLst/>
-        </p:spPr>
-      </p:cxnSp>
-      <p:cxnSp>
-        <p:nvCxnSpPr>
-          <p:cNvPr id="28" name="Straight Connector 27"/>
-          <p:cNvCxnSpPr/>
-          <p:nvPr/>
-        </p:nvCxnSpPr>
-        <p:spPr bwMode="auto">
-          <a:xfrm>
-            <a:off x="2640345" y="467600"/>
-            <a:ext cx="0" cy="138837"/>
-          </a:xfrm>
-          <a:prstGeom prst="line">
-            <a:avLst/>
-          </a:prstGeom>
-          <a:solidFill>
-            <a:srgbClr val="0C2D83"/>
-          </a:solidFill>
-          <a:ln w="12700" cap="flat" cmpd="sng" algn="ctr">
-            <a:solidFill>
-              <a:schemeClr val="tx1"/>
-            </a:solidFill>
-            <a:prstDash val="solid"/>
-            <a:round/>
-            <a:headEnd type="none" w="med" len="med"/>
-            <a:tailEnd type="none" w="med" len="med"/>
-          </a:ln>
-          <a:effectLst/>
-        </p:spPr>
-      </p:cxnSp>
-      <p:sp>
-        <p:nvSpPr>
-          <p:cNvPr id="30" name="TextBox 29"/>
-          <p:cNvSpPr txBox="1"/>
-          <p:nvPr/>
-        </p:nvSpPr>
-        <p:spPr>
-          <a:xfrm>
-            <a:off x="3911942" y="5238208"/>
-            <a:ext cx="2397195" cy="461665"/>
-          </a:xfrm>
-          <a:prstGeom prst="rect">
-            <a:avLst/>
-          </a:prstGeom>
-          <a:solidFill>
-            <a:schemeClr val="bg1"/>
-          </a:solidFill>
-        </p:spPr>
-        <p:txBody>
-          <a:bodyPr wrap="none" rtlCol="0">
-            <a:spAutoFit/>
-          </a:bodyPr>
-          <a:lstStyle/>
-          <a:p>
-            <a:pPr algn="ctr">
-              <a:spcBef>
-                <a:spcPts val="0"/>
-              </a:spcBef>
-            </a:pPr>
-            <a:r>
-              <a:rPr lang="en-US" sz="1200" dirty="0">
-                <a:solidFill>
-                  <a:srgbClr val="FF0000"/>
-                </a:solidFill>
-                <a:latin typeface="Tahoma" panose="020B0604030504040204" pitchFamily="34" charset="0"/>
-                <a:ea typeface="Tahoma" panose="020B0604030504040204" pitchFamily="34" charset="0"/>
-                <a:cs typeface="Tahoma" panose="020B0604030504040204" pitchFamily="34" charset="0"/>
-              </a:rPr>
-              <a:t>Interpolated Value</a:t>
-            </a:r>
-          </a:p>
-          <a:p>
-            <a:pPr algn="ctr">
-              <a:spcBef>
-                <a:spcPts val="0"/>
-              </a:spcBef>
-            </a:pPr>
-            <a:r>
-              <a:rPr lang="en-US" sz="1200" dirty="0">
-                <a:latin typeface="Tahoma" panose="020B0604030504040204" pitchFamily="34" charset="0"/>
-                <a:ea typeface="Tahoma" panose="020B0604030504040204" pitchFamily="34" charset="0"/>
-                <a:cs typeface="Tahoma" panose="020B0604030504040204" pitchFamily="34" charset="0"/>
-              </a:rPr>
-              <a:t>= Base + (Next – Base) * Offset</a:t>
-            </a:r>
-          </a:p>
-        </p:txBody>
-      </p:sp>
-      <p:cxnSp>
-        <p:nvCxnSpPr>
-          <p:cNvPr id="3076" name="Straight Arrow Connector 3075"/>
-          <p:cNvCxnSpPr/>
-          <p:nvPr/>
-        </p:nvCxnSpPr>
-        <p:spPr bwMode="auto">
-          <a:xfrm flipH="1">
-            <a:off x="2328128" y="1138030"/>
-            <a:ext cx="2668" cy="312813"/>
-          </a:xfrm>
-          <a:prstGeom prst="straightConnector1">
-            <a:avLst/>
-          </a:prstGeom>
-          <a:solidFill>
-            <a:srgbClr val="0C2D83"/>
-          </a:solidFill>
-          <a:ln w="12700" cap="flat" cmpd="sng" algn="ctr">
-            <a:solidFill>
-              <a:schemeClr val="tx1"/>
-            </a:solidFill>
-            <a:prstDash val="solid"/>
-            <a:round/>
-            <a:headEnd type="none" w="med" len="med"/>
-            <a:tailEnd type="triangle"/>
-          </a:ln>
-          <a:effectLst/>
-        </p:spPr>
-      </p:cxnSp>
-      <p:cxnSp>
-        <p:nvCxnSpPr>
-          <p:cNvPr id="3085" name="Straight Arrow Connector 3084"/>
-          <p:cNvCxnSpPr/>
-          <p:nvPr/>
-        </p:nvCxnSpPr>
-        <p:spPr bwMode="auto">
-          <a:xfrm>
-            <a:off x="2039273" y="413103"/>
-            <a:ext cx="3338" cy="296533"/>
-          </a:xfrm>
-          <a:prstGeom prst="straightConnector1">
-            <a:avLst/>
-          </a:prstGeom>
-          <a:solidFill>
-            <a:srgbClr val="0C2D83"/>
-          </a:solidFill>
-          <a:ln w="12700" cap="flat" cmpd="sng" algn="ctr">
-            <a:solidFill>
-              <a:schemeClr val="tx1"/>
-            </a:solidFill>
-            <a:prstDash val="solid"/>
-            <a:round/>
-            <a:headEnd type="none" w="med" len="med"/>
-            <a:tailEnd type="triangle"/>
-          </a:ln>
-          <a:effectLst/>
-        </p:spPr>
-      </p:cxnSp>
-      <p:cxnSp>
-        <p:nvCxnSpPr>
-          <p:cNvPr id="3091" name="Straight Connector 3090"/>
-          <p:cNvCxnSpPr/>
-          <p:nvPr/>
-        </p:nvCxnSpPr>
-        <p:spPr bwMode="auto">
-          <a:xfrm flipH="1">
-            <a:off x="1330033" y="406610"/>
-            <a:ext cx="709240" cy="6493"/>
-          </a:xfrm>
-          <a:prstGeom prst="line">
-            <a:avLst/>
-          </a:prstGeom>
-          <a:solidFill>
-            <a:srgbClr val="0C2D83"/>
-          </a:solidFill>
-          <a:ln w="12700" cap="flat" cmpd="sng" algn="ctr">
-            <a:solidFill>
-              <a:schemeClr val="tx1"/>
-            </a:solidFill>
-            <a:prstDash val="solid"/>
-            <a:round/>
-            <a:headEnd type="none" w="med" len="med"/>
-            <a:tailEnd type="none" w="med" len="med"/>
-          </a:ln>
-          <a:effectLst/>
-        </p:spPr>
-      </p:cxnSp>
-      <p:cxnSp>
-        <p:nvCxnSpPr>
-          <p:cNvPr id="3093" name="Straight Connector 3092"/>
-          <p:cNvCxnSpPr/>
-          <p:nvPr/>
-        </p:nvCxnSpPr>
-        <p:spPr bwMode="auto">
-          <a:xfrm flipH="1">
-            <a:off x="1309435" y="401068"/>
-            <a:ext cx="20598" cy="1570023"/>
-          </a:xfrm>
-          <a:prstGeom prst="line">
-            <a:avLst/>
-          </a:prstGeom>
-          <a:solidFill>
-            <a:srgbClr val="0C2D83"/>
-          </a:solidFill>
-          <a:ln w="12700" cap="flat" cmpd="sng" algn="ctr">
-            <a:solidFill>
-              <a:schemeClr val="tx1"/>
-            </a:solidFill>
-            <a:prstDash val="solid"/>
-            <a:round/>
-            <a:headEnd type="none" w="med" len="med"/>
-            <a:tailEnd type="none" w="med" len="med"/>
-          </a:ln>
-          <a:effectLst/>
-        </p:spPr>
-      </p:cxnSp>
-      <p:sp>
-        <p:nvSpPr>
-          <p:cNvPr id="3096" name="TextBox 3095"/>
-          <p:cNvSpPr txBox="1"/>
-          <p:nvPr/>
-        </p:nvSpPr>
-        <p:spPr>
-          <a:xfrm>
-            <a:off x="2777355" y="1468129"/>
-            <a:ext cx="513933" cy="276999"/>
-          </a:xfrm>
-          <a:prstGeom prst="rect">
-            <a:avLst/>
-          </a:prstGeom>
-          <a:noFill/>
-        </p:spPr>
-        <p:txBody>
-          <a:bodyPr wrap="square" rtlCol="0">
-            <a:spAutoFit/>
-          </a:bodyPr>
-          <a:lstStyle/>
-          <a:p>
-            <a:r>
-              <a:rPr lang="en-US" sz="1200" dirty="0">
-                <a:solidFill>
-                  <a:srgbClr val="FF0000"/>
-                </a:solidFill>
-                <a:latin typeface="Tahoma" panose="020B0604030504040204" pitchFamily="34" charset="0"/>
-                <a:ea typeface="Tahoma" panose="020B0604030504040204" pitchFamily="34" charset="0"/>
-                <a:cs typeface="Tahoma" panose="020B0604030504040204" pitchFamily="34" charset="0"/>
-              </a:rPr>
-              <a:t>Q4.4</a:t>
-            </a:r>
-          </a:p>
-        </p:txBody>
-      </p:sp>
-      <p:cxnSp>
-        <p:nvCxnSpPr>
-          <p:cNvPr id="57" name="Straight Connector 56"/>
-          <p:cNvCxnSpPr/>
-          <p:nvPr/>
-        </p:nvCxnSpPr>
-        <p:spPr bwMode="auto">
-          <a:xfrm flipH="1">
-            <a:off x="1981086" y="520520"/>
-            <a:ext cx="103454" cy="99875"/>
-          </a:xfrm>
-          <a:prstGeom prst="line">
-            <a:avLst/>
-          </a:prstGeom>
-          <a:solidFill>
-            <a:srgbClr val="0C2D83"/>
-          </a:solidFill>
-          <a:ln w="12700" cap="flat" cmpd="sng" algn="ctr">
-            <a:solidFill>
-              <a:schemeClr val="tx1"/>
-            </a:solidFill>
-            <a:prstDash val="solid"/>
-            <a:round/>
-            <a:headEnd type="none" w="med" len="med"/>
-            <a:tailEnd type="none" w="med" len="med"/>
-          </a:ln>
-          <a:effectLst/>
-        </p:spPr>
-      </p:cxnSp>
-      <p:sp>
-        <p:nvSpPr>
-          <p:cNvPr id="58" name="TextBox 57"/>
-          <p:cNvSpPr txBox="1"/>
-          <p:nvPr/>
-        </p:nvSpPr>
-        <p:spPr>
-          <a:xfrm>
-            <a:off x="1830701" y="380092"/>
+            <a:off x="2104937" y="1733203"/>
             <a:ext cx="268022" cy="276999"/>
           </a:xfrm>
           <a:prstGeom prst="rect">
@@ -6479,219 +6244,6 @@
           </a:p>
         </p:txBody>
       </p:sp>
-      <p:cxnSp>
-        <p:nvCxnSpPr>
-          <p:cNvPr id="3100" name="Straight Arrow Connector 3099"/>
-          <p:cNvCxnSpPr>
-            <a:stCxn id="12" idx="2"/>
-          </p:cNvCxnSpPr>
-          <p:nvPr/>
-        </p:nvCxnSpPr>
-        <p:spPr bwMode="auto">
-          <a:xfrm flipH="1">
-            <a:off x="2307049" y="1805178"/>
-            <a:ext cx="266" cy="420543"/>
-          </a:xfrm>
-          <a:prstGeom prst="straightConnector1">
-            <a:avLst/>
-          </a:prstGeom>
-          <a:solidFill>
-            <a:srgbClr val="0C2D83"/>
-          </a:solidFill>
-          <a:ln w="12700" cap="flat" cmpd="sng" algn="ctr">
-            <a:solidFill>
-              <a:schemeClr val="tx1"/>
-            </a:solidFill>
-            <a:prstDash val="solid"/>
-            <a:round/>
-            <a:headEnd type="none" w="med" len="med"/>
-            <a:tailEnd type="triangle"/>
-          </a:ln>
-          <a:effectLst/>
-        </p:spPr>
-      </p:cxnSp>
-      <p:cxnSp>
-        <p:nvCxnSpPr>
-          <p:cNvPr id="63" name="Straight Connector 62"/>
-          <p:cNvCxnSpPr/>
-          <p:nvPr/>
-        </p:nvCxnSpPr>
-        <p:spPr bwMode="auto">
-          <a:xfrm flipH="1">
-            <a:off x="2255322" y="1855369"/>
-            <a:ext cx="103454" cy="99875"/>
-          </a:xfrm>
-          <a:prstGeom prst="line">
-            <a:avLst/>
-          </a:prstGeom>
-          <a:solidFill>
-            <a:srgbClr val="0C2D83"/>
-          </a:solidFill>
-          <a:ln w="12700" cap="flat" cmpd="sng" algn="ctr">
-            <a:solidFill>
-              <a:schemeClr val="tx1"/>
-            </a:solidFill>
-            <a:prstDash val="solid"/>
-            <a:round/>
-            <a:headEnd type="none" w="med" len="med"/>
-            <a:tailEnd type="none" w="med" len="med"/>
-          </a:ln>
-          <a:effectLst/>
-        </p:spPr>
-      </p:cxnSp>
-      <p:sp>
-        <p:nvSpPr>
-          <p:cNvPr id="64" name="TextBox 63"/>
-          <p:cNvSpPr txBox="1"/>
-          <p:nvPr/>
-        </p:nvSpPr>
-        <p:spPr>
-          <a:xfrm>
-            <a:off x="2104937" y="1733203"/>
-            <a:ext cx="268022" cy="276999"/>
-          </a:xfrm>
-          <a:prstGeom prst="rect">
-            <a:avLst/>
-          </a:prstGeom>
-          <a:noFill/>
-        </p:spPr>
-        <p:txBody>
-          <a:bodyPr wrap="none" rtlCol="0">
-            <a:spAutoFit/>
-          </a:bodyPr>
-          <a:lstStyle/>
-          <a:p>
-            <a:r>
-              <a:rPr lang="en-US" sz="1200" dirty="0">
-                <a:latin typeface="Tahoma" panose="020B0604030504040204" pitchFamily="34" charset="0"/>
-                <a:ea typeface="Tahoma" panose="020B0604030504040204" pitchFamily="34" charset="0"/>
-                <a:cs typeface="Tahoma" panose="020B0604030504040204" pitchFamily="34" charset="0"/>
-              </a:rPr>
-              <a:t>8</a:t>
-            </a:r>
-          </a:p>
-        </p:txBody>
-      </p:sp>
-      <p:cxnSp>
-        <p:nvCxnSpPr>
-          <p:cNvPr id="65" name="Straight Connector 64"/>
-          <p:cNvCxnSpPr/>
-          <p:nvPr/>
-        </p:nvCxnSpPr>
-        <p:spPr bwMode="auto">
-          <a:xfrm flipH="1" flipV="1">
-            <a:off x="1309435" y="1971091"/>
-            <a:ext cx="1009425" cy="9578"/>
-          </a:xfrm>
-          <a:prstGeom prst="line">
-            <a:avLst/>
-          </a:prstGeom>
-          <a:solidFill>
-            <a:srgbClr val="0C2D83"/>
-          </a:solidFill>
-          <a:ln w="12700" cap="flat" cmpd="sng" algn="ctr">
-            <a:solidFill>
-              <a:schemeClr val="tx1"/>
-            </a:solidFill>
-            <a:prstDash val="solid"/>
-            <a:round/>
-            <a:headEnd type="none" w="med" len="med"/>
-            <a:tailEnd type="none" w="med" len="med"/>
-          </a:ln>
-          <a:effectLst/>
-        </p:spPr>
-      </p:cxnSp>
-      <p:cxnSp>
-        <p:nvCxnSpPr>
-          <p:cNvPr id="70" name="Straight Connector 69"/>
-          <p:cNvCxnSpPr/>
-          <p:nvPr/>
-        </p:nvCxnSpPr>
-        <p:spPr bwMode="auto">
-          <a:xfrm flipH="1">
-            <a:off x="2268343" y="1246166"/>
-            <a:ext cx="103454" cy="99875"/>
-          </a:xfrm>
-          <a:prstGeom prst="line">
-            <a:avLst/>
-          </a:prstGeom>
-          <a:solidFill>
-            <a:srgbClr val="0C2D83"/>
-          </a:solidFill>
-          <a:ln w="12700" cap="flat" cmpd="sng" algn="ctr">
-            <a:solidFill>
-              <a:schemeClr val="tx1"/>
-            </a:solidFill>
-            <a:prstDash val="solid"/>
-            <a:round/>
-            <a:headEnd type="none" w="med" len="med"/>
-            <a:tailEnd type="none" w="med" len="med"/>
-          </a:ln>
-          <a:effectLst/>
-        </p:spPr>
-      </p:cxnSp>
-      <p:sp>
-        <p:nvSpPr>
-          <p:cNvPr id="71" name="TextBox 70"/>
-          <p:cNvSpPr txBox="1"/>
-          <p:nvPr/>
-        </p:nvSpPr>
-        <p:spPr>
-          <a:xfrm>
-            <a:off x="2117958" y="1124000"/>
-            <a:ext cx="268022" cy="276999"/>
-          </a:xfrm>
-          <a:prstGeom prst="rect">
-            <a:avLst/>
-          </a:prstGeom>
-          <a:noFill/>
-        </p:spPr>
-        <p:txBody>
-          <a:bodyPr wrap="none" rtlCol="0">
-            <a:spAutoFit/>
-          </a:bodyPr>
-          <a:lstStyle/>
-          <a:p>
-            <a:r>
-              <a:rPr lang="en-US" sz="1200" dirty="0">
-                <a:latin typeface="Tahoma" panose="020B0604030504040204" pitchFamily="34" charset="0"/>
-                <a:ea typeface="Tahoma" panose="020B0604030504040204" pitchFamily="34" charset="0"/>
-                <a:cs typeface="Tahoma" panose="020B0604030504040204" pitchFamily="34" charset="0"/>
-              </a:rPr>
-              <a:t>8</a:t>
-            </a:r>
-          </a:p>
-        </p:txBody>
-      </p:sp>
-      <p:cxnSp>
-        <p:nvCxnSpPr>
-          <p:cNvPr id="72" name="Straight Connector 71"/>
-          <p:cNvCxnSpPr/>
-          <p:nvPr/>
-        </p:nvCxnSpPr>
-        <p:spPr bwMode="auto">
-          <a:xfrm flipH="1">
-            <a:off x="2588010" y="503143"/>
-            <a:ext cx="103454" cy="99875"/>
-          </a:xfrm>
-          <a:prstGeom prst="line">
-            <a:avLst/>
-          </a:prstGeom>
-          <a:solidFill>
-            <a:srgbClr val="0C2D83"/>
-          </a:solidFill>
-          <a:ln w="12700" cap="flat" cmpd="sng" algn="ctr">
-            <a:solidFill>
-              <a:schemeClr val="tx1"/>
-            </a:solidFill>
-            <a:prstDash val="solid"/>
-            <a:round/>
-            <a:headEnd type="none" w="med" len="med"/>
-            <a:tailEnd type="none" w="med" len="med"/>
-          </a:ln>
-          <a:effectLst/>
-        </p:spPr>
-      </p:cxnSp>
       <p:grpSp>
         <p:nvGrpSpPr>
           <p:cNvPr id="74" name="Group 73"/>
@@ -10062,8 +9614,8 @@
         </p:nvSpPr>
         <p:spPr>
           <a:xfrm>
-            <a:off x="2404369" y="374587"/>
-            <a:ext cx="776751" cy="276999"/>
+            <a:off x="1422945" y="895540"/>
+            <a:ext cx="741293" cy="276999"/>
           </a:xfrm>
           <a:prstGeom prst="rect">
             <a:avLst/>
@@ -10084,7 +9636,7 @@
                 <a:ea typeface="Tahoma" panose="020B0604030504040204" pitchFamily="34" charset="0"/>
                 <a:cs typeface="Tahoma" panose="020B0604030504040204" pitchFamily="34" charset="0"/>
               </a:rPr>
-              <a:t>Switches</a:t>
+              <a:t>2 Cycles</a:t>
             </a:r>
           </a:p>
         </p:txBody>
@@ -10202,8 +9754,8 @@
         </p:nvSpPr>
         <p:spPr>
           <a:xfrm>
-            <a:off x="8211002" y="1066100"/>
-            <a:ext cx="776751" cy="276999"/>
+            <a:off x="7708733" y="1538951"/>
+            <a:ext cx="712054" cy="215444"/>
           </a:xfrm>
           <a:prstGeom prst="rect">
             <a:avLst/>
@@ -10219,12 +9771,12 @@
           <a:lstStyle/>
           <a:p>
             <a:r>
-              <a:rPr lang="en-US" sz="1200" dirty="0">
+              <a:rPr lang="en-US" sz="800" dirty="0">
                 <a:latin typeface="Tahoma" panose="020B0604030504040204" pitchFamily="34" charset="0"/>
                 <a:ea typeface="Tahoma" panose="020B0604030504040204" pitchFamily="34" charset="0"/>
                 <a:cs typeface="Tahoma" panose="020B0604030504040204" pitchFamily="34" charset="0"/>
               </a:rPr>
-              <a:t>Switches</a:t>
+              <a:t>Switch(7:6)</a:t>
             </a:r>
           </a:p>
         </p:txBody>
@@ -10237,7 +9789,7 @@
         </p:nvSpPr>
         <p:spPr bwMode="auto">
           <a:xfrm>
-            <a:off x="8398705" y="1535047"/>
+            <a:off x="8156550" y="2060899"/>
             <a:ext cx="403401" cy="242802"/>
           </a:xfrm>
           <a:prstGeom prst="rect">
@@ -10302,7 +9854,7 @@
         </p:nvSpPr>
         <p:spPr bwMode="auto">
           <a:xfrm>
-            <a:off x="8238575" y="2099329"/>
+            <a:off x="8234984" y="2068157"/>
             <a:ext cx="403401" cy="242802"/>
           </a:xfrm>
           <a:prstGeom prst="rect">
@@ -10591,21 +10143,19 @@
       </p:sp>
       <p:sp>
         <p:nvSpPr>
-          <p:cNvPr id="143" name="TextBox 142"/>
+          <p:cNvPr id="148" name="TextBox 147"/>
           <p:cNvSpPr txBox="1"/>
           <p:nvPr/>
         </p:nvSpPr>
         <p:spPr>
           <a:xfrm>
-            <a:off x="8247541" y="2040438"/>
-            <a:ext cx="284545" cy="276999"/>
+            <a:off x="8475503" y="2237224"/>
+            <a:ext cx="513933" cy="276999"/>
           </a:xfrm>
           <a:prstGeom prst="rect">
             <a:avLst/>
           </a:prstGeom>
-          <a:solidFill>
-            <a:schemeClr val="bg1"/>
-          </a:solidFill>
+          <a:noFill/>
         </p:spPr>
         <p:txBody>
           <a:bodyPr wrap="square" rtlCol="0">
@@ -10615,24 +10165,205 @@
           <a:p>
             <a:r>
               <a:rPr lang="en-US" sz="1200" dirty="0">
+                <a:solidFill>
+                  <a:srgbClr val="FF0000"/>
+                </a:solidFill>
                 <a:latin typeface="Tahoma" panose="020B0604030504040204" pitchFamily="34" charset="0"/>
                 <a:ea typeface="Tahoma" panose="020B0604030504040204" pitchFamily="34" charset="0"/>
                 <a:cs typeface="Tahoma" panose="020B0604030504040204" pitchFamily="34" charset="0"/>
               </a:rPr>
-              <a:t>8</a:t>
-            </a:r>
-          </a:p>
-        </p:txBody>
-      </p:sp>
-      <p:sp>
-        <p:nvSpPr>
-          <p:cNvPr id="148" name="TextBox 147"/>
+              <a:t>Q3.0</a:t>
+            </a:r>
+          </a:p>
+        </p:txBody>
+      </p:sp>
+      <p:sp>
+        <p:nvSpPr>
+          <p:cNvPr id="153" name="TextBox 152"/>
           <p:cNvSpPr txBox="1"/>
           <p:nvPr/>
         </p:nvSpPr>
         <p:spPr>
           <a:xfrm>
-            <a:off x="8510314" y="2017818"/>
+            <a:off x="132162" y="5270106"/>
+            <a:ext cx="1635513" cy="461665"/>
+          </a:xfrm>
+          <a:prstGeom prst="rect">
+            <a:avLst/>
+          </a:prstGeom>
+          <a:noFill/>
+        </p:spPr>
+        <p:txBody>
+          <a:bodyPr wrap="square" rtlCol="0">
+            <a:spAutoFit/>
+          </a:bodyPr>
+          <a:lstStyle/>
+          <a:p>
+            <a:r>
+              <a:rPr lang="en-US" sz="800" dirty="0">
+                <a:solidFill>
+                  <a:srgbClr val="0070C0"/>
+                </a:solidFill>
+                <a:latin typeface="Tahoma" panose="020B0604030504040204" pitchFamily="34" charset="0"/>
+                <a:ea typeface="Tahoma" panose="020B0604030504040204" pitchFamily="34" charset="0"/>
+                <a:cs typeface="Tahoma" panose="020B0604030504040204" pitchFamily="34" charset="0"/>
+              </a:rPr>
+              <a:t>BRAM is assumed to be signed. If not, convert from unsigned to sign after reading value</a:t>
+            </a:r>
+          </a:p>
+        </p:txBody>
+      </p:sp>
+      <p:sp>
+        <p:nvSpPr>
+          <p:cNvPr id="156" name="TextBox 155"/>
+          <p:cNvSpPr txBox="1"/>
+          <p:nvPr/>
+        </p:nvSpPr>
+        <p:spPr>
+          <a:xfrm>
+            <a:off x="5049551" y="5946886"/>
+            <a:ext cx="3373988" cy="707886"/>
+          </a:xfrm>
+          <a:prstGeom prst="rect">
+            <a:avLst/>
+          </a:prstGeom>
+          <a:noFill/>
+        </p:spPr>
+        <p:txBody>
+          <a:bodyPr wrap="square" rtlCol="0">
+            <a:spAutoFit/>
+          </a:bodyPr>
+          <a:lstStyle/>
+          <a:p>
+            <a:pPr>
+              <a:spcBef>
+                <a:spcPts val="0"/>
+              </a:spcBef>
+            </a:pPr>
+            <a:r>
+              <a:rPr lang="en-US" sz="800" dirty="0">
+                <a:solidFill>
+                  <a:srgbClr val="0070C0"/>
+                </a:solidFill>
+                <a:latin typeface="Tahoma" panose="020B0604030504040204" pitchFamily="34" charset="0"/>
+                <a:ea typeface="Tahoma" panose="020B0604030504040204" pitchFamily="34" charset="0"/>
+                <a:cs typeface="Tahoma" panose="020B0604030504040204" pitchFamily="34" charset="0"/>
+              </a:rPr>
+              <a:t>WARNING: Our VHDL does signed multiplies, not unsigned multiplies</a:t>
+            </a:r>
+          </a:p>
+          <a:p>
+            <a:pPr>
+              <a:spcBef>
+                <a:spcPts val="0"/>
+              </a:spcBef>
+            </a:pPr>
+            <a:r>
+              <a:rPr lang="en-US" sz="800" dirty="0">
+                <a:solidFill>
+                  <a:srgbClr val="0070C0"/>
+                </a:solidFill>
+                <a:latin typeface="Tahoma" panose="020B0604030504040204" pitchFamily="34" charset="0"/>
+                <a:ea typeface="Tahoma" panose="020B0604030504040204" pitchFamily="34" charset="0"/>
+                <a:cs typeface="Tahoma" panose="020B0604030504040204" pitchFamily="34" charset="0"/>
+              </a:rPr>
+              <a:t>If a value is unsigned, like Offset and Amplify,</a:t>
+            </a:r>
+          </a:p>
+          <a:p>
+            <a:pPr>
+              <a:spcBef>
+                <a:spcPts val="0"/>
+              </a:spcBef>
+            </a:pPr>
+            <a:r>
+              <a:rPr lang="en-US" sz="800" dirty="0">
+                <a:solidFill>
+                  <a:srgbClr val="0070C0"/>
+                </a:solidFill>
+                <a:latin typeface="Tahoma" panose="020B0604030504040204" pitchFamily="34" charset="0"/>
+                <a:ea typeface="Tahoma" panose="020B0604030504040204" pitchFamily="34" charset="0"/>
+                <a:cs typeface="Tahoma" panose="020B0604030504040204" pitchFamily="34" charset="0"/>
+              </a:rPr>
+              <a:t>you will need to fool the multiply by appending a ‘0’ to the MSB,</a:t>
+            </a:r>
+          </a:p>
+          <a:p>
+            <a:pPr>
+              <a:spcBef>
+                <a:spcPts val="0"/>
+              </a:spcBef>
+            </a:pPr>
+            <a:r>
+              <a:rPr lang="en-US" sz="800" dirty="0">
+                <a:solidFill>
+                  <a:srgbClr val="0070C0"/>
+                </a:solidFill>
+                <a:latin typeface="Tahoma" panose="020B0604030504040204" pitchFamily="34" charset="0"/>
+                <a:ea typeface="Tahoma" panose="020B0604030504040204" pitchFamily="34" charset="0"/>
+                <a:cs typeface="Tahoma" panose="020B0604030504040204" pitchFamily="34" charset="0"/>
+              </a:rPr>
+              <a:t>And then remove the MSB from the answer. If both inputs are unsigned, you’ll need to remove two ‘00’s from the MSB of the answer</a:t>
+            </a:r>
+          </a:p>
+        </p:txBody>
+      </p:sp>
+      <p:sp>
+        <p:nvSpPr>
+          <p:cNvPr id="158" name="TextBox 157"/>
+          <p:cNvSpPr txBox="1"/>
+          <p:nvPr/>
+        </p:nvSpPr>
+        <p:spPr>
+          <a:xfrm>
+            <a:off x="3339632" y="194824"/>
+            <a:ext cx="2546277" cy="338554"/>
+          </a:xfrm>
+          <a:prstGeom prst="rect">
+            <a:avLst/>
+          </a:prstGeom>
+          <a:noFill/>
+        </p:spPr>
+        <p:txBody>
+          <a:bodyPr wrap="square" rtlCol="0">
+            <a:spAutoFit/>
+          </a:bodyPr>
+          <a:lstStyle/>
+          <a:p>
+            <a:pPr>
+              <a:spcBef>
+                <a:spcPts val="0"/>
+              </a:spcBef>
+            </a:pPr>
+            <a:r>
+              <a:rPr lang="en-US" sz="800" dirty="0">
+                <a:solidFill>
+                  <a:srgbClr val="0070C0"/>
+                </a:solidFill>
+                <a:latin typeface="Tahoma" panose="020B0604030504040204" pitchFamily="34" charset="0"/>
+                <a:ea typeface="Tahoma" panose="020B0604030504040204" pitchFamily="34" charset="0"/>
+                <a:cs typeface="Tahoma" panose="020B0604030504040204" pitchFamily="34" charset="0"/>
+              </a:rPr>
+              <a:t>WARNING: This data flow is assumed for “signed” sine wave, not “unsigned”</a:t>
+            </a:r>
+          </a:p>
+        </p:txBody>
+      </p:sp>
+      <p:sp>
+        <p:nvSpPr>
+          <p:cNvPr id="159" name="TextBox 158">
+            <a:extLst>
+              <a:ext uri="{FF2B5EF4-FFF2-40B4-BE49-F238E27FC236}">
+                <a16:creationId xmlns:a16="http://schemas.microsoft.com/office/drawing/2014/main" id="{79E5ED9A-5952-453F-BFDC-B2B9BC97D45C}"/>
+              </a:ext>
+            </a:extLst>
+          </p:cNvPr>
+          <p:cNvSpPr txBox="1"/>
+          <p:nvPr/>
+        </p:nvSpPr>
+        <p:spPr>
+          <a:xfrm>
+            <a:off x="2347841" y="5538922"/>
             <a:ext cx="513933" cy="276999"/>
           </a:xfrm>
           <a:prstGeom prst="rect">
@@ -10662,182 +10393,10 @@
       </p:sp>
       <p:sp>
         <p:nvSpPr>
-          <p:cNvPr id="153" name="TextBox 152"/>
-          <p:cNvSpPr txBox="1"/>
-          <p:nvPr/>
-        </p:nvSpPr>
-        <p:spPr>
-          <a:xfrm>
-            <a:off x="132162" y="5270106"/>
-            <a:ext cx="1635513" cy="461665"/>
-          </a:xfrm>
-          <a:prstGeom prst="rect">
-            <a:avLst/>
-          </a:prstGeom>
-          <a:noFill/>
-        </p:spPr>
-        <p:txBody>
-          <a:bodyPr wrap="square" rtlCol="0">
-            <a:spAutoFit/>
-          </a:bodyPr>
-          <a:lstStyle/>
-          <a:p>
-            <a:r>
-              <a:rPr lang="en-US" sz="800" dirty="0">
-                <a:solidFill>
-                  <a:srgbClr val="0070C0"/>
-                </a:solidFill>
-                <a:latin typeface="Tahoma" panose="020B0604030504040204" pitchFamily="34" charset="0"/>
-                <a:ea typeface="Tahoma" panose="020B0604030504040204" pitchFamily="34" charset="0"/>
-                <a:cs typeface="Tahoma" panose="020B0604030504040204" pitchFamily="34" charset="0"/>
-              </a:rPr>
-              <a:t>BRAM is assumed to be signed. If not, convert from unsigned to sign after reading value</a:t>
-            </a:r>
-          </a:p>
-        </p:txBody>
-      </p:sp>
-      <p:sp>
-        <p:nvSpPr>
-          <p:cNvPr id="156" name="TextBox 155"/>
-          <p:cNvSpPr txBox="1"/>
-          <p:nvPr/>
-        </p:nvSpPr>
-        <p:spPr>
-          <a:xfrm>
-            <a:off x="5049551" y="5946886"/>
-            <a:ext cx="3373988" cy="707886"/>
-          </a:xfrm>
-          <a:prstGeom prst="rect">
-            <a:avLst/>
-          </a:prstGeom>
-          <a:noFill/>
-        </p:spPr>
-        <p:txBody>
-          <a:bodyPr wrap="square" rtlCol="0">
-            <a:spAutoFit/>
-          </a:bodyPr>
-          <a:lstStyle/>
-          <a:p>
-            <a:pPr>
-              <a:spcBef>
-                <a:spcPts val="0"/>
-              </a:spcBef>
-            </a:pPr>
-            <a:r>
-              <a:rPr lang="en-US" sz="800" dirty="0">
-                <a:solidFill>
-                  <a:srgbClr val="0070C0"/>
-                </a:solidFill>
-                <a:latin typeface="Tahoma" panose="020B0604030504040204" pitchFamily="34" charset="0"/>
-                <a:ea typeface="Tahoma" panose="020B0604030504040204" pitchFamily="34" charset="0"/>
-                <a:cs typeface="Tahoma" panose="020B0604030504040204" pitchFamily="34" charset="0"/>
-              </a:rPr>
-              <a:t>WARNING: Our VHDL does signed multiplies, not unsigned multiplies</a:t>
-            </a:r>
-          </a:p>
-          <a:p>
-            <a:pPr>
-              <a:spcBef>
-                <a:spcPts val="0"/>
-              </a:spcBef>
-            </a:pPr>
-            <a:r>
-              <a:rPr lang="en-US" sz="800" dirty="0">
-                <a:solidFill>
-                  <a:srgbClr val="0070C0"/>
-                </a:solidFill>
-                <a:latin typeface="Tahoma" panose="020B0604030504040204" pitchFamily="34" charset="0"/>
-                <a:ea typeface="Tahoma" panose="020B0604030504040204" pitchFamily="34" charset="0"/>
-                <a:cs typeface="Tahoma" panose="020B0604030504040204" pitchFamily="34" charset="0"/>
-              </a:rPr>
-              <a:t>If a value is unsigned, like Offset and Amplify,</a:t>
-            </a:r>
-          </a:p>
-          <a:p>
-            <a:pPr>
-              <a:spcBef>
-                <a:spcPts val="0"/>
-              </a:spcBef>
-            </a:pPr>
-            <a:r>
-              <a:rPr lang="en-US" sz="800" dirty="0">
-                <a:solidFill>
-                  <a:srgbClr val="0070C0"/>
-                </a:solidFill>
-                <a:latin typeface="Tahoma" panose="020B0604030504040204" pitchFamily="34" charset="0"/>
-                <a:ea typeface="Tahoma" panose="020B0604030504040204" pitchFamily="34" charset="0"/>
-                <a:cs typeface="Tahoma" panose="020B0604030504040204" pitchFamily="34" charset="0"/>
-              </a:rPr>
-              <a:t>you will need to fool the multiply by appending a ‘0’ to the MSB,</a:t>
-            </a:r>
-          </a:p>
-          <a:p>
-            <a:pPr>
-              <a:spcBef>
-                <a:spcPts val="0"/>
-              </a:spcBef>
-            </a:pPr>
-            <a:r>
-              <a:rPr lang="en-US" sz="800" dirty="0">
-                <a:solidFill>
-                  <a:srgbClr val="0070C0"/>
-                </a:solidFill>
-                <a:latin typeface="Tahoma" panose="020B0604030504040204" pitchFamily="34" charset="0"/>
-                <a:ea typeface="Tahoma" panose="020B0604030504040204" pitchFamily="34" charset="0"/>
-                <a:cs typeface="Tahoma" panose="020B0604030504040204" pitchFamily="34" charset="0"/>
-              </a:rPr>
-              <a:t>And then remove the MSB from the answer. If both inputs are unsigned, you’ll need to remove two ‘00’s from the MSB of the answer</a:t>
-            </a:r>
-          </a:p>
-        </p:txBody>
-      </p:sp>
-      <p:sp>
-        <p:nvSpPr>
-          <p:cNvPr id="158" name="TextBox 157"/>
-          <p:cNvSpPr txBox="1"/>
-          <p:nvPr/>
-        </p:nvSpPr>
-        <p:spPr>
-          <a:xfrm>
-            <a:off x="3339632" y="194824"/>
-            <a:ext cx="2546277" cy="338554"/>
-          </a:xfrm>
-          <a:prstGeom prst="rect">
-            <a:avLst/>
-          </a:prstGeom>
-          <a:noFill/>
-        </p:spPr>
-        <p:txBody>
-          <a:bodyPr wrap="square" rtlCol="0">
-            <a:spAutoFit/>
-          </a:bodyPr>
-          <a:lstStyle/>
-          <a:p>
-            <a:pPr>
-              <a:spcBef>
-                <a:spcPts val="0"/>
-              </a:spcBef>
-            </a:pPr>
-            <a:r>
-              <a:rPr lang="en-US" sz="800" dirty="0">
-                <a:solidFill>
-                  <a:srgbClr val="0070C0"/>
-                </a:solidFill>
-                <a:latin typeface="Tahoma" panose="020B0604030504040204" pitchFamily="34" charset="0"/>
-                <a:ea typeface="Tahoma" panose="020B0604030504040204" pitchFamily="34" charset="0"/>
-                <a:cs typeface="Tahoma" panose="020B0604030504040204" pitchFamily="34" charset="0"/>
-              </a:rPr>
-              <a:t>WARNING: This data flow is assumed for “signed” sine wave, not “unsigned”</a:t>
-            </a:r>
-          </a:p>
-        </p:txBody>
-      </p:sp>
-      <p:sp>
-        <p:nvSpPr>
-          <p:cNvPr id="159" name="TextBox 158">
+          <p:cNvPr id="160" name="TextBox 159">
             <a:extLst>
               <a:ext uri="{FF2B5EF4-FFF2-40B4-BE49-F238E27FC236}">
-                <a16:creationId xmlns:a16="http://schemas.microsoft.com/office/drawing/2014/main" id="{79E5ED9A-5952-453F-BFDC-B2B9BC97D45C}"/>
+                <a16:creationId xmlns:a16="http://schemas.microsoft.com/office/drawing/2014/main" id="{34319FEC-62FC-4533-B322-13BB151EE936}"/>
               </a:ext>
             </a:extLst>
           </p:cNvPr>
@@ -10846,8 +10405,8 @@
         </p:nvSpPr>
         <p:spPr>
           <a:xfrm>
-            <a:off x="2347841" y="5538922"/>
-            <a:ext cx="513933" cy="276999"/>
+            <a:off x="7241552" y="3247155"/>
+            <a:ext cx="662237" cy="276999"/>
           </a:xfrm>
           <a:prstGeom prst="rect">
             <a:avLst/>
@@ -10869,49 +10428,7 @@
                 <a:ea typeface="Tahoma" panose="020B0604030504040204" pitchFamily="34" charset="0"/>
                 <a:cs typeface="Tahoma" panose="020B0604030504040204" pitchFamily="34" charset="0"/>
               </a:rPr>
-              <a:t>Q8.0</a:t>
-            </a:r>
-          </a:p>
-        </p:txBody>
-      </p:sp>
-      <p:sp>
-        <p:nvSpPr>
-          <p:cNvPr id="160" name="TextBox 159">
-            <a:extLst>
-              <a:ext uri="{FF2B5EF4-FFF2-40B4-BE49-F238E27FC236}">
-                <a16:creationId xmlns:a16="http://schemas.microsoft.com/office/drawing/2014/main" id="{34319FEC-62FC-4533-B322-13BB151EE936}"/>
-              </a:ext>
-            </a:extLst>
-          </p:cNvPr>
-          <p:cNvSpPr txBox="1"/>
-          <p:nvPr/>
-        </p:nvSpPr>
-        <p:spPr>
-          <a:xfrm>
-            <a:off x="7241552" y="3247155"/>
-            <a:ext cx="662237" cy="276999"/>
-          </a:xfrm>
-          <a:prstGeom prst="rect">
-            <a:avLst/>
-          </a:prstGeom>
-          <a:noFill/>
-        </p:spPr>
-        <p:txBody>
-          <a:bodyPr wrap="square" rtlCol="0">
-            <a:spAutoFit/>
-          </a:bodyPr>
-          <a:lstStyle/>
-          <a:p>
-            <a:r>
-              <a:rPr lang="en-US" sz="1200" dirty="0">
-                <a:solidFill>
-                  <a:srgbClr val="FF0000"/>
-                </a:solidFill>
-                <a:latin typeface="Tahoma" panose="020B0604030504040204" pitchFamily="34" charset="0"/>
-                <a:ea typeface="Tahoma" panose="020B0604030504040204" pitchFamily="34" charset="0"/>
-                <a:cs typeface="Tahoma" panose="020B0604030504040204" pitchFamily="34" charset="0"/>
-              </a:rPr>
-              <a:t>Q17.0</a:t>
+              <a:t>Q11.0</a:t>
             </a:r>
           </a:p>
         </p:txBody>
@@ -12578,7 +12095,7 @@
         </p:nvSpPr>
         <p:spPr bwMode="auto">
           <a:xfrm>
-            <a:off x="7657328" y="1595612"/>
+            <a:off x="7415173" y="2121464"/>
             <a:ext cx="1060560" cy="367384"/>
           </a:xfrm>
           <a:prstGeom prst="rect">
@@ -12633,22 +12150,141 @@
           </a:p>
         </p:txBody>
       </p:sp>
-      <p:cxnSp>
-        <p:nvCxnSpPr>
-          <p:cNvPr id="253" name="Straight Connector 252">
+      <p:sp>
+        <p:nvSpPr>
+          <p:cNvPr id="255" name="TextBox 254">
             <a:extLst>
               <a:ext uri="{FF2B5EF4-FFF2-40B4-BE49-F238E27FC236}">
-                <a16:creationId xmlns:a16="http://schemas.microsoft.com/office/drawing/2014/main" id="{67066F75-D07B-4B1C-9906-53F3C2B26E8D}"/>
+                <a16:creationId xmlns:a16="http://schemas.microsoft.com/office/drawing/2014/main" id="{84C8A656-C8C7-40DE-AB7D-AA9118210377}"/>
               </a:ext>
             </a:extLst>
           </p:cNvPr>
-          <p:cNvCxnSpPr/>
+          <p:cNvSpPr txBox="1"/>
+          <p:nvPr/>
+        </p:nvSpPr>
+        <p:spPr>
+          <a:xfrm>
+            <a:off x="7484402" y="2169658"/>
+            <a:ext cx="904735" cy="276999"/>
+          </a:xfrm>
+          <a:prstGeom prst="rect">
+            <a:avLst/>
+          </a:prstGeom>
+          <a:noFill/>
+        </p:spPr>
+        <p:txBody>
+          <a:bodyPr wrap="none" rtlCol="0">
+            <a:spAutoFit/>
+          </a:bodyPr>
+          <a:lstStyle/>
+          <a:p>
+            <a:r>
+              <a:rPr lang="en-US" sz="1200" dirty="0">
+                <a:latin typeface="Tahoma" panose="020B0604030504040204" pitchFamily="34" charset="0"/>
+                <a:ea typeface="Tahoma" panose="020B0604030504040204" pitchFamily="34" charset="0"/>
+                <a:cs typeface="Tahoma" panose="020B0604030504040204" pitchFamily="34" charset="0"/>
+              </a:rPr>
+              <a:t>Amplify By</a:t>
+            </a:r>
+          </a:p>
+        </p:txBody>
+      </p:sp>
+      <p:cxnSp>
+        <p:nvCxnSpPr>
+          <p:cNvPr id="258" name="Straight Arrow Connector 257">
+            <a:extLst>
+              <a:ext uri="{FF2B5EF4-FFF2-40B4-BE49-F238E27FC236}">
+                <a16:creationId xmlns:a16="http://schemas.microsoft.com/office/drawing/2014/main" id="{33E58C1D-C7EA-4DE2-B3CE-028CE66152F7}"/>
+              </a:ext>
+            </a:extLst>
+          </p:cNvPr>
+          <p:cNvCxnSpPr>
+            <a:cxnSpLocks/>
+          </p:cNvCxnSpPr>
           <p:nvPr/>
         </p:nvCxnSpPr>
         <p:spPr bwMode="auto">
           <a:xfrm>
-            <a:off x="7654684" y="1810767"/>
-            <a:ext cx="74104" cy="61844"/>
+            <a:off x="7677936" y="1765133"/>
+            <a:ext cx="5061" cy="346516"/>
+          </a:xfrm>
+          <a:prstGeom prst="straightConnector1">
+            <a:avLst/>
+          </a:prstGeom>
+          <a:solidFill>
+            <a:srgbClr val="0C2D83"/>
+          </a:solidFill>
+          <a:ln w="12700" cap="flat" cmpd="sng" algn="ctr">
+            <a:solidFill>
+              <a:schemeClr val="tx1"/>
+            </a:solidFill>
+            <a:prstDash val="solid"/>
+            <a:round/>
+            <a:headEnd type="none" w="med" len="med"/>
+            <a:tailEnd type="triangle"/>
+          </a:ln>
+          <a:effectLst/>
+        </p:spPr>
+      </p:cxnSp>
+      <p:sp>
+        <p:nvSpPr>
+          <p:cNvPr id="259" name="TextBox 258">
+            <a:extLst>
+              <a:ext uri="{FF2B5EF4-FFF2-40B4-BE49-F238E27FC236}">
+                <a16:creationId xmlns:a16="http://schemas.microsoft.com/office/drawing/2014/main" id="{A1FC83DE-205A-41FC-A236-1B0ADE2ED929}"/>
+              </a:ext>
+            </a:extLst>
+          </p:cNvPr>
+          <p:cNvSpPr txBox="1"/>
+          <p:nvPr/>
+        </p:nvSpPr>
+        <p:spPr>
+          <a:xfrm>
+            <a:off x="7508977" y="1555420"/>
+            <a:ext cx="284213" cy="215444"/>
+          </a:xfrm>
+          <a:prstGeom prst="rect">
+            <a:avLst/>
+          </a:prstGeom>
+          <a:solidFill>
+            <a:schemeClr val="bg1"/>
+          </a:solidFill>
+        </p:spPr>
+        <p:txBody>
+          <a:bodyPr wrap="square" rtlCol="0">
+            <a:spAutoFit/>
+          </a:bodyPr>
+          <a:lstStyle/>
+          <a:p>
+            <a:r>
+              <a:rPr lang="en-US" sz="800" dirty="0">
+                <a:latin typeface="Tahoma" panose="020B0604030504040204" pitchFamily="34" charset="0"/>
+                <a:ea typeface="Tahoma" panose="020B0604030504040204" pitchFamily="34" charset="0"/>
+                <a:cs typeface="Tahoma" panose="020B0604030504040204" pitchFamily="34" charset="0"/>
+              </a:rPr>
+              <a:t>‘0’</a:t>
+            </a:r>
+          </a:p>
+        </p:txBody>
+      </p:sp>
+      <p:cxnSp>
+        <p:nvCxnSpPr>
+          <p:cNvPr id="264" name="Straight Connector 263">
+            <a:extLst>
+              <a:ext uri="{FF2B5EF4-FFF2-40B4-BE49-F238E27FC236}">
+                <a16:creationId xmlns:a16="http://schemas.microsoft.com/office/drawing/2014/main" id="{ED1A6045-CEF1-4535-A022-56A97BE2BA5F}"/>
+              </a:ext>
+            </a:extLst>
+          </p:cNvPr>
+          <p:cNvCxnSpPr>
+            <a:cxnSpLocks/>
+          </p:cNvCxnSpPr>
+          <p:nvPr/>
+        </p:nvCxnSpPr>
+        <p:spPr bwMode="auto">
+          <a:xfrm flipH="1">
+            <a:off x="6867960" y="2511375"/>
+            <a:ext cx="103454" cy="99875"/>
           </a:xfrm>
           <a:prstGeom prst="line">
             <a:avLst/>
@@ -12670,20 +12306,59 @@
       </p:cxnSp>
       <p:cxnSp>
         <p:nvCxnSpPr>
-          <p:cNvPr id="254" name="Straight Connector 253">
+          <p:cNvPr id="265" name="Straight Arrow Connector 264">
             <a:extLst>
               <a:ext uri="{FF2B5EF4-FFF2-40B4-BE49-F238E27FC236}">
-                <a16:creationId xmlns:a16="http://schemas.microsoft.com/office/drawing/2014/main" id="{DD2A6E5C-C174-4F6A-A36A-EE940B99CC22}"/>
+                <a16:creationId xmlns:a16="http://schemas.microsoft.com/office/drawing/2014/main" id="{D8B576AF-AC5D-4AD3-B15E-D1FC7172C009}"/>
               </a:ext>
             </a:extLst>
           </p:cNvPr>
-          <p:cNvCxnSpPr/>
+          <p:cNvCxnSpPr>
+            <a:cxnSpLocks/>
+          </p:cNvCxnSpPr>
+          <p:nvPr/>
+        </p:nvCxnSpPr>
+        <p:spPr bwMode="auto">
+          <a:xfrm>
+            <a:off x="6911770" y="2436450"/>
+            <a:ext cx="5061" cy="346516"/>
+          </a:xfrm>
+          <a:prstGeom prst="straightConnector1">
+            <a:avLst/>
+          </a:prstGeom>
+          <a:solidFill>
+            <a:srgbClr val="0C2D83"/>
+          </a:solidFill>
+          <a:ln w="12700" cap="flat" cmpd="sng" algn="ctr">
+            <a:solidFill>
+              <a:schemeClr val="tx1"/>
+            </a:solidFill>
+            <a:prstDash val="solid"/>
+            <a:round/>
+            <a:headEnd type="none" w="med" len="med"/>
+            <a:tailEnd type="triangle"/>
+          </a:ln>
+          <a:effectLst/>
+        </p:spPr>
+      </p:cxnSp>
+      <p:cxnSp>
+        <p:nvCxnSpPr>
+          <p:cNvPr id="267" name="Straight Connector 266">
+            <a:extLst>
+              <a:ext uri="{FF2B5EF4-FFF2-40B4-BE49-F238E27FC236}">
+                <a16:creationId xmlns:a16="http://schemas.microsoft.com/office/drawing/2014/main" id="{BDDF9C5F-F23F-4C01-89D6-8465ED5F4EC2}"/>
+              </a:ext>
+            </a:extLst>
+          </p:cNvPr>
+          <p:cNvCxnSpPr>
+            <a:cxnSpLocks/>
+          </p:cNvCxnSpPr>
           <p:nvPr/>
         </p:nvCxnSpPr>
         <p:spPr bwMode="auto">
           <a:xfrm flipH="1">
-            <a:off x="7654684" y="1872611"/>
-            <a:ext cx="69770" cy="60671"/>
+            <a:off x="7453605" y="2534447"/>
+            <a:ext cx="103454" cy="99875"/>
           </a:xfrm>
           <a:prstGeom prst="line">
             <a:avLst/>
@@ -12703,61 +12378,24 @@
           <a:effectLst/>
         </p:spPr>
       </p:cxnSp>
-      <p:sp>
-        <p:nvSpPr>
-          <p:cNvPr id="255" name="TextBox 254">
+      <p:cxnSp>
+        <p:nvCxnSpPr>
+          <p:cNvPr id="268" name="Straight Arrow Connector 267">
             <a:extLst>
               <a:ext uri="{FF2B5EF4-FFF2-40B4-BE49-F238E27FC236}">
-                <a16:creationId xmlns:a16="http://schemas.microsoft.com/office/drawing/2014/main" id="{84C8A656-C8C7-40DE-AB7D-AA9118210377}"/>
+                <a16:creationId xmlns:a16="http://schemas.microsoft.com/office/drawing/2014/main" id="{7DB564A6-E323-4A89-A444-FB607BCFC7C2}"/>
               </a:ext>
             </a:extLst>
           </p:cNvPr>
-          <p:cNvSpPr txBox="1"/>
-          <p:nvPr/>
-        </p:nvSpPr>
-        <p:spPr>
-          <a:xfrm>
-            <a:off x="7772979" y="1549278"/>
-            <a:ext cx="904735" cy="276999"/>
-          </a:xfrm>
-          <a:prstGeom prst="rect">
-            <a:avLst/>
-          </a:prstGeom>
-          <a:noFill/>
-        </p:spPr>
-        <p:txBody>
-          <a:bodyPr wrap="none" rtlCol="0">
-            <a:spAutoFit/>
-          </a:bodyPr>
-          <a:lstStyle/>
-          <a:p>
-            <a:r>
-              <a:rPr lang="en-US" sz="1200" dirty="0">
-                <a:latin typeface="Tahoma" panose="020B0604030504040204" pitchFamily="34" charset="0"/>
-                <a:ea typeface="Tahoma" panose="020B0604030504040204" pitchFamily="34" charset="0"/>
-                <a:cs typeface="Tahoma" panose="020B0604030504040204" pitchFamily="34" charset="0"/>
-              </a:rPr>
-              <a:t>Amplify By</a:t>
-            </a:r>
-          </a:p>
-        </p:txBody>
-      </p:sp>
-      <p:cxnSp>
-        <p:nvCxnSpPr>
-          <p:cNvPr id="256" name="Straight Arrow Connector 255">
-            <a:extLst>
-              <a:ext uri="{FF2B5EF4-FFF2-40B4-BE49-F238E27FC236}">
-                <a16:creationId xmlns:a16="http://schemas.microsoft.com/office/drawing/2014/main" id="{46B85E2F-480B-4C7C-873C-8F153C2B1A36}"/>
-              </a:ext>
-            </a:extLst>
-          </p:cNvPr>
-          <p:cNvCxnSpPr/>
+          <p:cNvCxnSpPr>
+            <a:cxnSpLocks/>
+          </p:cNvCxnSpPr>
           <p:nvPr/>
         </p:nvCxnSpPr>
         <p:spPr bwMode="auto">
           <a:xfrm>
-            <a:off x="7447262" y="1734288"/>
-            <a:ext cx="207422" cy="0"/>
+            <a:off x="7511779" y="2533650"/>
+            <a:ext cx="0" cy="259330"/>
           </a:xfrm>
           <a:prstGeom prst="straightConnector1">
             <a:avLst/>
@@ -12767,7 +12405,7 @@
           </a:solidFill>
           <a:ln w="12700" cap="flat" cmpd="sng" algn="ctr">
             <a:solidFill>
-              <a:srgbClr val="00B050"/>
+              <a:schemeClr val="tx1"/>
             </a:solidFill>
             <a:prstDash val="solid"/>
             <a:round/>
@@ -12777,21 +12415,203 @@
           <a:effectLst/>
         </p:spPr>
       </p:cxnSp>
-      <p:cxnSp>
-        <p:nvCxnSpPr>
-          <p:cNvPr id="257" name="Straight Connector 256">
+      <p:sp>
+        <p:nvSpPr>
+          <p:cNvPr id="269" name="TextBox 268">
             <a:extLst>
               <a:ext uri="{FF2B5EF4-FFF2-40B4-BE49-F238E27FC236}">
-                <a16:creationId xmlns:a16="http://schemas.microsoft.com/office/drawing/2014/main" id="{3E9B85C2-6F2E-4E62-ABAE-69285E45E9EE}"/>
+                <a16:creationId xmlns:a16="http://schemas.microsoft.com/office/drawing/2014/main" id="{13C5F92F-39C0-4BD8-8E64-DCDFEC0281AF}"/>
               </a:ext>
             </a:extLst>
           </p:cNvPr>
-          <p:cNvCxnSpPr/>
+          <p:cNvSpPr txBox="1"/>
+          <p:nvPr/>
+        </p:nvSpPr>
+        <p:spPr>
+          <a:xfrm>
+            <a:off x="7554090" y="2510117"/>
+            <a:ext cx="284545" cy="246221"/>
+          </a:xfrm>
+          <a:prstGeom prst="rect">
+            <a:avLst/>
+          </a:prstGeom>
+          <a:solidFill>
+            <a:schemeClr val="bg1"/>
+          </a:solidFill>
+        </p:spPr>
+        <p:txBody>
+          <a:bodyPr wrap="square" rtlCol="0">
+            <a:spAutoFit/>
+          </a:bodyPr>
+          <a:lstStyle/>
+          <a:p>
+            <a:r>
+              <a:rPr lang="en-US" sz="1000" dirty="0">
+                <a:latin typeface="Tahoma" panose="020B0604030504040204" pitchFamily="34" charset="0"/>
+                <a:ea typeface="Tahoma" panose="020B0604030504040204" pitchFamily="34" charset="0"/>
+                <a:cs typeface="Tahoma" panose="020B0604030504040204" pitchFamily="34" charset="0"/>
+              </a:rPr>
+              <a:t>3</a:t>
+            </a:r>
+          </a:p>
+        </p:txBody>
+      </p:sp>
+      <p:sp>
+        <p:nvSpPr>
+          <p:cNvPr id="270" name="TextBox 269">
+            <a:extLst>
+              <a:ext uri="{FF2B5EF4-FFF2-40B4-BE49-F238E27FC236}">
+                <a16:creationId xmlns:a16="http://schemas.microsoft.com/office/drawing/2014/main" id="{9724EDB6-00CE-4546-A289-0767AC4A71D8}"/>
+              </a:ext>
+            </a:extLst>
+          </p:cNvPr>
+          <p:cNvSpPr txBox="1"/>
+          <p:nvPr/>
+        </p:nvSpPr>
+        <p:spPr>
+          <a:xfrm>
+            <a:off x="6692705" y="3538761"/>
+            <a:ext cx="1351260" cy="430887"/>
+          </a:xfrm>
+          <a:prstGeom prst="rect">
+            <a:avLst/>
+          </a:prstGeom>
+          <a:solidFill>
+            <a:schemeClr val="bg1"/>
+          </a:solidFill>
+          <a:ln>
+            <a:solidFill>
+              <a:schemeClr val="tx1"/>
+            </a:solidFill>
+          </a:ln>
+        </p:spPr>
+        <p:txBody>
+          <a:bodyPr wrap="square" rtlCol="0">
+            <a:spAutoFit/>
+          </a:bodyPr>
+          <a:lstStyle/>
+          <a:p>
+            <a:pPr algn="ctr">
+              <a:spcBef>
+                <a:spcPts val="0"/>
+              </a:spcBef>
+            </a:pPr>
+            <a:r>
+              <a:rPr lang="en-US" sz="1100" dirty="0">
+                <a:solidFill>
+                  <a:schemeClr val="accent2"/>
+                </a:solidFill>
+                <a:latin typeface="Tahoma" panose="020B0604030504040204" pitchFamily="34" charset="0"/>
+                <a:ea typeface="Tahoma" panose="020B0604030504040204" pitchFamily="34" charset="0"/>
+                <a:cs typeface="Tahoma" panose="020B0604030504040204" pitchFamily="34" charset="0"/>
+              </a:rPr>
+              <a:t>Remove </a:t>
+            </a:r>
+            <a:r>
+              <a:rPr lang="en-US" sz="1100" dirty="0" err="1">
+                <a:solidFill>
+                  <a:schemeClr val="accent2"/>
+                </a:solidFill>
+                <a:latin typeface="Tahoma" panose="020B0604030504040204" pitchFamily="34" charset="0"/>
+                <a:ea typeface="Tahoma" panose="020B0604030504040204" pitchFamily="34" charset="0"/>
+                <a:cs typeface="Tahoma" panose="020B0604030504040204" pitchFamily="34" charset="0"/>
+              </a:rPr>
+              <a:t>MSb</a:t>
+            </a:r>
+            <a:r>
+              <a:rPr lang="en-US" sz="1100" dirty="0">
+                <a:solidFill>
+                  <a:schemeClr val="accent2"/>
+                </a:solidFill>
+                <a:latin typeface="Tahoma" panose="020B0604030504040204" pitchFamily="34" charset="0"/>
+                <a:ea typeface="Tahoma" panose="020B0604030504040204" pitchFamily="34" charset="0"/>
+                <a:cs typeface="Tahoma" panose="020B0604030504040204" pitchFamily="34" charset="0"/>
+              </a:rPr>
+              <a:t> ‘0’ &amp; append </a:t>
+            </a:r>
+            <a:r>
+              <a:rPr lang="en-US" sz="1100" dirty="0" err="1">
+                <a:solidFill>
+                  <a:schemeClr val="accent2"/>
+                </a:solidFill>
+                <a:latin typeface="Tahoma" panose="020B0604030504040204" pitchFamily="34" charset="0"/>
+                <a:ea typeface="Tahoma" panose="020B0604030504040204" pitchFamily="34" charset="0"/>
+                <a:cs typeface="Tahoma" panose="020B0604030504040204" pitchFamily="34" charset="0"/>
+              </a:rPr>
+              <a:t>LSb</a:t>
+            </a:r>
+            <a:r>
+              <a:rPr lang="en-US" sz="1100" dirty="0">
+                <a:solidFill>
+                  <a:schemeClr val="accent2"/>
+                </a:solidFill>
+                <a:latin typeface="Tahoma" panose="020B0604030504040204" pitchFamily="34" charset="0"/>
+                <a:ea typeface="Tahoma" panose="020B0604030504040204" pitchFamily="34" charset="0"/>
+                <a:cs typeface="Tahoma" panose="020B0604030504040204" pitchFamily="34" charset="0"/>
+              </a:rPr>
+              <a:t> ‘0’s</a:t>
+            </a:r>
+          </a:p>
+        </p:txBody>
+      </p:sp>
+      <p:sp>
+        <p:nvSpPr>
+          <p:cNvPr id="271" name="TextBox 270">
+            <a:extLst>
+              <a:ext uri="{FF2B5EF4-FFF2-40B4-BE49-F238E27FC236}">
+                <a16:creationId xmlns:a16="http://schemas.microsoft.com/office/drawing/2014/main" id="{4319F221-1F47-41AA-AFA2-2227A730FC76}"/>
+              </a:ext>
+            </a:extLst>
+          </p:cNvPr>
+          <p:cNvSpPr txBox="1"/>
+          <p:nvPr/>
+        </p:nvSpPr>
+        <p:spPr>
+          <a:xfrm>
+            <a:off x="6799507" y="3260180"/>
+            <a:ext cx="360133" cy="276999"/>
+          </a:xfrm>
+          <a:prstGeom prst="rect">
+            <a:avLst/>
+          </a:prstGeom>
+          <a:solidFill>
+            <a:schemeClr val="bg1"/>
+          </a:solidFill>
+        </p:spPr>
+        <p:txBody>
+          <a:bodyPr wrap="square" rtlCol="0">
+            <a:spAutoFit/>
+          </a:bodyPr>
+          <a:lstStyle/>
+          <a:p>
+            <a:r>
+              <a:rPr lang="en-US" sz="1200" dirty="0">
+                <a:latin typeface="Tahoma" panose="020B0604030504040204" pitchFamily="34" charset="0"/>
+                <a:ea typeface="Tahoma" panose="020B0604030504040204" pitchFamily="34" charset="0"/>
+                <a:cs typeface="Tahoma" panose="020B0604030504040204" pitchFamily="34" charset="0"/>
+              </a:rPr>
+              <a:t>11</a:t>
+            </a:r>
+          </a:p>
+        </p:txBody>
+      </p:sp>
+      <p:cxnSp>
+        <p:nvCxnSpPr>
+          <p:cNvPr id="272" name="Straight Connector 271">
+            <a:extLst>
+              <a:ext uri="{FF2B5EF4-FFF2-40B4-BE49-F238E27FC236}">
+                <a16:creationId xmlns:a16="http://schemas.microsoft.com/office/drawing/2014/main" id="{CF6B4A98-9FB8-4D0F-8445-1DF71E87735B}"/>
+              </a:ext>
+            </a:extLst>
+          </p:cNvPr>
+          <p:cNvCxnSpPr>
+            <a:cxnSpLocks/>
+          </p:cNvCxnSpPr>
           <p:nvPr/>
         </p:nvCxnSpPr>
         <p:spPr bwMode="auto">
           <a:xfrm flipH="1">
-            <a:off x="8148636" y="1403984"/>
+            <a:off x="7144784" y="3339097"/>
             <a:ext cx="103454" cy="99875"/>
           </a:xfrm>
           <a:prstGeom prst="line">
@@ -12814,10 +12634,10 @@
       </p:cxnSp>
       <p:cxnSp>
         <p:nvCxnSpPr>
-          <p:cNvPr id="258" name="Straight Arrow Connector 257">
+          <p:cNvPr id="273" name="Straight Arrow Connector 272">
             <a:extLst>
               <a:ext uri="{FF2B5EF4-FFF2-40B4-BE49-F238E27FC236}">
-                <a16:creationId xmlns:a16="http://schemas.microsoft.com/office/drawing/2014/main" id="{33E58C1D-C7EA-4DE2-B3CE-028CE66152F7}"/>
+                <a16:creationId xmlns:a16="http://schemas.microsoft.com/office/drawing/2014/main" id="{7CB87F36-B6E4-4D38-B10E-CE262E161CC4}"/>
               </a:ext>
             </a:extLst>
           </p:cNvPr>
@@ -12828,7 +12648,7 @@
         </p:nvCxnSpPr>
         <p:spPr bwMode="auto">
           <a:xfrm>
-            <a:off x="8192103" y="1252514"/>
+            <a:off x="7194306" y="3219942"/>
             <a:ext cx="5061" cy="346516"/>
           </a:xfrm>
           <a:prstGeom prst="straightConnector1">
@@ -12849,12 +12669,47 @@
           <a:effectLst/>
         </p:spPr>
       </p:cxnSp>
-      <p:sp>
-        <p:nvSpPr>
-          <p:cNvPr id="259" name="TextBox 258">
+      <p:cxnSp>
+        <p:nvCxnSpPr>
+          <p:cNvPr id="24" name="Straight Arrow Connector 23">
             <a:extLst>
               <a:ext uri="{FF2B5EF4-FFF2-40B4-BE49-F238E27FC236}">
-                <a16:creationId xmlns:a16="http://schemas.microsoft.com/office/drawing/2014/main" id="{A1FC83DE-205A-41FC-A236-1B0ADE2ED929}"/>
+                <a16:creationId xmlns:a16="http://schemas.microsoft.com/office/drawing/2014/main" id="{90E45FB6-7D91-4C9C-97E2-E4A8FAA6A2D6}"/>
+              </a:ext>
+            </a:extLst>
+          </p:cNvPr>
+          <p:cNvCxnSpPr/>
+          <p:nvPr/>
+        </p:nvCxnSpPr>
+        <p:spPr bwMode="auto">
+          <a:xfrm>
+            <a:off x="7159640" y="4439182"/>
+            <a:ext cx="1740520" cy="0"/>
+          </a:xfrm>
+          <a:prstGeom prst="straightConnector1">
+            <a:avLst/>
+          </a:prstGeom>
+          <a:solidFill>
+            <a:srgbClr val="0C2D83"/>
+          </a:solidFill>
+          <a:ln w="12700" cap="flat" cmpd="sng" algn="ctr">
+            <a:solidFill>
+              <a:schemeClr val="tx1"/>
+            </a:solidFill>
+            <a:prstDash val="solid"/>
+            <a:round/>
+            <a:headEnd type="none" w="med" len="med"/>
+            <a:tailEnd type="triangle"/>
+          </a:ln>
+          <a:effectLst/>
+        </p:spPr>
+      </p:cxnSp>
+      <p:sp>
+        <p:nvSpPr>
+          <p:cNvPr id="274" name="TextBox 273">
+            <a:extLst>
+              <a:ext uri="{FF2B5EF4-FFF2-40B4-BE49-F238E27FC236}">
+                <a16:creationId xmlns:a16="http://schemas.microsoft.com/office/drawing/2014/main" id="{8A9DF16F-EEE6-4A75-A428-1E812E89C467}"/>
               </a:ext>
             </a:extLst>
           </p:cNvPr>
@@ -12863,8 +12718,8 @@
         </p:nvSpPr>
         <p:spPr>
           <a:xfrm>
-            <a:off x="7832278" y="1282031"/>
-            <a:ext cx="284545" cy="276999"/>
+            <a:off x="7181423" y="3987949"/>
+            <a:ext cx="387436" cy="276999"/>
           </a:xfrm>
           <a:prstGeom prst="rect">
             <a:avLst/>
@@ -12885,17 +12740,17 @@
                 <a:ea typeface="Tahoma" panose="020B0604030504040204" pitchFamily="34" charset="0"/>
                 <a:cs typeface="Tahoma" panose="020B0604030504040204" pitchFamily="34" charset="0"/>
               </a:rPr>
-              <a:t>8</a:t>
+              <a:t>16</a:t>
             </a:r>
           </a:p>
         </p:txBody>
       </p:sp>
       <p:cxnSp>
         <p:nvCxnSpPr>
-          <p:cNvPr id="262" name="Straight Connector 261">
+          <p:cNvPr id="275" name="Straight Connector 274">
             <a:extLst>
               <a:ext uri="{FF2B5EF4-FFF2-40B4-BE49-F238E27FC236}">
-                <a16:creationId xmlns:a16="http://schemas.microsoft.com/office/drawing/2014/main" id="{23FBC77B-29BC-42D8-961F-11311443649A}"/>
+                <a16:creationId xmlns:a16="http://schemas.microsoft.com/office/drawing/2014/main" id="{84841EFD-7CA7-495B-885A-6C1B3CE99688}"/>
               </a:ext>
             </a:extLst>
           </p:cNvPr>
@@ -12906,7 +12761,7 @@
         </p:nvCxnSpPr>
         <p:spPr bwMode="auto">
           <a:xfrm flipH="1">
-            <a:off x="8140050" y="2081049"/>
+            <a:off x="7119870" y="4037587"/>
             <a:ext cx="103454" cy="99875"/>
           </a:xfrm>
           <a:prstGeom prst="line">
@@ -12929,10 +12784,10 @@
       </p:cxnSp>
       <p:cxnSp>
         <p:nvCxnSpPr>
-          <p:cNvPr id="263" name="Straight Arrow Connector 262">
+          <p:cNvPr id="276" name="Straight Arrow Connector 275">
             <a:extLst>
               <a:ext uri="{FF2B5EF4-FFF2-40B4-BE49-F238E27FC236}">
-                <a16:creationId xmlns:a16="http://schemas.microsoft.com/office/drawing/2014/main" id="{3E491593-4CC4-4BEE-B6B8-9FB853B2D748}"/>
+                <a16:creationId xmlns:a16="http://schemas.microsoft.com/office/drawing/2014/main" id="{8F9CEC0D-4838-463F-9E9B-F3D646D1FEF3}"/>
               </a:ext>
             </a:extLst>
           </p:cNvPr>
@@ -12943,8 +12798,231 @@
         </p:nvCxnSpPr>
         <p:spPr bwMode="auto">
           <a:xfrm>
-            <a:off x="8189572" y="1961894"/>
-            <a:ext cx="5061" cy="346516"/>
+            <a:off x="7165684" y="3972972"/>
+            <a:ext cx="1768" cy="466210"/>
+          </a:xfrm>
+          <a:prstGeom prst="straightConnector1">
+            <a:avLst/>
+          </a:prstGeom>
+          <a:solidFill>
+            <a:srgbClr val="0C2D83"/>
+          </a:solidFill>
+          <a:ln w="12700" cap="flat" cmpd="sng" algn="ctr">
+            <a:solidFill>
+              <a:schemeClr val="tx1"/>
+            </a:solidFill>
+            <a:prstDash val="solid"/>
+            <a:round/>
+            <a:headEnd type="none" w="med" len="med"/>
+            <a:tailEnd type="none"/>
+          </a:ln>
+          <a:effectLst/>
+        </p:spPr>
+      </p:cxnSp>
+      <p:sp>
+        <p:nvSpPr>
+          <p:cNvPr id="277" name="TextBox 276">
+            <a:extLst>
+              <a:ext uri="{FF2B5EF4-FFF2-40B4-BE49-F238E27FC236}">
+                <a16:creationId xmlns:a16="http://schemas.microsoft.com/office/drawing/2014/main" id="{CC3058E3-4CCC-4C4B-A9DC-A5BA0BFFBE04}"/>
+              </a:ext>
+            </a:extLst>
+          </p:cNvPr>
+          <p:cNvSpPr txBox="1"/>
+          <p:nvPr/>
+        </p:nvSpPr>
+        <p:spPr>
+          <a:xfrm>
+            <a:off x="7459658" y="3959018"/>
+            <a:ext cx="662237" cy="276999"/>
+          </a:xfrm>
+          <a:prstGeom prst="rect">
+            <a:avLst/>
+          </a:prstGeom>
+          <a:noFill/>
+        </p:spPr>
+        <p:txBody>
+          <a:bodyPr wrap="square" rtlCol="0">
+            <a:spAutoFit/>
+          </a:bodyPr>
+          <a:lstStyle/>
+          <a:p>
+            <a:r>
+              <a:rPr lang="en-US" sz="1200" dirty="0">
+                <a:solidFill>
+                  <a:srgbClr val="FF0000"/>
+                </a:solidFill>
+                <a:latin typeface="Tahoma" panose="020B0604030504040204" pitchFamily="34" charset="0"/>
+                <a:ea typeface="Tahoma" panose="020B0604030504040204" pitchFamily="34" charset="0"/>
+                <a:cs typeface="Tahoma" panose="020B0604030504040204" pitchFamily="34" charset="0"/>
+              </a:rPr>
+              <a:t>Q16.0</a:t>
+            </a:r>
+          </a:p>
+        </p:txBody>
+      </p:sp>
+      <p:sp>
+        <p:nvSpPr>
+          <p:cNvPr id="278" name="TextBox 277">
+            <a:extLst>
+              <a:ext uri="{FF2B5EF4-FFF2-40B4-BE49-F238E27FC236}">
+                <a16:creationId xmlns:a16="http://schemas.microsoft.com/office/drawing/2014/main" id="{C51B761A-BE9D-42B1-8BF1-510A803B21A8}"/>
+              </a:ext>
+            </a:extLst>
+          </p:cNvPr>
+          <p:cNvSpPr txBox="1"/>
+          <p:nvPr/>
+        </p:nvSpPr>
+        <p:spPr>
+          <a:xfrm>
+            <a:off x="7023809" y="4468023"/>
+            <a:ext cx="1901482" cy="400110"/>
+          </a:xfrm>
+          <a:prstGeom prst="rect">
+            <a:avLst/>
+          </a:prstGeom>
+          <a:solidFill>
+            <a:schemeClr val="bg1"/>
+          </a:solidFill>
+        </p:spPr>
+        <p:txBody>
+          <a:bodyPr wrap="none" rtlCol="0">
+            <a:spAutoFit/>
+          </a:bodyPr>
+          <a:lstStyle/>
+          <a:p>
+            <a:pPr algn="ctr">
+              <a:spcBef>
+                <a:spcPts val="0"/>
+              </a:spcBef>
+            </a:pPr>
+            <a:r>
+              <a:rPr lang="en-US" sz="1000" dirty="0" err="1">
+                <a:latin typeface="Tahoma" panose="020B0604030504040204" pitchFamily="34" charset="0"/>
+                <a:ea typeface="Tahoma" panose="020B0604030504040204" pitchFamily="34" charset="0"/>
+                <a:cs typeface="Tahoma" panose="020B0604030504040204" pitchFamily="34" charset="0"/>
+              </a:rPr>
+              <a:t>Amplified_Interpolated</a:t>
+            </a:r>
+            <a:r>
+              <a:rPr lang="en-US" sz="1000" dirty="0">
+                <a:latin typeface="Tahoma" panose="020B0604030504040204" pitchFamily="34" charset="0"/>
+                <a:ea typeface="Tahoma" panose="020B0604030504040204" pitchFamily="34" charset="0"/>
+                <a:cs typeface="Tahoma" panose="020B0604030504040204" pitchFamily="34" charset="0"/>
+              </a:rPr>
+              <a:t> Output</a:t>
+            </a:r>
+          </a:p>
+          <a:p>
+            <a:pPr algn="ctr">
+              <a:spcBef>
+                <a:spcPts val="0"/>
+              </a:spcBef>
+            </a:pPr>
+            <a:r>
+              <a:rPr lang="en-US" sz="1000" dirty="0">
+                <a:solidFill>
+                  <a:srgbClr val="FF0000"/>
+                </a:solidFill>
+                <a:latin typeface="Tahoma" panose="020B0604030504040204" pitchFamily="34" charset="0"/>
+                <a:ea typeface="Tahoma" panose="020B0604030504040204" pitchFamily="34" charset="0"/>
+                <a:cs typeface="Tahoma" panose="020B0604030504040204" pitchFamily="34" charset="0"/>
+              </a:rPr>
+              <a:t>signed</a:t>
+            </a:r>
+          </a:p>
+        </p:txBody>
+      </p:sp>
+      <p:sp>
+        <p:nvSpPr>
+          <p:cNvPr id="279" name="TextBox 278">
+            <a:extLst>
+              <a:ext uri="{FF2B5EF4-FFF2-40B4-BE49-F238E27FC236}">
+                <a16:creationId xmlns:a16="http://schemas.microsoft.com/office/drawing/2014/main" id="{C97CEF08-EB4D-42CC-A5E7-08D66724C10A}"/>
+              </a:ext>
+            </a:extLst>
+          </p:cNvPr>
+          <p:cNvSpPr txBox="1"/>
+          <p:nvPr/>
+        </p:nvSpPr>
+        <p:spPr>
+          <a:xfrm>
+            <a:off x="7241552" y="4945273"/>
+            <a:ext cx="1447833" cy="400110"/>
+          </a:xfrm>
+          <a:prstGeom prst="rect">
+            <a:avLst/>
+          </a:prstGeom>
+          <a:solidFill>
+            <a:schemeClr val="bg1"/>
+          </a:solidFill>
+        </p:spPr>
+        <p:txBody>
+          <a:bodyPr wrap="none" rtlCol="0">
+            <a:spAutoFit/>
+          </a:bodyPr>
+          <a:lstStyle/>
+          <a:p>
+            <a:pPr algn="ctr">
+              <a:spcBef>
+                <a:spcPts val="0"/>
+              </a:spcBef>
+            </a:pPr>
+            <a:r>
+              <a:rPr lang="en-US" sz="1000" dirty="0" err="1">
+                <a:latin typeface="Tahoma" panose="020B0604030504040204" pitchFamily="34" charset="0"/>
+                <a:ea typeface="Tahoma" panose="020B0604030504040204" pitchFamily="34" charset="0"/>
+                <a:cs typeface="Tahoma" panose="020B0604030504040204" pitchFamily="34" charset="0"/>
+              </a:rPr>
+              <a:t>Uninterpolated</a:t>
+            </a:r>
+            <a:r>
+              <a:rPr lang="en-US" sz="1000" dirty="0">
+                <a:latin typeface="Tahoma" panose="020B0604030504040204" pitchFamily="34" charset="0"/>
+                <a:ea typeface="Tahoma" panose="020B0604030504040204" pitchFamily="34" charset="0"/>
+                <a:cs typeface="Tahoma" panose="020B0604030504040204" pitchFamily="34" charset="0"/>
+              </a:rPr>
+              <a:t> Output</a:t>
+            </a:r>
+          </a:p>
+          <a:p>
+            <a:pPr algn="ctr">
+              <a:spcBef>
+                <a:spcPts val="0"/>
+              </a:spcBef>
+            </a:pPr>
+            <a:r>
+              <a:rPr lang="en-US" sz="1000" dirty="0">
+                <a:solidFill>
+                  <a:srgbClr val="FF0000"/>
+                </a:solidFill>
+                <a:latin typeface="Tahoma" panose="020B0604030504040204" pitchFamily="34" charset="0"/>
+                <a:ea typeface="Tahoma" panose="020B0604030504040204" pitchFamily="34" charset="0"/>
+                <a:cs typeface="Tahoma" panose="020B0604030504040204" pitchFamily="34" charset="0"/>
+              </a:rPr>
+              <a:t>signed</a:t>
+            </a:r>
+          </a:p>
+        </p:txBody>
+      </p:sp>
+      <p:cxnSp>
+        <p:nvCxnSpPr>
+          <p:cNvPr id="280" name="Straight Arrow Connector 279">
+            <a:extLst>
+              <a:ext uri="{FF2B5EF4-FFF2-40B4-BE49-F238E27FC236}">
+                <a16:creationId xmlns:a16="http://schemas.microsoft.com/office/drawing/2014/main" id="{19FF6B6C-8C23-4740-B7B6-FA9F9F90BE47}"/>
+              </a:ext>
+            </a:extLst>
+          </p:cNvPr>
+          <p:cNvCxnSpPr>
+            <a:cxnSpLocks/>
+          </p:cNvCxnSpPr>
+          <p:nvPr/>
+        </p:nvCxnSpPr>
+        <p:spPr bwMode="auto">
+          <a:xfrm flipV="1">
+            <a:off x="6979573" y="4913444"/>
+            <a:ext cx="1907340" cy="2585"/>
           </a:xfrm>
           <a:prstGeom prst="straightConnector1">
             <a:avLst/>
@@ -12964,12 +13042,57 @@
           <a:effectLst/>
         </p:spPr>
       </p:cxnSp>
+      <p:sp>
+        <p:nvSpPr>
+          <p:cNvPr id="281" name="TextBox 280">
+            <a:extLst>
+              <a:ext uri="{FF2B5EF4-FFF2-40B4-BE49-F238E27FC236}">
+                <a16:creationId xmlns:a16="http://schemas.microsoft.com/office/drawing/2014/main" id="{0AED3B7C-1EAE-424B-AC72-3C2FB1CA4A32}"/>
+              </a:ext>
+            </a:extLst>
+          </p:cNvPr>
+          <p:cNvSpPr txBox="1"/>
+          <p:nvPr/>
+        </p:nvSpPr>
+        <p:spPr>
+          <a:xfrm>
+            <a:off x="6371848" y="4779185"/>
+            <a:ext cx="607725" cy="276999"/>
+          </a:xfrm>
+          <a:prstGeom prst="rect">
+            <a:avLst/>
+          </a:prstGeom>
+          <a:solidFill>
+            <a:schemeClr val="bg1"/>
+          </a:solidFill>
+        </p:spPr>
+        <p:txBody>
+          <a:bodyPr wrap="square" rtlCol="0">
+            <a:spAutoFit/>
+          </a:bodyPr>
+          <a:lstStyle/>
+          <a:p>
+            <a:pPr algn="ctr"/>
+            <a:r>
+              <a:rPr lang="en-US" sz="1200" dirty="0">
+                <a:solidFill>
+                  <a:srgbClr val="FF0000"/>
+                </a:solidFill>
+                <a:latin typeface="Tahoma" panose="020B0604030504040204" pitchFamily="34" charset="0"/>
+                <a:ea typeface="Tahoma" panose="020B0604030504040204" pitchFamily="34" charset="0"/>
+                <a:cs typeface="Tahoma" panose="020B0604030504040204" pitchFamily="34" charset="0"/>
+              </a:rPr>
+              <a:t>Base</a:t>
+            </a:r>
+          </a:p>
+        </p:txBody>
+      </p:sp>
       <p:cxnSp>
         <p:nvCxnSpPr>
-          <p:cNvPr id="264" name="Straight Connector 263">
+          <p:cNvPr id="224" name="Straight Arrow Connector 223">
             <a:extLst>
               <a:ext uri="{FF2B5EF4-FFF2-40B4-BE49-F238E27FC236}">
-                <a16:creationId xmlns:a16="http://schemas.microsoft.com/office/drawing/2014/main" id="{ED1A6045-CEF1-4535-A022-56A97BE2BA5F}"/>
+                <a16:creationId xmlns:a16="http://schemas.microsoft.com/office/drawing/2014/main" id="{3AFE2551-4989-4376-9BAC-453519917A74}"/>
               </a:ext>
             </a:extLst>
           </p:cNvPr>
@@ -12979,45 +13102,8 @@
           <p:nvPr/>
         </p:nvCxnSpPr>
         <p:spPr bwMode="auto">
-          <a:xfrm flipH="1">
-            <a:off x="6867960" y="2511375"/>
-            <a:ext cx="103454" cy="99875"/>
-          </a:xfrm>
-          <a:prstGeom prst="line">
-            <a:avLst/>
-          </a:prstGeom>
-          <a:solidFill>
-            <a:srgbClr val="0C2D83"/>
-          </a:solidFill>
-          <a:ln w="12700" cap="flat" cmpd="sng" algn="ctr">
-            <a:solidFill>
-              <a:schemeClr val="tx1"/>
-            </a:solidFill>
-            <a:prstDash val="solid"/>
-            <a:round/>
-            <a:headEnd type="none" w="med" len="med"/>
-            <a:tailEnd type="none" w="med" len="med"/>
-          </a:ln>
-          <a:effectLst/>
-        </p:spPr>
-      </p:cxnSp>
-      <p:cxnSp>
-        <p:nvCxnSpPr>
-          <p:cNvPr id="265" name="Straight Arrow Connector 264">
-            <a:extLst>
-              <a:ext uri="{FF2B5EF4-FFF2-40B4-BE49-F238E27FC236}">
-                <a16:creationId xmlns:a16="http://schemas.microsoft.com/office/drawing/2014/main" id="{D8B576AF-AC5D-4AD3-B15E-D1FC7172C009}"/>
-              </a:ext>
-            </a:extLst>
-          </p:cNvPr>
-          <p:cNvCxnSpPr>
-            <a:cxnSpLocks/>
-          </p:cNvCxnSpPr>
-          <p:nvPr/>
-        </p:nvCxnSpPr>
-        <p:spPr bwMode="auto">
-          <a:xfrm>
-            <a:off x="6911770" y="2436450"/>
+          <a:xfrm>
+            <a:off x="7969814" y="1766447"/>
             <a:ext cx="5061" cy="346516"/>
           </a:xfrm>
           <a:prstGeom prst="straightConnector1">
@@ -13040,10 +13126,10 @@
       </p:cxnSp>
       <p:cxnSp>
         <p:nvCxnSpPr>
-          <p:cNvPr id="267" name="Straight Connector 266">
+          <p:cNvPr id="260" name="Straight Arrow Connector 259">
             <a:extLst>
               <a:ext uri="{FF2B5EF4-FFF2-40B4-BE49-F238E27FC236}">
-                <a16:creationId xmlns:a16="http://schemas.microsoft.com/office/drawing/2014/main" id="{BDDF9C5F-F23F-4C01-89D6-8465ED5F4EC2}"/>
+                <a16:creationId xmlns:a16="http://schemas.microsoft.com/office/drawing/2014/main" id="{3618C47C-48FA-48F5-ABE6-532814EC5F87}"/>
               </a:ext>
             </a:extLst>
           </p:cNvPr>
@@ -13053,46 +13139,9 @@
           <p:nvPr/>
         </p:nvCxnSpPr>
         <p:spPr bwMode="auto">
-          <a:xfrm flipH="1">
-            <a:off x="7457196" y="2565619"/>
-            <a:ext cx="103454" cy="99875"/>
-          </a:xfrm>
-          <a:prstGeom prst="line">
-            <a:avLst/>
-          </a:prstGeom>
-          <a:solidFill>
-            <a:srgbClr val="0C2D83"/>
-          </a:solidFill>
-          <a:ln w="12700" cap="flat" cmpd="sng" algn="ctr">
-            <a:solidFill>
-              <a:schemeClr val="tx1"/>
-            </a:solidFill>
-            <a:prstDash val="solid"/>
-            <a:round/>
-            <a:headEnd type="none" w="med" len="med"/>
-            <a:tailEnd type="none" w="med" len="med"/>
-          </a:ln>
-          <a:effectLst/>
-        </p:spPr>
-      </p:cxnSp>
-      <p:cxnSp>
-        <p:nvCxnSpPr>
-          <p:cNvPr id="268" name="Straight Arrow Connector 267">
-            <a:extLst>
-              <a:ext uri="{FF2B5EF4-FFF2-40B4-BE49-F238E27FC236}">
-                <a16:creationId xmlns:a16="http://schemas.microsoft.com/office/drawing/2014/main" id="{7DB564A6-E323-4A89-A444-FB607BCFC7C2}"/>
-              </a:ext>
-            </a:extLst>
-          </p:cNvPr>
-          <p:cNvCxnSpPr>
-            <a:cxnSpLocks/>
-          </p:cNvCxnSpPr>
-          <p:nvPr/>
-        </p:nvCxnSpPr>
-        <p:spPr bwMode="auto">
-          <a:xfrm>
-            <a:off x="7511779" y="2533650"/>
-            <a:ext cx="0" cy="259330"/>
+          <a:xfrm>
+            <a:off x="8183657" y="1775175"/>
+            <a:ext cx="5061" cy="346516"/>
           </a:xfrm>
           <a:prstGeom prst="straightConnector1">
             <a:avLst/>
@@ -13114,10 +13163,10 @@
       </p:cxnSp>
       <p:sp>
         <p:nvSpPr>
-          <p:cNvPr id="269" name="TextBox 268">
+          <p:cNvPr id="285" name="TextBox 284">
             <a:extLst>
               <a:ext uri="{FF2B5EF4-FFF2-40B4-BE49-F238E27FC236}">
-                <a16:creationId xmlns:a16="http://schemas.microsoft.com/office/drawing/2014/main" id="{13C5F92F-39C0-4BD8-8E64-DCDFEC0281AF}"/>
+                <a16:creationId xmlns:a16="http://schemas.microsoft.com/office/drawing/2014/main" id="{AF583F96-AAB6-45A0-8DE1-1DDC0F063598}"/>
               </a:ext>
             </a:extLst>
           </p:cNvPr>
@@ -13126,48 +13175,7 @@
         </p:nvSpPr>
         <p:spPr>
           <a:xfrm>
-            <a:off x="7564158" y="2518081"/>
-            <a:ext cx="284545" cy="246221"/>
-          </a:xfrm>
-          <a:prstGeom prst="rect">
-            <a:avLst/>
-          </a:prstGeom>
-          <a:solidFill>
-            <a:schemeClr val="bg1"/>
-          </a:solidFill>
-        </p:spPr>
-        <p:txBody>
-          <a:bodyPr wrap="square" rtlCol="0">
-            <a:spAutoFit/>
-          </a:bodyPr>
-          <a:lstStyle/>
-          <a:p>
-            <a:r>
-              <a:rPr lang="en-US" sz="1000" dirty="0">
-                <a:latin typeface="Tahoma" panose="020B0604030504040204" pitchFamily="34" charset="0"/>
-                <a:ea typeface="Tahoma" panose="020B0604030504040204" pitchFamily="34" charset="0"/>
-                <a:cs typeface="Tahoma" panose="020B0604030504040204" pitchFamily="34" charset="0"/>
-              </a:rPr>
-              <a:t>9</a:t>
-            </a:r>
-          </a:p>
-        </p:txBody>
-      </p:sp>
-      <p:sp>
-        <p:nvSpPr>
-          <p:cNvPr id="261" name="TextBox 260">
-            <a:extLst>
-              <a:ext uri="{FF2B5EF4-FFF2-40B4-BE49-F238E27FC236}">
-                <a16:creationId xmlns:a16="http://schemas.microsoft.com/office/drawing/2014/main" id="{7131B2AF-67D3-45AC-9E41-618D3B308D55}"/>
-              </a:ext>
-            </a:extLst>
-          </p:cNvPr>
-          <p:cNvSpPr txBox="1"/>
-          <p:nvPr/>
-        </p:nvSpPr>
-        <p:spPr>
-          <a:xfrm>
-            <a:off x="7385178" y="2292951"/>
+            <a:off x="7185576" y="1331528"/>
             <a:ext cx="1055097" cy="246221"/>
           </a:xfrm>
           <a:prstGeom prst="rect">
@@ -13177,9 +13185,7 @@
             <a:schemeClr val="bg1"/>
           </a:solidFill>
           <a:ln>
-            <a:solidFill>
-              <a:schemeClr val="tx1"/>
-            </a:solidFill>
+            <a:noFill/>
           </a:ln>
         </p:spPr>
         <p:txBody>
@@ -13202,124 +13208,25 @@
       </p:sp>
       <p:sp>
         <p:nvSpPr>
-          <p:cNvPr id="270" name="TextBox 269">
+          <p:cNvPr id="253" name="Rectangle 252">
             <a:extLst>
               <a:ext uri="{FF2B5EF4-FFF2-40B4-BE49-F238E27FC236}">
-                <a16:creationId xmlns:a16="http://schemas.microsoft.com/office/drawing/2014/main" id="{9724EDB6-00CE-4546-A289-0767AC4A71D8}"/>
+                <a16:creationId xmlns:a16="http://schemas.microsoft.com/office/drawing/2014/main" id="{BA37CA5D-5BB0-45A7-B73A-48922ACED99F}"/>
               </a:ext>
             </a:extLst>
           </p:cNvPr>
-          <p:cNvSpPr txBox="1"/>
-          <p:nvPr/>
-        </p:nvSpPr>
-        <p:spPr>
-          <a:xfrm>
-            <a:off x="6692705" y="3538761"/>
-            <a:ext cx="1031749" cy="430887"/>
+          <p:cNvSpPr/>
+          <p:nvPr/>
+        </p:nvSpPr>
+        <p:spPr bwMode="auto">
+          <a:xfrm>
+            <a:off x="1787011" y="1427314"/>
+            <a:ext cx="1060560" cy="367384"/>
           </a:xfrm>
           <a:prstGeom prst="rect">
             <a:avLst/>
           </a:prstGeom>
-          <a:solidFill>
-            <a:schemeClr val="bg1"/>
-          </a:solidFill>
-          <a:ln>
-            <a:solidFill>
-              <a:schemeClr val="tx1"/>
-            </a:solidFill>
-          </a:ln>
-        </p:spPr>
-        <p:txBody>
-          <a:bodyPr wrap="square" rtlCol="0">
-            <a:spAutoFit/>
-          </a:bodyPr>
-          <a:lstStyle/>
-          <a:p>
-            <a:pPr algn="ctr">
-              <a:spcBef>
-                <a:spcPts val="0"/>
-              </a:spcBef>
-            </a:pPr>
-            <a:r>
-              <a:rPr lang="en-US" sz="1100" dirty="0">
-                <a:solidFill>
-                  <a:schemeClr val="accent2"/>
-                </a:solidFill>
-                <a:latin typeface="Tahoma" panose="020B0604030504040204" pitchFamily="34" charset="0"/>
-                <a:ea typeface="Tahoma" panose="020B0604030504040204" pitchFamily="34" charset="0"/>
-                <a:cs typeface="Tahoma" panose="020B0604030504040204" pitchFamily="34" charset="0"/>
-              </a:rPr>
-              <a:t>remove ‘0’ &amp; truncate</a:t>
-            </a:r>
-          </a:p>
-        </p:txBody>
-      </p:sp>
-      <p:sp>
-        <p:nvSpPr>
-          <p:cNvPr id="271" name="TextBox 270">
-            <a:extLst>
-              <a:ext uri="{FF2B5EF4-FFF2-40B4-BE49-F238E27FC236}">
-                <a16:creationId xmlns:a16="http://schemas.microsoft.com/office/drawing/2014/main" id="{4319F221-1F47-41AA-AFA2-2227A730FC76}"/>
-              </a:ext>
-            </a:extLst>
-          </p:cNvPr>
-          <p:cNvSpPr txBox="1"/>
-          <p:nvPr/>
-        </p:nvSpPr>
-        <p:spPr>
-          <a:xfrm>
-            <a:off x="6799507" y="3260180"/>
-            <a:ext cx="360133" cy="276999"/>
-          </a:xfrm>
-          <a:prstGeom prst="rect">
-            <a:avLst/>
-          </a:prstGeom>
-          <a:solidFill>
-            <a:schemeClr val="bg1"/>
-          </a:solidFill>
-        </p:spPr>
-        <p:txBody>
-          <a:bodyPr wrap="square" rtlCol="0">
-            <a:spAutoFit/>
-          </a:bodyPr>
-          <a:lstStyle/>
-          <a:p>
-            <a:r>
-              <a:rPr lang="en-US" sz="1200" dirty="0">
-                <a:latin typeface="Tahoma" panose="020B0604030504040204" pitchFamily="34" charset="0"/>
-                <a:ea typeface="Tahoma" panose="020B0604030504040204" pitchFamily="34" charset="0"/>
-                <a:cs typeface="Tahoma" panose="020B0604030504040204" pitchFamily="34" charset="0"/>
-              </a:rPr>
-              <a:t>17</a:t>
-            </a:r>
-          </a:p>
-        </p:txBody>
-      </p:sp>
-      <p:cxnSp>
-        <p:nvCxnSpPr>
-          <p:cNvPr id="272" name="Straight Connector 271">
-            <a:extLst>
-              <a:ext uri="{FF2B5EF4-FFF2-40B4-BE49-F238E27FC236}">
-                <a16:creationId xmlns:a16="http://schemas.microsoft.com/office/drawing/2014/main" id="{CF6B4A98-9FB8-4D0F-8445-1DF71E87735B}"/>
-              </a:ext>
-            </a:extLst>
-          </p:cNvPr>
-          <p:cNvCxnSpPr>
-            <a:cxnSpLocks/>
-          </p:cNvCxnSpPr>
-          <p:nvPr/>
-        </p:nvCxnSpPr>
-        <p:spPr bwMode="auto">
-          <a:xfrm flipH="1">
-            <a:off x="7144784" y="3339097"/>
-            <a:ext cx="103454" cy="99875"/>
-          </a:xfrm>
-          <a:prstGeom prst="line">
-            <a:avLst/>
-          </a:prstGeom>
-          <a:solidFill>
-            <a:srgbClr val="0C2D83"/>
-          </a:solidFill>
+          <a:noFill/>
           <a:ln w="12700" cap="flat" cmpd="sng" algn="ctr">
             <a:solidFill>
               <a:schemeClr val="tx1"/>
@@ -13331,496 +13238,8 @@
           </a:ln>
           <a:effectLst/>
         </p:spPr>
-      </p:cxnSp>
-      <p:cxnSp>
-        <p:nvCxnSpPr>
-          <p:cNvPr id="273" name="Straight Arrow Connector 272">
-            <a:extLst>
-              <a:ext uri="{FF2B5EF4-FFF2-40B4-BE49-F238E27FC236}">
-                <a16:creationId xmlns:a16="http://schemas.microsoft.com/office/drawing/2014/main" id="{7CB87F36-B6E4-4D38-B10E-CE262E161CC4}"/>
-              </a:ext>
-            </a:extLst>
-          </p:cNvPr>
-          <p:cNvCxnSpPr>
-            <a:cxnSpLocks/>
-          </p:cNvCxnSpPr>
-          <p:nvPr/>
-        </p:nvCxnSpPr>
-        <p:spPr bwMode="auto">
-          <a:xfrm>
-            <a:off x="7194306" y="3219942"/>
-            <a:ext cx="5061" cy="346516"/>
-          </a:xfrm>
-          <a:prstGeom prst="straightConnector1">
-            <a:avLst/>
-          </a:prstGeom>
-          <a:solidFill>
-            <a:srgbClr val="0C2D83"/>
-          </a:solidFill>
-          <a:ln w="12700" cap="flat" cmpd="sng" algn="ctr">
-            <a:solidFill>
-              <a:schemeClr val="tx1"/>
-            </a:solidFill>
-            <a:prstDash val="solid"/>
-            <a:round/>
-            <a:headEnd type="none" w="med" len="med"/>
-            <a:tailEnd type="triangle"/>
-          </a:ln>
-          <a:effectLst/>
-        </p:spPr>
-      </p:cxnSp>
-      <p:cxnSp>
-        <p:nvCxnSpPr>
-          <p:cNvPr id="24" name="Straight Arrow Connector 23">
-            <a:extLst>
-              <a:ext uri="{FF2B5EF4-FFF2-40B4-BE49-F238E27FC236}">
-                <a16:creationId xmlns:a16="http://schemas.microsoft.com/office/drawing/2014/main" id="{90E45FB6-7D91-4C9C-97E2-E4A8FAA6A2D6}"/>
-              </a:ext>
-            </a:extLst>
-          </p:cNvPr>
-          <p:cNvCxnSpPr/>
-          <p:nvPr/>
-        </p:nvCxnSpPr>
-        <p:spPr bwMode="auto">
-          <a:xfrm>
-            <a:off x="7159640" y="4439182"/>
-            <a:ext cx="1740520" cy="0"/>
-          </a:xfrm>
-          <a:prstGeom prst="straightConnector1">
-            <a:avLst/>
-          </a:prstGeom>
-          <a:solidFill>
-            <a:srgbClr val="0C2D83"/>
-          </a:solidFill>
-          <a:ln w="12700" cap="flat" cmpd="sng" algn="ctr">
-            <a:solidFill>
-              <a:schemeClr val="tx1"/>
-            </a:solidFill>
-            <a:prstDash val="solid"/>
-            <a:round/>
-            <a:headEnd type="none" w="med" len="med"/>
-            <a:tailEnd type="triangle"/>
-          </a:ln>
-          <a:effectLst/>
-        </p:spPr>
-      </p:cxnSp>
-      <p:sp>
-        <p:nvSpPr>
-          <p:cNvPr id="274" name="TextBox 273">
-            <a:extLst>
-              <a:ext uri="{FF2B5EF4-FFF2-40B4-BE49-F238E27FC236}">
-                <a16:creationId xmlns:a16="http://schemas.microsoft.com/office/drawing/2014/main" id="{8A9DF16F-EEE6-4A75-A428-1E812E89C467}"/>
-              </a:ext>
-            </a:extLst>
-          </p:cNvPr>
-          <p:cNvSpPr txBox="1"/>
-          <p:nvPr/>
-        </p:nvSpPr>
-        <p:spPr>
-          <a:xfrm>
-            <a:off x="7181423" y="3987949"/>
-            <a:ext cx="387436" cy="276999"/>
-          </a:xfrm>
-          <a:prstGeom prst="rect">
-            <a:avLst/>
-          </a:prstGeom>
-          <a:solidFill>
-            <a:schemeClr val="bg1"/>
-          </a:solidFill>
-        </p:spPr>
-        <p:txBody>
-          <a:bodyPr wrap="square" rtlCol="0">
-            <a:spAutoFit/>
-          </a:bodyPr>
-          <a:lstStyle/>
-          <a:p>
-            <a:r>
-              <a:rPr lang="en-US" sz="1200" dirty="0">
-                <a:latin typeface="Tahoma" panose="020B0604030504040204" pitchFamily="34" charset="0"/>
-                <a:ea typeface="Tahoma" panose="020B0604030504040204" pitchFamily="34" charset="0"/>
-                <a:cs typeface="Tahoma" panose="020B0604030504040204" pitchFamily="34" charset="0"/>
-              </a:rPr>
-              <a:t>16</a:t>
-            </a:r>
-          </a:p>
-        </p:txBody>
-      </p:sp>
-      <p:cxnSp>
-        <p:nvCxnSpPr>
-          <p:cNvPr id="275" name="Straight Connector 274">
-            <a:extLst>
-              <a:ext uri="{FF2B5EF4-FFF2-40B4-BE49-F238E27FC236}">
-                <a16:creationId xmlns:a16="http://schemas.microsoft.com/office/drawing/2014/main" id="{84841EFD-7CA7-495B-885A-6C1B3CE99688}"/>
-              </a:ext>
-            </a:extLst>
-          </p:cNvPr>
-          <p:cNvCxnSpPr>
-            <a:cxnSpLocks/>
-          </p:cNvCxnSpPr>
-          <p:nvPr/>
-        </p:nvCxnSpPr>
-        <p:spPr bwMode="auto">
-          <a:xfrm flipH="1">
-            <a:off x="7119870" y="4037587"/>
-            <a:ext cx="103454" cy="99875"/>
-          </a:xfrm>
-          <a:prstGeom prst="line">
-            <a:avLst/>
-          </a:prstGeom>
-          <a:solidFill>
-            <a:srgbClr val="0C2D83"/>
-          </a:solidFill>
-          <a:ln w="12700" cap="flat" cmpd="sng" algn="ctr">
-            <a:solidFill>
-              <a:schemeClr val="tx1"/>
-            </a:solidFill>
-            <a:prstDash val="solid"/>
-            <a:round/>
-            <a:headEnd type="none" w="med" len="med"/>
-            <a:tailEnd type="none" w="med" len="med"/>
-          </a:ln>
-          <a:effectLst/>
-        </p:spPr>
-      </p:cxnSp>
-      <p:cxnSp>
-        <p:nvCxnSpPr>
-          <p:cNvPr id="276" name="Straight Arrow Connector 275">
-            <a:extLst>
-              <a:ext uri="{FF2B5EF4-FFF2-40B4-BE49-F238E27FC236}">
-                <a16:creationId xmlns:a16="http://schemas.microsoft.com/office/drawing/2014/main" id="{8F9CEC0D-4838-463F-9E9B-F3D646D1FEF3}"/>
-              </a:ext>
-            </a:extLst>
-          </p:cNvPr>
-          <p:cNvCxnSpPr>
-            <a:cxnSpLocks/>
-          </p:cNvCxnSpPr>
-          <p:nvPr/>
-        </p:nvCxnSpPr>
-        <p:spPr bwMode="auto">
-          <a:xfrm>
-            <a:off x="7165684" y="3972972"/>
-            <a:ext cx="1768" cy="466210"/>
-          </a:xfrm>
-          <a:prstGeom prst="straightConnector1">
-            <a:avLst/>
-          </a:prstGeom>
-          <a:solidFill>
-            <a:srgbClr val="0C2D83"/>
-          </a:solidFill>
-          <a:ln w="12700" cap="flat" cmpd="sng" algn="ctr">
-            <a:solidFill>
-              <a:schemeClr val="tx1"/>
-            </a:solidFill>
-            <a:prstDash val="solid"/>
-            <a:round/>
-            <a:headEnd type="none" w="med" len="med"/>
-            <a:tailEnd type="none"/>
-          </a:ln>
-          <a:effectLst/>
-        </p:spPr>
-      </p:cxnSp>
-      <p:sp>
-        <p:nvSpPr>
-          <p:cNvPr id="277" name="TextBox 276">
-            <a:extLst>
-              <a:ext uri="{FF2B5EF4-FFF2-40B4-BE49-F238E27FC236}">
-                <a16:creationId xmlns:a16="http://schemas.microsoft.com/office/drawing/2014/main" id="{CC3058E3-4CCC-4C4B-A9DC-A5BA0BFFBE04}"/>
-              </a:ext>
-            </a:extLst>
-          </p:cNvPr>
-          <p:cNvSpPr txBox="1"/>
-          <p:nvPr/>
-        </p:nvSpPr>
-        <p:spPr>
-          <a:xfrm>
-            <a:off x="7459658" y="3959018"/>
-            <a:ext cx="662237" cy="276999"/>
-          </a:xfrm>
-          <a:prstGeom prst="rect">
-            <a:avLst/>
-          </a:prstGeom>
-          <a:noFill/>
-        </p:spPr>
-        <p:txBody>
-          <a:bodyPr wrap="square" rtlCol="0">
-            <a:spAutoFit/>
-          </a:bodyPr>
-          <a:lstStyle/>
-          <a:p>
-            <a:r>
-              <a:rPr lang="en-US" sz="1200" dirty="0">
-                <a:solidFill>
-                  <a:srgbClr val="FF0000"/>
-                </a:solidFill>
-                <a:latin typeface="Tahoma" panose="020B0604030504040204" pitchFamily="34" charset="0"/>
-                <a:ea typeface="Tahoma" panose="020B0604030504040204" pitchFamily="34" charset="0"/>
-                <a:cs typeface="Tahoma" panose="020B0604030504040204" pitchFamily="34" charset="0"/>
-              </a:rPr>
-              <a:t>Q16.0</a:t>
-            </a:r>
-          </a:p>
-        </p:txBody>
-      </p:sp>
-      <p:sp>
-        <p:nvSpPr>
-          <p:cNvPr id="278" name="TextBox 277">
-            <a:extLst>
-              <a:ext uri="{FF2B5EF4-FFF2-40B4-BE49-F238E27FC236}">
-                <a16:creationId xmlns:a16="http://schemas.microsoft.com/office/drawing/2014/main" id="{C51B761A-BE9D-42B1-8BF1-510A803B21A8}"/>
-              </a:ext>
-            </a:extLst>
-          </p:cNvPr>
-          <p:cNvSpPr txBox="1"/>
-          <p:nvPr/>
-        </p:nvSpPr>
-        <p:spPr>
-          <a:xfrm>
-            <a:off x="7023809" y="4468023"/>
-            <a:ext cx="1901482" cy="400110"/>
-          </a:xfrm>
-          <a:prstGeom prst="rect">
-            <a:avLst/>
-          </a:prstGeom>
-          <a:solidFill>
-            <a:schemeClr val="bg1"/>
-          </a:solidFill>
-        </p:spPr>
-        <p:txBody>
-          <a:bodyPr wrap="none" rtlCol="0">
-            <a:spAutoFit/>
-          </a:bodyPr>
-          <a:lstStyle/>
-          <a:p>
-            <a:pPr algn="ctr">
-              <a:spcBef>
-                <a:spcPts val="0"/>
-              </a:spcBef>
-            </a:pPr>
-            <a:r>
-              <a:rPr lang="en-US" sz="1000" dirty="0" err="1">
-                <a:latin typeface="Tahoma" panose="020B0604030504040204" pitchFamily="34" charset="0"/>
-                <a:ea typeface="Tahoma" panose="020B0604030504040204" pitchFamily="34" charset="0"/>
-                <a:cs typeface="Tahoma" panose="020B0604030504040204" pitchFamily="34" charset="0"/>
-              </a:rPr>
-              <a:t>Amplified_Interpolated</a:t>
-            </a:r>
-            <a:r>
-              <a:rPr lang="en-US" sz="1000" dirty="0">
-                <a:latin typeface="Tahoma" panose="020B0604030504040204" pitchFamily="34" charset="0"/>
-                <a:ea typeface="Tahoma" panose="020B0604030504040204" pitchFamily="34" charset="0"/>
-                <a:cs typeface="Tahoma" panose="020B0604030504040204" pitchFamily="34" charset="0"/>
-              </a:rPr>
-              <a:t> Output</a:t>
-            </a:r>
-          </a:p>
-          <a:p>
-            <a:pPr algn="ctr">
-              <a:spcBef>
-                <a:spcPts val="0"/>
-              </a:spcBef>
-            </a:pPr>
-            <a:r>
-              <a:rPr lang="en-US" sz="1000" dirty="0">
-                <a:solidFill>
-                  <a:srgbClr val="FF0000"/>
-                </a:solidFill>
-                <a:latin typeface="Tahoma" panose="020B0604030504040204" pitchFamily="34" charset="0"/>
-                <a:ea typeface="Tahoma" panose="020B0604030504040204" pitchFamily="34" charset="0"/>
-                <a:cs typeface="Tahoma" panose="020B0604030504040204" pitchFamily="34" charset="0"/>
-              </a:rPr>
-              <a:t>signed</a:t>
-            </a:r>
-          </a:p>
-        </p:txBody>
-      </p:sp>
-      <p:sp>
-        <p:nvSpPr>
-          <p:cNvPr id="279" name="TextBox 278">
-            <a:extLst>
-              <a:ext uri="{FF2B5EF4-FFF2-40B4-BE49-F238E27FC236}">
-                <a16:creationId xmlns:a16="http://schemas.microsoft.com/office/drawing/2014/main" id="{C97CEF08-EB4D-42CC-A5E7-08D66724C10A}"/>
-              </a:ext>
-            </a:extLst>
-          </p:cNvPr>
-          <p:cNvSpPr txBox="1"/>
-          <p:nvPr/>
-        </p:nvSpPr>
-        <p:spPr>
-          <a:xfrm>
-            <a:off x="7241552" y="4945273"/>
-            <a:ext cx="1447833" cy="400110"/>
-          </a:xfrm>
-          <a:prstGeom prst="rect">
-            <a:avLst/>
-          </a:prstGeom>
-          <a:solidFill>
-            <a:schemeClr val="bg1"/>
-          </a:solidFill>
-        </p:spPr>
-        <p:txBody>
-          <a:bodyPr wrap="none" rtlCol="0">
-            <a:spAutoFit/>
-          </a:bodyPr>
-          <a:lstStyle/>
-          <a:p>
-            <a:pPr algn="ctr">
-              <a:spcBef>
-                <a:spcPts val="0"/>
-              </a:spcBef>
-            </a:pPr>
-            <a:r>
-              <a:rPr lang="en-US" sz="1000" dirty="0" err="1">
-                <a:latin typeface="Tahoma" panose="020B0604030504040204" pitchFamily="34" charset="0"/>
-                <a:ea typeface="Tahoma" panose="020B0604030504040204" pitchFamily="34" charset="0"/>
-                <a:cs typeface="Tahoma" panose="020B0604030504040204" pitchFamily="34" charset="0"/>
-              </a:rPr>
-              <a:t>Uninterpolated</a:t>
-            </a:r>
-            <a:r>
-              <a:rPr lang="en-US" sz="1000" dirty="0">
-                <a:latin typeface="Tahoma" panose="020B0604030504040204" pitchFamily="34" charset="0"/>
-                <a:ea typeface="Tahoma" panose="020B0604030504040204" pitchFamily="34" charset="0"/>
-                <a:cs typeface="Tahoma" panose="020B0604030504040204" pitchFamily="34" charset="0"/>
-              </a:rPr>
-              <a:t> Output</a:t>
-            </a:r>
-          </a:p>
-          <a:p>
-            <a:pPr algn="ctr">
-              <a:spcBef>
-                <a:spcPts val="0"/>
-              </a:spcBef>
-            </a:pPr>
-            <a:r>
-              <a:rPr lang="en-US" sz="1000" dirty="0">
-                <a:solidFill>
-                  <a:srgbClr val="FF0000"/>
-                </a:solidFill>
-                <a:latin typeface="Tahoma" panose="020B0604030504040204" pitchFamily="34" charset="0"/>
-                <a:ea typeface="Tahoma" panose="020B0604030504040204" pitchFamily="34" charset="0"/>
-                <a:cs typeface="Tahoma" panose="020B0604030504040204" pitchFamily="34" charset="0"/>
-              </a:rPr>
-              <a:t>signed</a:t>
-            </a:r>
-          </a:p>
-        </p:txBody>
-      </p:sp>
-      <p:cxnSp>
-        <p:nvCxnSpPr>
-          <p:cNvPr id="280" name="Straight Arrow Connector 279">
-            <a:extLst>
-              <a:ext uri="{FF2B5EF4-FFF2-40B4-BE49-F238E27FC236}">
-                <a16:creationId xmlns:a16="http://schemas.microsoft.com/office/drawing/2014/main" id="{19FF6B6C-8C23-4740-B7B6-FA9F9F90BE47}"/>
-              </a:ext>
-            </a:extLst>
-          </p:cNvPr>
-          <p:cNvCxnSpPr>
-            <a:cxnSpLocks/>
-          </p:cNvCxnSpPr>
-          <p:nvPr/>
-        </p:nvCxnSpPr>
-        <p:spPr bwMode="auto">
-          <a:xfrm flipV="1">
-            <a:off x="6979573" y="4913444"/>
-            <a:ext cx="1907340" cy="2585"/>
-          </a:xfrm>
-          <a:prstGeom prst="straightConnector1">
-            <a:avLst/>
-          </a:prstGeom>
-          <a:solidFill>
-            <a:srgbClr val="0C2D83"/>
-          </a:solidFill>
-          <a:ln w="12700" cap="flat" cmpd="sng" algn="ctr">
-            <a:solidFill>
-              <a:schemeClr val="tx1"/>
-            </a:solidFill>
-            <a:prstDash val="solid"/>
-            <a:round/>
-            <a:headEnd type="none" w="med" len="med"/>
-            <a:tailEnd type="triangle"/>
-          </a:ln>
-          <a:effectLst/>
-        </p:spPr>
-      </p:cxnSp>
-      <p:sp>
-        <p:nvSpPr>
-          <p:cNvPr id="281" name="TextBox 280">
-            <a:extLst>
-              <a:ext uri="{FF2B5EF4-FFF2-40B4-BE49-F238E27FC236}">
-                <a16:creationId xmlns:a16="http://schemas.microsoft.com/office/drawing/2014/main" id="{0AED3B7C-1EAE-424B-AC72-3C2FB1CA4A32}"/>
-              </a:ext>
-            </a:extLst>
-          </p:cNvPr>
-          <p:cNvSpPr txBox="1"/>
-          <p:nvPr/>
-        </p:nvSpPr>
-        <p:spPr>
-          <a:xfrm>
-            <a:off x="6371848" y="4779185"/>
-            <a:ext cx="607725" cy="276999"/>
-          </a:xfrm>
-          <a:prstGeom prst="rect">
-            <a:avLst/>
-          </a:prstGeom>
-          <a:solidFill>
-            <a:schemeClr val="bg1"/>
-          </a:solidFill>
-        </p:spPr>
-        <p:txBody>
-          <a:bodyPr wrap="square" rtlCol="0">
-            <a:spAutoFit/>
-          </a:bodyPr>
-          <a:lstStyle/>
-          <a:p>
-            <a:pPr algn="ctr"/>
-            <a:r>
-              <a:rPr lang="en-US" sz="1200" dirty="0">
-                <a:solidFill>
-                  <a:srgbClr val="FF0000"/>
-                </a:solidFill>
-                <a:latin typeface="Tahoma" panose="020B0604030504040204" pitchFamily="34" charset="0"/>
-                <a:ea typeface="Tahoma" panose="020B0604030504040204" pitchFamily="34" charset="0"/>
-                <a:cs typeface="Tahoma" panose="020B0604030504040204" pitchFamily="34" charset="0"/>
-              </a:rPr>
-              <a:t>Base</a:t>
-            </a:r>
-          </a:p>
-        </p:txBody>
-      </p:sp>
-      <p:sp>
-        <p:nvSpPr>
-          <p:cNvPr id="282" name="Rectangle 281">
-            <a:extLst>
-              <a:ext uri="{FF2B5EF4-FFF2-40B4-BE49-F238E27FC236}">
-                <a16:creationId xmlns:a16="http://schemas.microsoft.com/office/drawing/2014/main" id="{CE927B96-20D9-4993-A13E-86860A14200E}"/>
-              </a:ext>
-            </a:extLst>
-          </p:cNvPr>
-          <p:cNvSpPr/>
-          <p:nvPr/>
-        </p:nvSpPr>
-        <p:spPr bwMode="auto">
-          <a:xfrm>
-            <a:off x="2072807" y="909150"/>
-            <a:ext cx="534868" cy="188775"/>
-          </a:xfrm>
-          <a:prstGeom prst="rect">
-            <a:avLst/>
-          </a:prstGeom>
-          <a:solidFill>
-            <a:schemeClr val="bg1"/>
-          </a:solidFill>
-          <a:ln w="12700" cap="flat" cmpd="sng" algn="ctr">
-            <a:noFill/>
-            <a:prstDash val="solid"/>
-            <a:round/>
-            <a:headEnd type="none" w="med" len="med"/>
-            <a:tailEnd type="none" w="med" len="med"/>
-          </a:ln>
-          <a:effectLst/>
-        </p:spPr>
-        <p:txBody>
-          <a:bodyPr vert="horz" wrap="square" lIns="91440" tIns="45720" rIns="91440" bIns="45720" numCol="1" rtlCol="0" anchor="ctr" anchorCtr="0" compatLnSpc="1">
+        <p:txBody>
+          <a:bodyPr vert="horz" wrap="square" lIns="91440" tIns="45720" rIns="91440" bIns="45720" numCol="1" rtlCol="0" anchor="t" anchorCtr="0" compatLnSpc="1">
             <a:prstTxWarp prst="textNoShape">
               <a:avLst/>
             </a:prstTxWarp>
@@ -13843,19 +13262,829 @@
               <a:buNone/>
               <a:tabLst/>
             </a:pPr>
-            <a:r>
-              <a:rPr kumimoji="0" lang="en-US" sz="1800" b="1" i="0" u="none" strike="noStrike" cap="none" normalizeH="0" baseline="0" dirty="0">
-                <a:ln>
-                  <a:noFill/>
-                </a:ln>
+            <a:endParaRPr kumimoji="0" lang="en-US" sz="1400" b="0" i="0" u="none" strike="noStrike" cap="none" normalizeH="0" baseline="0">
+              <a:ln>
+                <a:noFill/>
+              </a:ln>
+              <a:solidFill>
+                <a:schemeClr val="tx1"/>
+              </a:solidFill>
+              <a:effectLst/>
+              <a:latin typeface="Arial" pitchFamily="34" charset="0"/>
+            </a:endParaRPr>
+          </a:p>
+        </p:txBody>
+      </p:sp>
+      <p:sp>
+        <p:nvSpPr>
+          <p:cNvPr id="254" name="TextBox 253">
+            <a:extLst>
+              <a:ext uri="{FF2B5EF4-FFF2-40B4-BE49-F238E27FC236}">
+                <a16:creationId xmlns:a16="http://schemas.microsoft.com/office/drawing/2014/main" id="{2E8ACE76-67C1-46EA-8C72-2BE629245148}"/>
+              </a:ext>
+            </a:extLst>
+          </p:cNvPr>
+          <p:cNvSpPr txBox="1"/>
+          <p:nvPr/>
+        </p:nvSpPr>
+        <p:spPr>
+          <a:xfrm>
+            <a:off x="1734732" y="1548509"/>
+            <a:ext cx="1179362" cy="276999"/>
+          </a:xfrm>
+          <a:prstGeom prst="rect">
+            <a:avLst/>
+          </a:prstGeom>
+          <a:noFill/>
+        </p:spPr>
+        <p:txBody>
+          <a:bodyPr wrap="none" rtlCol="0">
+            <a:spAutoFit/>
+          </a:bodyPr>
+          <a:lstStyle/>
+          <a:p>
+            <a:r>
+              <a:rPr lang="en-US" sz="1200" dirty="0">
+                <a:latin typeface="Tahoma" panose="020B0604030504040204" pitchFamily="34" charset="0"/>
+                <a:ea typeface="Tahoma" panose="020B0604030504040204" pitchFamily="34" charset="0"/>
+                <a:cs typeface="Tahoma" panose="020B0604030504040204" pitchFamily="34" charset="0"/>
+              </a:rPr>
+              <a:t>Phase Inc Mux</a:t>
+            </a:r>
+          </a:p>
+        </p:txBody>
+      </p:sp>
+      <p:cxnSp>
+        <p:nvCxnSpPr>
+          <p:cNvPr id="256" name="Straight Arrow Connector 255">
+            <a:extLst>
+              <a:ext uri="{FF2B5EF4-FFF2-40B4-BE49-F238E27FC236}">
+                <a16:creationId xmlns:a16="http://schemas.microsoft.com/office/drawing/2014/main" id="{FEA91094-1BC9-47B5-88F2-565D8B36C6CB}"/>
+              </a:ext>
+            </a:extLst>
+          </p:cNvPr>
+          <p:cNvCxnSpPr/>
+          <p:nvPr/>
+        </p:nvCxnSpPr>
+        <p:spPr bwMode="auto">
+          <a:xfrm>
+            <a:off x="1578693" y="1609502"/>
+            <a:ext cx="207422" cy="0"/>
+          </a:xfrm>
+          <a:prstGeom prst="straightConnector1">
+            <a:avLst/>
+          </a:prstGeom>
+          <a:solidFill>
+            <a:srgbClr val="0C2D83"/>
+          </a:solidFill>
+          <a:ln w="12700" cap="flat" cmpd="sng" algn="ctr">
+            <a:solidFill>
+              <a:srgbClr val="00B050"/>
+            </a:solidFill>
+            <a:prstDash val="solid"/>
+            <a:round/>
+            <a:headEnd type="none" w="med" len="med"/>
+            <a:tailEnd type="triangle"/>
+          </a:ln>
+          <a:effectLst/>
+        </p:spPr>
+      </p:cxnSp>
+      <p:sp>
+        <p:nvSpPr>
+          <p:cNvPr id="257" name="TextBox 256">
+            <a:extLst>
+              <a:ext uri="{FF2B5EF4-FFF2-40B4-BE49-F238E27FC236}">
+                <a16:creationId xmlns:a16="http://schemas.microsoft.com/office/drawing/2014/main" id="{D8A510E2-D222-4F1A-B004-A17990B68356}"/>
+              </a:ext>
+            </a:extLst>
+          </p:cNvPr>
+          <p:cNvSpPr txBox="1"/>
+          <p:nvPr/>
+        </p:nvSpPr>
+        <p:spPr>
+          <a:xfrm>
+            <a:off x="2029684" y="1368804"/>
+            <a:ext cx="371657" cy="276999"/>
+          </a:xfrm>
+          <a:prstGeom prst="rect">
+            <a:avLst/>
+          </a:prstGeom>
+          <a:noFill/>
+        </p:spPr>
+        <p:txBody>
+          <a:bodyPr wrap="square" rtlCol="0">
+            <a:spAutoFit/>
+          </a:bodyPr>
+          <a:lstStyle/>
+          <a:p>
+            <a:r>
+              <a:rPr lang="en-US" sz="1200" dirty="0">
                 <a:solidFill>
-                  <a:schemeClr val="tx1"/>
+                  <a:schemeClr val="accent2"/>
                 </a:solidFill>
-                <a:effectLst/>
-                <a:latin typeface="Arial" pitchFamily="34" charset="0"/>
+                <a:latin typeface="Tahoma" panose="020B0604030504040204" pitchFamily="34" charset="0"/>
+                <a:ea typeface="Tahoma" panose="020B0604030504040204" pitchFamily="34" charset="0"/>
+                <a:cs typeface="Tahoma" panose="020B0604030504040204" pitchFamily="34" charset="0"/>
               </a:rPr>
-              <a:t>+  -</a:t>
-            </a:r>
+              <a:t>1</a:t>
+            </a:r>
+          </a:p>
+        </p:txBody>
+      </p:sp>
+      <p:sp>
+        <p:nvSpPr>
+          <p:cNvPr id="261" name="TextBox 260">
+            <a:extLst>
+              <a:ext uri="{FF2B5EF4-FFF2-40B4-BE49-F238E27FC236}">
+                <a16:creationId xmlns:a16="http://schemas.microsoft.com/office/drawing/2014/main" id="{90735792-584D-4446-9A7E-7E60A09D50AF}"/>
+              </a:ext>
+            </a:extLst>
+          </p:cNvPr>
+          <p:cNvSpPr txBox="1"/>
+          <p:nvPr/>
+        </p:nvSpPr>
+        <p:spPr>
+          <a:xfrm>
+            <a:off x="1787008" y="1371971"/>
+            <a:ext cx="371657" cy="276999"/>
+          </a:xfrm>
+          <a:prstGeom prst="rect">
+            <a:avLst/>
+          </a:prstGeom>
+          <a:noFill/>
+        </p:spPr>
+        <p:txBody>
+          <a:bodyPr wrap="square" rtlCol="0">
+            <a:spAutoFit/>
+          </a:bodyPr>
+          <a:lstStyle/>
+          <a:p>
+            <a:r>
+              <a:rPr lang="en-US" sz="1200" dirty="0">
+                <a:latin typeface="Tahoma" panose="020B0604030504040204" pitchFamily="34" charset="0"/>
+                <a:ea typeface="Tahoma" panose="020B0604030504040204" pitchFamily="34" charset="0"/>
+                <a:cs typeface="Tahoma" panose="020B0604030504040204" pitchFamily="34" charset="0"/>
+              </a:rPr>
+              <a:t>0</a:t>
+            </a:r>
+          </a:p>
+        </p:txBody>
+      </p:sp>
+      <p:sp>
+        <p:nvSpPr>
+          <p:cNvPr id="263" name="TextBox 262">
+            <a:extLst>
+              <a:ext uri="{FF2B5EF4-FFF2-40B4-BE49-F238E27FC236}">
+                <a16:creationId xmlns:a16="http://schemas.microsoft.com/office/drawing/2014/main" id="{D45DB5DC-452E-4021-B771-6A659A039D05}"/>
+              </a:ext>
+            </a:extLst>
+          </p:cNvPr>
+          <p:cNvSpPr txBox="1"/>
+          <p:nvPr/>
+        </p:nvSpPr>
+        <p:spPr>
+          <a:xfrm>
+            <a:off x="2302050" y="1373925"/>
+            <a:ext cx="371657" cy="276999"/>
+          </a:xfrm>
+          <a:prstGeom prst="rect">
+            <a:avLst/>
+          </a:prstGeom>
+          <a:noFill/>
+        </p:spPr>
+        <p:txBody>
+          <a:bodyPr wrap="square" rtlCol="0">
+            <a:spAutoFit/>
+          </a:bodyPr>
+          <a:lstStyle/>
+          <a:p>
+            <a:r>
+              <a:rPr lang="en-US" sz="1200" dirty="0">
+                <a:solidFill>
+                  <a:srgbClr val="FF0000"/>
+                </a:solidFill>
+                <a:latin typeface="Tahoma" panose="020B0604030504040204" pitchFamily="34" charset="0"/>
+                <a:ea typeface="Tahoma" panose="020B0604030504040204" pitchFamily="34" charset="0"/>
+                <a:cs typeface="Tahoma" panose="020B0604030504040204" pitchFamily="34" charset="0"/>
+              </a:rPr>
+              <a:t>2</a:t>
+            </a:r>
+          </a:p>
+        </p:txBody>
+      </p:sp>
+      <p:sp>
+        <p:nvSpPr>
+          <p:cNvPr id="266" name="TextBox 265">
+            <a:extLst>
+              <a:ext uri="{FF2B5EF4-FFF2-40B4-BE49-F238E27FC236}">
+                <a16:creationId xmlns:a16="http://schemas.microsoft.com/office/drawing/2014/main" id="{A17F67CC-46A2-4AF1-88FA-7772202A30AC}"/>
+              </a:ext>
+            </a:extLst>
+          </p:cNvPr>
+          <p:cNvSpPr txBox="1"/>
+          <p:nvPr/>
+        </p:nvSpPr>
+        <p:spPr>
+          <a:xfrm>
+            <a:off x="2547174" y="1376920"/>
+            <a:ext cx="371657" cy="276999"/>
+          </a:xfrm>
+          <a:prstGeom prst="rect">
+            <a:avLst/>
+          </a:prstGeom>
+          <a:noFill/>
+        </p:spPr>
+        <p:txBody>
+          <a:bodyPr wrap="square" rtlCol="0">
+            <a:spAutoFit/>
+          </a:bodyPr>
+          <a:lstStyle/>
+          <a:p>
+            <a:r>
+              <a:rPr lang="en-US" sz="1200" dirty="0">
+                <a:solidFill>
+                  <a:srgbClr val="00B050"/>
+                </a:solidFill>
+                <a:latin typeface="Tahoma" panose="020B0604030504040204" pitchFamily="34" charset="0"/>
+                <a:ea typeface="Tahoma" panose="020B0604030504040204" pitchFamily="34" charset="0"/>
+                <a:cs typeface="Tahoma" panose="020B0604030504040204" pitchFamily="34" charset="0"/>
+              </a:rPr>
+              <a:t>3</a:t>
+            </a:r>
+          </a:p>
+        </p:txBody>
+      </p:sp>
+      <p:sp>
+        <p:nvSpPr>
+          <p:cNvPr id="283" name="TextBox 282">
+            <a:extLst>
+              <a:ext uri="{FF2B5EF4-FFF2-40B4-BE49-F238E27FC236}">
+                <a16:creationId xmlns:a16="http://schemas.microsoft.com/office/drawing/2014/main" id="{385C67D7-3906-4520-B219-4D0D63CCFF04}"/>
+              </a:ext>
+            </a:extLst>
+          </p:cNvPr>
+          <p:cNvSpPr txBox="1"/>
+          <p:nvPr/>
+        </p:nvSpPr>
+        <p:spPr>
+          <a:xfrm>
+            <a:off x="697874" y="1452899"/>
+            <a:ext cx="965905" cy="276999"/>
+          </a:xfrm>
+          <a:prstGeom prst="rect">
+            <a:avLst/>
+          </a:prstGeom>
+          <a:noFill/>
+        </p:spPr>
+        <p:txBody>
+          <a:bodyPr wrap="none" rtlCol="0">
+            <a:spAutoFit/>
+          </a:bodyPr>
+          <a:lstStyle/>
+          <a:p>
+            <a:r>
+              <a:rPr lang="en-US" sz="1200" dirty="0">
+                <a:solidFill>
+                  <a:srgbClr val="00B050"/>
+                </a:solidFill>
+                <a:latin typeface="Tahoma" panose="020B0604030504040204" pitchFamily="34" charset="0"/>
+                <a:ea typeface="Tahoma" panose="020B0604030504040204" pitchFamily="34" charset="0"/>
+                <a:cs typeface="Tahoma" panose="020B0604030504040204" pitchFamily="34" charset="0"/>
+              </a:rPr>
+              <a:t>Switch(5:4)</a:t>
+            </a:r>
+          </a:p>
+        </p:txBody>
+      </p:sp>
+      <p:cxnSp>
+        <p:nvCxnSpPr>
+          <p:cNvPr id="284" name="Straight Arrow Connector 283">
+            <a:extLst>
+              <a:ext uri="{FF2B5EF4-FFF2-40B4-BE49-F238E27FC236}">
+                <a16:creationId xmlns:a16="http://schemas.microsoft.com/office/drawing/2014/main" id="{9727E768-BB6B-46E9-A72F-79B421837548}"/>
+              </a:ext>
+            </a:extLst>
+          </p:cNvPr>
+          <p:cNvCxnSpPr/>
+          <p:nvPr/>
+        </p:nvCxnSpPr>
+        <p:spPr bwMode="auto">
+          <a:xfrm>
+            <a:off x="1908686" y="1127255"/>
+            <a:ext cx="3338" cy="296533"/>
+          </a:xfrm>
+          <a:prstGeom prst="straightConnector1">
+            <a:avLst/>
+          </a:prstGeom>
+          <a:solidFill>
+            <a:srgbClr val="0C2D83"/>
+          </a:solidFill>
+          <a:ln w="12700" cap="flat" cmpd="sng" algn="ctr">
+            <a:solidFill>
+              <a:schemeClr val="tx1"/>
+            </a:solidFill>
+            <a:prstDash val="solid"/>
+            <a:round/>
+            <a:headEnd type="none" w="med" len="med"/>
+            <a:tailEnd type="triangle"/>
+          </a:ln>
+          <a:effectLst/>
+        </p:spPr>
+      </p:cxnSp>
+      <p:cxnSp>
+        <p:nvCxnSpPr>
+          <p:cNvPr id="286" name="Straight Connector 285">
+            <a:extLst>
+              <a:ext uri="{FF2B5EF4-FFF2-40B4-BE49-F238E27FC236}">
+                <a16:creationId xmlns:a16="http://schemas.microsoft.com/office/drawing/2014/main" id="{E2745383-D4D6-423A-B995-2C486D4DB29B}"/>
+              </a:ext>
+            </a:extLst>
+          </p:cNvPr>
+          <p:cNvCxnSpPr/>
+          <p:nvPr/>
+        </p:nvCxnSpPr>
+        <p:spPr bwMode="auto">
+          <a:xfrm flipH="1">
+            <a:off x="1858628" y="1226101"/>
+            <a:ext cx="103454" cy="99875"/>
+          </a:xfrm>
+          <a:prstGeom prst="line">
+            <a:avLst/>
+          </a:prstGeom>
+          <a:solidFill>
+            <a:srgbClr val="0C2D83"/>
+          </a:solidFill>
+          <a:ln w="12700" cap="flat" cmpd="sng" algn="ctr">
+            <a:solidFill>
+              <a:schemeClr val="tx1"/>
+            </a:solidFill>
+            <a:prstDash val="solid"/>
+            <a:round/>
+            <a:headEnd type="none" w="med" len="med"/>
+            <a:tailEnd type="none" w="med" len="med"/>
+          </a:ln>
+          <a:effectLst/>
+        </p:spPr>
+      </p:cxnSp>
+      <p:sp>
+        <p:nvSpPr>
+          <p:cNvPr id="287" name="TextBox 286">
+            <a:extLst>
+              <a:ext uri="{FF2B5EF4-FFF2-40B4-BE49-F238E27FC236}">
+                <a16:creationId xmlns:a16="http://schemas.microsoft.com/office/drawing/2014/main" id="{A03404CD-77F1-4ADE-9CC4-0CB5234679A6}"/>
+              </a:ext>
+            </a:extLst>
+          </p:cNvPr>
+          <p:cNvSpPr txBox="1"/>
+          <p:nvPr/>
+        </p:nvSpPr>
+        <p:spPr>
+          <a:xfrm>
+            <a:off x="1685879" y="1100451"/>
+            <a:ext cx="268022" cy="276999"/>
+          </a:xfrm>
+          <a:prstGeom prst="rect">
+            <a:avLst/>
+          </a:prstGeom>
+          <a:noFill/>
+        </p:spPr>
+        <p:txBody>
+          <a:bodyPr wrap="none" rtlCol="0">
+            <a:spAutoFit/>
+          </a:bodyPr>
+          <a:lstStyle/>
+          <a:p>
+            <a:r>
+              <a:rPr lang="en-US" sz="1200" dirty="0">
+                <a:latin typeface="Tahoma" panose="020B0604030504040204" pitchFamily="34" charset="0"/>
+                <a:ea typeface="Tahoma" panose="020B0604030504040204" pitchFamily="34" charset="0"/>
+                <a:cs typeface="Tahoma" panose="020B0604030504040204" pitchFamily="34" charset="0"/>
+              </a:rPr>
+              <a:t>8</a:t>
+            </a:r>
+          </a:p>
+        </p:txBody>
+      </p:sp>
+      <p:cxnSp>
+        <p:nvCxnSpPr>
+          <p:cNvPr id="288" name="Straight Arrow Connector 287">
+            <a:extLst>
+              <a:ext uri="{FF2B5EF4-FFF2-40B4-BE49-F238E27FC236}">
+                <a16:creationId xmlns:a16="http://schemas.microsoft.com/office/drawing/2014/main" id="{A42CEA16-4523-48A5-9444-CD075B822CD7}"/>
+              </a:ext>
+            </a:extLst>
+          </p:cNvPr>
+          <p:cNvCxnSpPr/>
+          <p:nvPr/>
+        </p:nvCxnSpPr>
+        <p:spPr bwMode="auto">
+          <a:xfrm>
+            <a:off x="2159540" y="1130760"/>
+            <a:ext cx="3338" cy="296533"/>
+          </a:xfrm>
+          <a:prstGeom prst="straightConnector1">
+            <a:avLst/>
+          </a:prstGeom>
+          <a:solidFill>
+            <a:srgbClr val="0C2D83"/>
+          </a:solidFill>
+          <a:ln w="12700" cap="flat" cmpd="sng" algn="ctr">
+            <a:solidFill>
+              <a:schemeClr val="accent2"/>
+            </a:solidFill>
+            <a:prstDash val="solid"/>
+            <a:round/>
+            <a:headEnd type="none" w="med" len="med"/>
+            <a:tailEnd type="triangle"/>
+          </a:ln>
+          <a:effectLst/>
+        </p:spPr>
+      </p:cxnSp>
+      <p:cxnSp>
+        <p:nvCxnSpPr>
+          <p:cNvPr id="289" name="Straight Connector 288">
+            <a:extLst>
+              <a:ext uri="{FF2B5EF4-FFF2-40B4-BE49-F238E27FC236}">
+                <a16:creationId xmlns:a16="http://schemas.microsoft.com/office/drawing/2014/main" id="{C438644F-1154-4961-B263-D2B8E2E6AFAD}"/>
+              </a:ext>
+            </a:extLst>
+          </p:cNvPr>
+          <p:cNvCxnSpPr/>
+          <p:nvPr/>
+        </p:nvCxnSpPr>
+        <p:spPr bwMode="auto">
+          <a:xfrm flipH="1">
+            <a:off x="2109482" y="1229606"/>
+            <a:ext cx="103454" cy="99875"/>
+          </a:xfrm>
+          <a:prstGeom prst="line">
+            <a:avLst/>
+          </a:prstGeom>
+          <a:solidFill>
+            <a:srgbClr val="0C2D83"/>
+          </a:solidFill>
+          <a:ln w="12700" cap="flat" cmpd="sng" algn="ctr">
+            <a:solidFill>
+              <a:schemeClr val="tx1"/>
+            </a:solidFill>
+            <a:prstDash val="solid"/>
+            <a:round/>
+            <a:headEnd type="none" w="med" len="med"/>
+            <a:tailEnd type="none" w="med" len="med"/>
+          </a:ln>
+          <a:effectLst/>
+        </p:spPr>
+      </p:cxnSp>
+      <p:sp>
+        <p:nvSpPr>
+          <p:cNvPr id="290" name="TextBox 289">
+            <a:extLst>
+              <a:ext uri="{FF2B5EF4-FFF2-40B4-BE49-F238E27FC236}">
+                <a16:creationId xmlns:a16="http://schemas.microsoft.com/office/drawing/2014/main" id="{25592F8F-823B-4175-8291-EEF29F1858A6}"/>
+              </a:ext>
+            </a:extLst>
+          </p:cNvPr>
+          <p:cNvSpPr txBox="1"/>
+          <p:nvPr/>
+        </p:nvSpPr>
+        <p:spPr>
+          <a:xfrm>
+            <a:off x="1936733" y="1103956"/>
+            <a:ext cx="268022" cy="276999"/>
+          </a:xfrm>
+          <a:prstGeom prst="rect">
+            <a:avLst/>
+          </a:prstGeom>
+          <a:noFill/>
+        </p:spPr>
+        <p:txBody>
+          <a:bodyPr wrap="none" rtlCol="0">
+            <a:spAutoFit/>
+          </a:bodyPr>
+          <a:lstStyle/>
+          <a:p>
+            <a:r>
+              <a:rPr lang="en-US" sz="1200" dirty="0">
+                <a:latin typeface="Tahoma" panose="020B0604030504040204" pitchFamily="34" charset="0"/>
+                <a:ea typeface="Tahoma" panose="020B0604030504040204" pitchFamily="34" charset="0"/>
+                <a:cs typeface="Tahoma" panose="020B0604030504040204" pitchFamily="34" charset="0"/>
+              </a:rPr>
+              <a:t>8</a:t>
+            </a:r>
+          </a:p>
+        </p:txBody>
+      </p:sp>
+      <p:cxnSp>
+        <p:nvCxnSpPr>
+          <p:cNvPr id="291" name="Straight Arrow Connector 290">
+            <a:extLst>
+              <a:ext uri="{FF2B5EF4-FFF2-40B4-BE49-F238E27FC236}">
+                <a16:creationId xmlns:a16="http://schemas.microsoft.com/office/drawing/2014/main" id="{C4823636-5891-4FBF-94E5-EE61AB9DE8D2}"/>
+              </a:ext>
+            </a:extLst>
+          </p:cNvPr>
+          <p:cNvCxnSpPr/>
+          <p:nvPr/>
+        </p:nvCxnSpPr>
+        <p:spPr bwMode="auto">
+          <a:xfrm>
+            <a:off x="2423134" y="1131406"/>
+            <a:ext cx="3338" cy="296533"/>
+          </a:xfrm>
+          <a:prstGeom prst="straightConnector1">
+            <a:avLst/>
+          </a:prstGeom>
+          <a:solidFill>
+            <a:srgbClr val="0C2D83"/>
+          </a:solidFill>
+          <a:ln w="12700" cap="flat" cmpd="sng" algn="ctr">
+            <a:solidFill>
+              <a:srgbClr val="FF0000"/>
+            </a:solidFill>
+            <a:prstDash val="solid"/>
+            <a:round/>
+            <a:headEnd type="none" w="med" len="med"/>
+            <a:tailEnd type="triangle"/>
+          </a:ln>
+          <a:effectLst/>
+        </p:spPr>
+      </p:cxnSp>
+      <p:cxnSp>
+        <p:nvCxnSpPr>
+          <p:cNvPr id="292" name="Straight Connector 291">
+            <a:extLst>
+              <a:ext uri="{FF2B5EF4-FFF2-40B4-BE49-F238E27FC236}">
+                <a16:creationId xmlns:a16="http://schemas.microsoft.com/office/drawing/2014/main" id="{A8438DE4-4953-4BAB-BFC7-3B0F9D9950E2}"/>
+              </a:ext>
+            </a:extLst>
+          </p:cNvPr>
+          <p:cNvCxnSpPr/>
+          <p:nvPr/>
+        </p:nvCxnSpPr>
+        <p:spPr bwMode="auto">
+          <a:xfrm flipH="1">
+            <a:off x="2373076" y="1230252"/>
+            <a:ext cx="103454" cy="99875"/>
+          </a:xfrm>
+          <a:prstGeom prst="line">
+            <a:avLst/>
+          </a:prstGeom>
+          <a:solidFill>
+            <a:srgbClr val="0C2D83"/>
+          </a:solidFill>
+          <a:ln w="12700" cap="flat" cmpd="sng" algn="ctr">
+            <a:solidFill>
+              <a:schemeClr val="tx1"/>
+            </a:solidFill>
+            <a:prstDash val="solid"/>
+            <a:round/>
+            <a:headEnd type="none" w="med" len="med"/>
+            <a:tailEnd type="none" w="med" len="med"/>
+          </a:ln>
+          <a:effectLst/>
+        </p:spPr>
+      </p:cxnSp>
+      <p:sp>
+        <p:nvSpPr>
+          <p:cNvPr id="293" name="TextBox 292">
+            <a:extLst>
+              <a:ext uri="{FF2B5EF4-FFF2-40B4-BE49-F238E27FC236}">
+                <a16:creationId xmlns:a16="http://schemas.microsoft.com/office/drawing/2014/main" id="{0B5A184D-4213-464E-82AC-DCF8D46B640C}"/>
+              </a:ext>
+            </a:extLst>
+          </p:cNvPr>
+          <p:cNvSpPr txBox="1"/>
+          <p:nvPr/>
+        </p:nvSpPr>
+        <p:spPr>
+          <a:xfrm>
+            <a:off x="2200327" y="1104602"/>
+            <a:ext cx="268022" cy="276999"/>
+          </a:xfrm>
+          <a:prstGeom prst="rect">
+            <a:avLst/>
+          </a:prstGeom>
+          <a:noFill/>
+        </p:spPr>
+        <p:txBody>
+          <a:bodyPr wrap="none" rtlCol="0">
+            <a:spAutoFit/>
+          </a:bodyPr>
+          <a:lstStyle/>
+          <a:p>
+            <a:r>
+              <a:rPr lang="en-US" sz="1200" dirty="0">
+                <a:latin typeface="Tahoma" panose="020B0604030504040204" pitchFamily="34" charset="0"/>
+                <a:ea typeface="Tahoma" panose="020B0604030504040204" pitchFamily="34" charset="0"/>
+                <a:cs typeface="Tahoma" panose="020B0604030504040204" pitchFamily="34" charset="0"/>
+              </a:rPr>
+              <a:t>8</a:t>
+            </a:r>
+          </a:p>
+        </p:txBody>
+      </p:sp>
+      <p:cxnSp>
+        <p:nvCxnSpPr>
+          <p:cNvPr id="294" name="Straight Arrow Connector 293">
+            <a:extLst>
+              <a:ext uri="{FF2B5EF4-FFF2-40B4-BE49-F238E27FC236}">
+                <a16:creationId xmlns:a16="http://schemas.microsoft.com/office/drawing/2014/main" id="{EE14388B-5B76-4ADD-83F2-64159AAEB86A}"/>
+              </a:ext>
+            </a:extLst>
+          </p:cNvPr>
+          <p:cNvCxnSpPr/>
+          <p:nvPr/>
+        </p:nvCxnSpPr>
+        <p:spPr bwMode="auto">
+          <a:xfrm>
+            <a:off x="2673455" y="1135633"/>
+            <a:ext cx="3338" cy="296533"/>
+          </a:xfrm>
+          <a:prstGeom prst="straightConnector1">
+            <a:avLst/>
+          </a:prstGeom>
+          <a:solidFill>
+            <a:srgbClr val="0C2D83"/>
+          </a:solidFill>
+          <a:ln w="12700" cap="flat" cmpd="sng" algn="ctr">
+            <a:solidFill>
+              <a:srgbClr val="00B050"/>
+            </a:solidFill>
+            <a:prstDash val="solid"/>
+            <a:round/>
+            <a:headEnd type="none" w="med" len="med"/>
+            <a:tailEnd type="triangle"/>
+          </a:ln>
+          <a:effectLst/>
+        </p:spPr>
+      </p:cxnSp>
+      <p:cxnSp>
+        <p:nvCxnSpPr>
+          <p:cNvPr id="295" name="Straight Connector 294">
+            <a:extLst>
+              <a:ext uri="{FF2B5EF4-FFF2-40B4-BE49-F238E27FC236}">
+                <a16:creationId xmlns:a16="http://schemas.microsoft.com/office/drawing/2014/main" id="{E281626F-D13B-4002-A430-93C191BCBEE0}"/>
+              </a:ext>
+            </a:extLst>
+          </p:cNvPr>
+          <p:cNvCxnSpPr/>
+          <p:nvPr/>
+        </p:nvCxnSpPr>
+        <p:spPr bwMode="auto">
+          <a:xfrm flipH="1">
+            <a:off x="2623397" y="1234479"/>
+            <a:ext cx="103454" cy="99875"/>
+          </a:xfrm>
+          <a:prstGeom prst="line">
+            <a:avLst/>
+          </a:prstGeom>
+          <a:solidFill>
+            <a:srgbClr val="0C2D83"/>
+          </a:solidFill>
+          <a:ln w="12700" cap="flat" cmpd="sng" algn="ctr">
+            <a:solidFill>
+              <a:schemeClr val="tx1"/>
+            </a:solidFill>
+            <a:prstDash val="solid"/>
+            <a:round/>
+            <a:headEnd type="none" w="med" len="med"/>
+            <a:tailEnd type="none" w="med" len="med"/>
+          </a:ln>
+          <a:effectLst/>
+        </p:spPr>
+      </p:cxnSp>
+      <p:sp>
+        <p:nvSpPr>
+          <p:cNvPr id="296" name="TextBox 295">
+            <a:extLst>
+              <a:ext uri="{FF2B5EF4-FFF2-40B4-BE49-F238E27FC236}">
+                <a16:creationId xmlns:a16="http://schemas.microsoft.com/office/drawing/2014/main" id="{6D2E1F6C-05C6-4B33-A13A-AA6ED63EE605}"/>
+              </a:ext>
+            </a:extLst>
+          </p:cNvPr>
+          <p:cNvSpPr txBox="1"/>
+          <p:nvPr/>
+        </p:nvSpPr>
+        <p:spPr>
+          <a:xfrm>
+            <a:off x="2450648" y="1108829"/>
+            <a:ext cx="268022" cy="276999"/>
+          </a:xfrm>
+          <a:prstGeom prst="rect">
+            <a:avLst/>
+          </a:prstGeom>
+          <a:noFill/>
+        </p:spPr>
+        <p:txBody>
+          <a:bodyPr wrap="none" rtlCol="0">
+            <a:spAutoFit/>
+          </a:bodyPr>
+          <a:lstStyle/>
+          <a:p>
+            <a:r>
+              <a:rPr lang="en-US" sz="1200" dirty="0">
+                <a:latin typeface="Tahoma" panose="020B0604030504040204" pitchFamily="34" charset="0"/>
+                <a:ea typeface="Tahoma" panose="020B0604030504040204" pitchFamily="34" charset="0"/>
+                <a:cs typeface="Tahoma" panose="020B0604030504040204" pitchFamily="34" charset="0"/>
+              </a:rPr>
+              <a:t>8</a:t>
+            </a:r>
+          </a:p>
+        </p:txBody>
+      </p:sp>
+      <p:sp>
+        <p:nvSpPr>
+          <p:cNvPr id="297" name="TextBox 296">
+            <a:extLst>
+              <a:ext uri="{FF2B5EF4-FFF2-40B4-BE49-F238E27FC236}">
+                <a16:creationId xmlns:a16="http://schemas.microsoft.com/office/drawing/2014/main" id="{B4F9CFE5-7E61-4744-97AC-30637DB310C8}"/>
+              </a:ext>
+            </a:extLst>
+          </p:cNvPr>
+          <p:cNvSpPr txBox="1"/>
+          <p:nvPr/>
+        </p:nvSpPr>
+        <p:spPr>
+          <a:xfrm>
+            <a:off x="1767185" y="688963"/>
+            <a:ext cx="655949" cy="276999"/>
+          </a:xfrm>
+          <a:prstGeom prst="rect">
+            <a:avLst/>
+          </a:prstGeom>
+          <a:solidFill>
+            <a:schemeClr val="bg1"/>
+          </a:solidFill>
+        </p:spPr>
+        <p:txBody>
+          <a:bodyPr wrap="none" rtlCol="0">
+            <a:spAutoFit/>
+          </a:bodyPr>
+          <a:lstStyle/>
+          <a:p>
+            <a:r>
+              <a:rPr lang="en-US" sz="1200" dirty="0">
+                <a:solidFill>
+                  <a:schemeClr val="accent2"/>
+                </a:solidFill>
+                <a:latin typeface="Tahoma" panose="020B0604030504040204" pitchFamily="34" charset="0"/>
+                <a:ea typeface="Tahoma" panose="020B0604030504040204" pitchFamily="34" charset="0"/>
+                <a:cs typeface="Tahoma" panose="020B0604030504040204" pitchFamily="34" charset="0"/>
+              </a:rPr>
+              <a:t>440 Hz</a:t>
+            </a:r>
+          </a:p>
+        </p:txBody>
+      </p:sp>
+      <p:sp>
+        <p:nvSpPr>
+          <p:cNvPr id="299" name="TextBox 298">
+            <a:extLst>
+              <a:ext uri="{FF2B5EF4-FFF2-40B4-BE49-F238E27FC236}">
+                <a16:creationId xmlns:a16="http://schemas.microsoft.com/office/drawing/2014/main" id="{C5F11405-3B25-46A7-A393-5FAFA8BE518A}"/>
+              </a:ext>
+            </a:extLst>
+          </p:cNvPr>
+          <p:cNvSpPr txBox="1"/>
+          <p:nvPr/>
+        </p:nvSpPr>
+        <p:spPr>
+          <a:xfrm>
+            <a:off x="2453900" y="696888"/>
+            <a:ext cx="602281" cy="276999"/>
+          </a:xfrm>
+          <a:prstGeom prst="rect">
+            <a:avLst/>
+          </a:prstGeom>
+          <a:solidFill>
+            <a:schemeClr val="bg1"/>
+          </a:solidFill>
+        </p:spPr>
+        <p:txBody>
+          <a:bodyPr wrap="none" rtlCol="0">
+            <a:spAutoFit/>
+          </a:bodyPr>
+          <a:lstStyle/>
+          <a:p>
+            <a:r>
+              <a:rPr lang="en-US" sz="1200" dirty="0" err="1">
+                <a:solidFill>
+                  <a:srgbClr val="00B050"/>
+                </a:solidFill>
+                <a:latin typeface="Tahoma" panose="020B0604030504040204" pitchFamily="34" charset="0"/>
+                <a:ea typeface="Tahoma" panose="020B0604030504040204" pitchFamily="34" charset="0"/>
+                <a:cs typeface="Tahoma" panose="020B0604030504040204" pitchFamily="34" charset="0"/>
+              </a:rPr>
+              <a:t>Interp</a:t>
+            </a:r>
+            <a:endParaRPr lang="en-US" sz="1200" dirty="0">
+              <a:solidFill>
+                <a:srgbClr val="00B050"/>
+              </a:solidFill>
+              <a:latin typeface="Tahoma" panose="020B0604030504040204" pitchFamily="34" charset="0"/>
+              <a:ea typeface="Tahoma" panose="020B0604030504040204" pitchFamily="34" charset="0"/>
+              <a:cs typeface="Tahoma" panose="020B0604030504040204" pitchFamily="34" charset="0"/>
+            </a:endParaRPr>
           </a:p>
         </p:txBody>
       </p:sp>

</xml_diff>